<commit_message>
Add: 1. Add queue example code 2. Add queue slide
</commit_message>
<xml_diff>
--- a/SystemVerilog_語法學習.pptx
+++ b/SystemVerilog_語法學習.pptx
@@ -5,7 +5,7 @@
     <p:sldMasterId id="2147483648" r:id="rId1"/>
   </p:sldMasterIdLst>
   <p:notesMasterIdLst>
-    <p:notesMasterId r:id="rId24"/>
+    <p:notesMasterId r:id="rId25"/>
   </p:notesMasterIdLst>
   <p:sldIdLst>
     <p:sldId id="256" r:id="rId2"/>
@@ -30,6 +30,7 @@
     <p:sldId id="284" r:id="rId21"/>
     <p:sldId id="285" r:id="rId22"/>
     <p:sldId id="286" r:id="rId23"/>
+    <p:sldId id="287" r:id="rId24"/>
   </p:sldIdLst>
   <p:sldSz cx="12192000" cy="6858000"/>
   <p:notesSz cx="6858000" cy="9144000"/>
@@ -218,7 +219,7 @@
           <a:p>
             <a:fld id="{28C483A5-4075-4A6E-B921-74BFA7B8EF67}" type="datetimeFigureOut">
               <a:rPr lang="zh-TW" altLang="en-US" smtClean="0"/>
-              <a:t>2025/4/16</a:t>
+              <a:t>2025/4/22</a:t>
             </a:fld>
             <a:endParaRPr lang="zh-TW" altLang="en-US"/>
           </a:p>
@@ -800,7 +801,7 @@
           <a:p>
             <a:fld id="{2365240E-6CA3-4772-8803-719FF1315E51}" type="datetimeFigureOut">
               <a:rPr lang="zh-TW" altLang="en-US" smtClean="0"/>
-              <a:t>2025/4/16</a:t>
+              <a:t>2025/4/22</a:t>
             </a:fld>
             <a:endParaRPr lang="zh-TW" altLang="en-US"/>
           </a:p>
@@ -998,7 +999,7 @@
           <a:p>
             <a:fld id="{2365240E-6CA3-4772-8803-719FF1315E51}" type="datetimeFigureOut">
               <a:rPr lang="zh-TW" altLang="en-US" smtClean="0"/>
-              <a:t>2025/4/16</a:t>
+              <a:t>2025/4/22</a:t>
             </a:fld>
             <a:endParaRPr lang="zh-TW" altLang="en-US"/>
           </a:p>
@@ -1206,7 +1207,7 @@
           <a:p>
             <a:fld id="{2365240E-6CA3-4772-8803-719FF1315E51}" type="datetimeFigureOut">
               <a:rPr lang="zh-TW" altLang="en-US" smtClean="0"/>
-              <a:t>2025/4/16</a:t>
+              <a:t>2025/4/22</a:t>
             </a:fld>
             <a:endParaRPr lang="zh-TW" altLang="en-US"/>
           </a:p>
@@ -1404,7 +1405,7 @@
           <a:p>
             <a:fld id="{2365240E-6CA3-4772-8803-719FF1315E51}" type="datetimeFigureOut">
               <a:rPr lang="zh-TW" altLang="en-US" smtClean="0"/>
-              <a:t>2025/4/16</a:t>
+              <a:t>2025/4/22</a:t>
             </a:fld>
             <a:endParaRPr lang="zh-TW" altLang="en-US"/>
           </a:p>
@@ -1679,7 +1680,7 @@
           <a:p>
             <a:fld id="{2365240E-6CA3-4772-8803-719FF1315E51}" type="datetimeFigureOut">
               <a:rPr lang="zh-TW" altLang="en-US" smtClean="0"/>
-              <a:t>2025/4/16</a:t>
+              <a:t>2025/4/22</a:t>
             </a:fld>
             <a:endParaRPr lang="zh-TW" altLang="en-US"/>
           </a:p>
@@ -1944,7 +1945,7 @@
           <a:p>
             <a:fld id="{2365240E-6CA3-4772-8803-719FF1315E51}" type="datetimeFigureOut">
               <a:rPr lang="zh-TW" altLang="en-US" smtClean="0"/>
-              <a:t>2025/4/16</a:t>
+              <a:t>2025/4/22</a:t>
             </a:fld>
             <a:endParaRPr lang="zh-TW" altLang="en-US"/>
           </a:p>
@@ -2356,7 +2357,7 @@
           <a:p>
             <a:fld id="{2365240E-6CA3-4772-8803-719FF1315E51}" type="datetimeFigureOut">
               <a:rPr lang="zh-TW" altLang="en-US" smtClean="0"/>
-              <a:t>2025/4/16</a:t>
+              <a:t>2025/4/22</a:t>
             </a:fld>
             <a:endParaRPr lang="zh-TW" altLang="en-US"/>
           </a:p>
@@ -2497,7 +2498,7 @@
           <a:p>
             <a:fld id="{2365240E-6CA3-4772-8803-719FF1315E51}" type="datetimeFigureOut">
               <a:rPr lang="zh-TW" altLang="en-US" smtClean="0"/>
-              <a:t>2025/4/16</a:t>
+              <a:t>2025/4/22</a:t>
             </a:fld>
             <a:endParaRPr lang="zh-TW" altLang="en-US"/>
           </a:p>
@@ -2610,7 +2611,7 @@
           <a:p>
             <a:fld id="{2365240E-6CA3-4772-8803-719FF1315E51}" type="datetimeFigureOut">
               <a:rPr lang="zh-TW" altLang="en-US" smtClean="0"/>
-              <a:t>2025/4/16</a:t>
+              <a:t>2025/4/22</a:t>
             </a:fld>
             <a:endParaRPr lang="zh-TW" altLang="en-US"/>
           </a:p>
@@ -2921,7 +2922,7 @@
           <a:p>
             <a:fld id="{2365240E-6CA3-4772-8803-719FF1315E51}" type="datetimeFigureOut">
               <a:rPr lang="zh-TW" altLang="en-US" smtClean="0"/>
-              <a:t>2025/4/16</a:t>
+              <a:t>2025/4/22</a:t>
             </a:fld>
             <a:endParaRPr lang="zh-TW" altLang="en-US"/>
           </a:p>
@@ -3209,7 +3210,7 @@
           <a:p>
             <a:fld id="{2365240E-6CA3-4772-8803-719FF1315E51}" type="datetimeFigureOut">
               <a:rPr lang="zh-TW" altLang="en-US" smtClean="0"/>
-              <a:t>2025/4/16</a:t>
+              <a:t>2025/4/22</a:t>
             </a:fld>
             <a:endParaRPr lang="zh-TW" altLang="en-US"/>
           </a:p>
@@ -3450,7 +3451,7 @@
           <a:p>
             <a:fld id="{2365240E-6CA3-4772-8803-719FF1315E51}" type="datetimeFigureOut">
               <a:rPr lang="zh-TW" altLang="en-US" smtClean="0"/>
-              <a:t>2025/4/16</a:t>
+              <a:t>2025/4/22</a:t>
             </a:fld>
             <a:endParaRPr lang="zh-TW" altLang="en-US"/>
           </a:p>
@@ -7340,9 +7341,24 @@
               <a:buAutoNum type="arabicPeriod"/>
             </a:pPr>
             <a:r>
+              <a:rPr lang="en-US" altLang="zh-TW" dirty="0"/>
+              <a:t>Data</a:t>
+            </a:r>
+            <a:r>
               <a:rPr lang="zh-TW" altLang="en-US" dirty="0"/>
-              <a:t>資料型態</a:t>
-            </a:r>
+              <a:t> </a:t>
+            </a:r>
+            <a:r>
+              <a:rPr lang="en-US" altLang="zh-TW" dirty="0"/>
+              <a:t>Type</a:t>
+            </a:r>
+          </a:p>
+          <a:p>
+            <a:pPr marL="514350" indent="-514350">
+              <a:buFont typeface="+mj-lt"/>
+              <a:buAutoNum type="arabicPeriod"/>
+            </a:pPr>
+            <a:endParaRPr lang="zh-TW" altLang="en-US" dirty="0"/>
           </a:p>
         </p:txBody>
       </p:sp>
@@ -8134,6 +8150,307 @@
     <p:extLst>
       <p:ext uri="{BB962C8B-B14F-4D97-AF65-F5344CB8AC3E}">
         <p14:creationId xmlns:p14="http://schemas.microsoft.com/office/powerpoint/2010/main" val="1246578209"/>
+      </p:ext>
+    </p:extLst>
+  </p:cSld>
+  <p:clrMapOvr>
+    <a:masterClrMapping/>
+  </p:clrMapOvr>
+</p:sld>
+</file>
+
+<file path=ppt/slides/slide23.xml><?xml version="1.0" encoding="utf-8"?>
+<p:sld xmlns:a="http://schemas.openxmlformats.org/drawingml/2006/main" xmlns:r="http://schemas.openxmlformats.org/officeDocument/2006/relationships" xmlns:p="http://schemas.openxmlformats.org/presentationml/2006/main">
+  <p:cSld>
+    <p:spTree>
+      <p:nvGrpSpPr>
+        <p:cNvPr id="1" name=""/>
+        <p:cNvGrpSpPr/>
+        <p:nvPr/>
+      </p:nvGrpSpPr>
+      <p:grpSpPr>
+        <a:xfrm>
+          <a:off x="0" y="0"/>
+          <a:ext cx="0" cy="0"/>
+          <a:chOff x="0" y="0"/>
+          <a:chExt cx="0" cy="0"/>
+        </a:xfrm>
+      </p:grpSpPr>
+      <p:sp>
+        <p:nvSpPr>
+          <p:cNvPr id="2" name="標題 1">
+            <a:extLst>
+              <a:ext uri="{FF2B5EF4-FFF2-40B4-BE49-F238E27FC236}">
+                <a16:creationId xmlns:a16="http://schemas.microsoft.com/office/drawing/2014/main" id="{D62C3883-D7D1-8C78-811B-DE2129894AD2}"/>
+              </a:ext>
+            </a:extLst>
+          </p:cNvPr>
+          <p:cNvSpPr>
+            <a:spLocks noGrp="1"/>
+          </p:cNvSpPr>
+          <p:nvPr>
+            <p:ph type="title"/>
+          </p:nvPr>
+        </p:nvSpPr>
+        <p:spPr/>
+        <p:txBody>
+          <a:bodyPr/>
+          <a:lstStyle/>
+          <a:p>
+            <a:r>
+              <a:rPr lang="en-US" altLang="zh-TW" dirty="0"/>
+              <a:t>Queue (1/1)</a:t>
+            </a:r>
+            <a:endParaRPr lang="zh-TW" altLang="en-US" dirty="0"/>
+          </a:p>
+        </p:txBody>
+      </p:sp>
+      <p:sp>
+        <p:nvSpPr>
+          <p:cNvPr id="3" name="內容版面配置區 2">
+            <a:extLst>
+              <a:ext uri="{FF2B5EF4-FFF2-40B4-BE49-F238E27FC236}">
+                <a16:creationId xmlns:a16="http://schemas.microsoft.com/office/drawing/2014/main" id="{980FF2E4-99D4-2C07-0250-CB36DEAE898B}"/>
+              </a:ext>
+            </a:extLst>
+          </p:cNvPr>
+          <p:cNvSpPr>
+            <a:spLocks noGrp="1"/>
+          </p:cNvSpPr>
+          <p:nvPr>
+            <p:ph idx="1"/>
+          </p:nvPr>
+        </p:nvSpPr>
+        <p:spPr/>
+        <p:txBody>
+          <a:bodyPr/>
+          <a:lstStyle/>
+          <a:p>
+            <a:r>
+              <a:rPr lang="zh-TW" altLang="en-US" dirty="0"/>
+              <a:t>使用 </a:t>
+            </a:r>
+            <a:r>
+              <a:rPr lang="en-US" altLang="zh-TW" dirty="0"/>
+              <a:t>[$] </a:t>
+            </a:r>
+            <a:r>
+              <a:rPr lang="zh-TW" altLang="en-US" dirty="0"/>
+              <a:t>來宣告成</a:t>
+            </a:r>
+            <a:r>
+              <a:rPr lang="en-US" altLang="zh-TW" dirty="0"/>
+              <a:t>queue</a:t>
+            </a:r>
+          </a:p>
+          <a:p>
+            <a:pPr lvl="1"/>
+            <a:r>
+              <a:rPr lang="en-US" altLang="zh-TW" dirty="0"/>
+              <a:t>Bounded queue</a:t>
+            </a:r>
+          </a:p>
+          <a:p>
+            <a:pPr lvl="2"/>
+            <a:r>
+              <a:rPr lang="en-US" altLang="zh-TW" dirty="0"/>
+              <a:t>[</a:t>
+            </a:r>
+            <a:r>
+              <a:rPr lang="en-US" altLang="zh-TW" dirty="0" err="1"/>
+              <a:t>data_type</a:t>
+            </a:r>
+            <a:r>
+              <a:rPr lang="en-US" altLang="zh-TW" dirty="0"/>
+              <a:t>]  [</a:t>
+            </a:r>
+            <a:r>
+              <a:rPr lang="en-US" altLang="zh-TW" dirty="0" err="1"/>
+              <a:t>name_of_queue</a:t>
+            </a:r>
+            <a:r>
+              <a:rPr lang="en-US" altLang="zh-TW" dirty="0"/>
+              <a:t>] [$:N];</a:t>
+            </a:r>
+          </a:p>
+          <a:p>
+            <a:pPr lvl="2"/>
+            <a:r>
+              <a:rPr lang="en-US" altLang="zh-TW" dirty="0"/>
+              <a:t>int 	</a:t>
+            </a:r>
+            <a:r>
+              <a:rPr lang="en-US" altLang="zh-TW" dirty="0" err="1"/>
+              <a:t>bounded_queue</a:t>
+            </a:r>
+            <a:r>
+              <a:rPr lang="en-US" altLang="zh-TW" dirty="0"/>
+              <a:t> [$:10]; 	// Depth 10</a:t>
+            </a:r>
+          </a:p>
+          <a:p>
+            <a:pPr lvl="2"/>
+            <a:endParaRPr lang="en-US" altLang="zh-TW" dirty="0"/>
+          </a:p>
+          <a:p>
+            <a:pPr lvl="2"/>
+            <a:endParaRPr lang="en-US" altLang="zh-TW" dirty="0"/>
+          </a:p>
+          <a:p>
+            <a:pPr lvl="1"/>
+            <a:r>
+              <a:rPr lang="en-US" altLang="zh-TW" dirty="0"/>
+              <a:t>Unbounded queue</a:t>
+            </a:r>
+          </a:p>
+          <a:p>
+            <a:pPr lvl="2"/>
+            <a:r>
+              <a:rPr lang="en-US" altLang="zh-TW" dirty="0"/>
+              <a:t>[</a:t>
+            </a:r>
+            <a:r>
+              <a:rPr lang="en-US" altLang="zh-TW" dirty="0" err="1"/>
+              <a:t>data_type</a:t>
+            </a:r>
+            <a:r>
+              <a:rPr lang="en-US" altLang="zh-TW" dirty="0"/>
+              <a:t>]  [</a:t>
+            </a:r>
+            <a:r>
+              <a:rPr lang="en-US" altLang="zh-TW" dirty="0" err="1"/>
+              <a:t>name_of_queue</a:t>
+            </a:r>
+            <a:r>
+              <a:rPr lang="en-US" altLang="zh-TW" dirty="0"/>
+              <a:t>] [$];</a:t>
+            </a:r>
+          </a:p>
+          <a:p>
+            <a:pPr lvl="2"/>
+            <a:r>
+              <a:rPr lang="en-US" altLang="zh-TW" dirty="0"/>
+              <a:t>int 	</a:t>
+            </a:r>
+            <a:r>
+              <a:rPr lang="en-US" altLang="zh-TW" dirty="0" err="1"/>
+              <a:t>unbounded_queue</a:t>
+            </a:r>
+            <a:r>
+              <a:rPr lang="en-US" altLang="zh-TW" dirty="0"/>
+              <a:t> [$]; 	// Unlimited entries</a:t>
+            </a:r>
+          </a:p>
+        </p:txBody>
+      </p:sp>
+      <p:pic>
+        <p:nvPicPr>
+          <p:cNvPr id="1026" name="Picture 2">
+            <a:extLst>
+              <a:ext uri="{FF2B5EF4-FFF2-40B4-BE49-F238E27FC236}">
+                <a16:creationId xmlns:a16="http://schemas.microsoft.com/office/drawing/2014/main" id="{1C9909EE-B299-961E-4DFA-0C6F4CE3EFDF}"/>
+              </a:ext>
+            </a:extLst>
+          </p:cNvPr>
+          <p:cNvPicPr>
+            <a:picLocks noChangeAspect="1" noChangeArrowheads="1"/>
+          </p:cNvPicPr>
+          <p:nvPr/>
+        </p:nvPicPr>
+        <p:blipFill>
+          <a:blip r:embed="rId2">
+            <a:extLst>
+              <a:ext uri="{28A0092B-C50C-407E-A947-70E740481C1C}">
+                <a14:useLocalDpi xmlns:a14="http://schemas.microsoft.com/office/drawing/2010/main" val="0"/>
+              </a:ext>
+            </a:extLst>
+          </a:blip>
+          <a:srcRect/>
+          <a:stretch>
+            <a:fillRect/>
+          </a:stretch>
+        </p:blipFill>
+        <p:spPr bwMode="auto">
+          <a:xfrm>
+            <a:off x="7163753" y="1962150"/>
+            <a:ext cx="4639531" cy="1466850"/>
+          </a:xfrm>
+          <a:prstGeom prst="rect">
+            <a:avLst/>
+          </a:prstGeom>
+          <a:noFill/>
+          <a:ln>
+            <a:solidFill>
+              <a:schemeClr val="tx1"/>
+            </a:solidFill>
+          </a:ln>
+          <a:extLst>
+            <a:ext uri="{909E8E84-426E-40DD-AFC4-6F175D3DCCD1}">
+              <a14:hiddenFill xmlns:a14="http://schemas.microsoft.com/office/drawing/2010/main">
+                <a:solidFill>
+                  <a:srgbClr val="FFFFFF"/>
+                </a:solidFill>
+              </a14:hiddenFill>
+            </a:ext>
+          </a:extLst>
+        </p:spPr>
+      </p:pic>
+      <p:pic>
+        <p:nvPicPr>
+          <p:cNvPr id="1028" name="Picture 4">
+            <a:extLst>
+              <a:ext uri="{FF2B5EF4-FFF2-40B4-BE49-F238E27FC236}">
+                <a16:creationId xmlns:a16="http://schemas.microsoft.com/office/drawing/2014/main" id="{368F1927-1D2C-DD9C-628F-5A20254ED84A}"/>
+              </a:ext>
+            </a:extLst>
+          </p:cNvPr>
+          <p:cNvPicPr>
+            <a:picLocks noChangeAspect="1" noChangeArrowheads="1"/>
+          </p:cNvPicPr>
+          <p:nvPr/>
+        </p:nvPicPr>
+        <p:blipFill>
+          <a:blip r:embed="rId3">
+            <a:extLst>
+              <a:ext uri="{28A0092B-C50C-407E-A947-70E740481C1C}">
+                <a14:useLocalDpi xmlns:a14="http://schemas.microsoft.com/office/drawing/2010/main" val="0"/>
+              </a:ext>
+            </a:extLst>
+          </a:blip>
+          <a:srcRect/>
+          <a:stretch>
+            <a:fillRect/>
+          </a:stretch>
+        </p:blipFill>
+        <p:spPr bwMode="auto">
+          <a:xfrm>
+            <a:off x="7163753" y="5173799"/>
+            <a:ext cx="4640400" cy="1567346"/>
+          </a:xfrm>
+          <a:prstGeom prst="rect">
+            <a:avLst/>
+          </a:prstGeom>
+          <a:noFill/>
+          <a:ln>
+            <a:solidFill>
+              <a:schemeClr val="tx1"/>
+            </a:solidFill>
+          </a:ln>
+          <a:extLst>
+            <a:ext uri="{909E8E84-426E-40DD-AFC4-6F175D3DCCD1}">
+              <a14:hiddenFill xmlns:a14="http://schemas.microsoft.com/office/drawing/2010/main">
+                <a:solidFill>
+                  <a:srgbClr val="FFFFFF"/>
+                </a:solidFill>
+              </a14:hiddenFill>
+            </a:ext>
+          </a:extLst>
+        </p:spPr>
+      </p:pic>
+    </p:spTree>
+    <p:extLst>
+      <p:ext uri="{BB962C8B-B14F-4D97-AF65-F5344CB8AC3E}">
+        <p14:creationId xmlns:p14="http://schemas.microsoft.com/office/powerpoint/2010/main" val="2738134855"/>
       </p:ext>
     </p:extLst>
   </p:cSld>

</xml_diff>

<commit_message>
Add: 1. Add struct example code 2. Add struct slide
</commit_message>
<xml_diff>
--- a/SystemVerilog_語法學習.pptx
+++ b/SystemVerilog_語法學習.pptx
@@ -5,7 +5,7 @@
     <p:sldMasterId id="2147483648" r:id="rId1"/>
   </p:sldMasterIdLst>
   <p:notesMasterIdLst>
-    <p:notesMasterId r:id="rId25"/>
+    <p:notesMasterId r:id="rId26"/>
   </p:notesMasterIdLst>
   <p:sldIdLst>
     <p:sldId id="256" r:id="rId2"/>
@@ -31,6 +31,7 @@
     <p:sldId id="285" r:id="rId22"/>
     <p:sldId id="286" r:id="rId23"/>
     <p:sldId id="287" r:id="rId24"/>
+    <p:sldId id="288" r:id="rId25"/>
   </p:sldIdLst>
   <p:sldSz cx="12192000" cy="6858000"/>
   <p:notesSz cx="6858000" cy="9144000"/>
@@ -8451,6 +8452,192 @@
     <p:extLst>
       <p:ext uri="{BB962C8B-B14F-4D97-AF65-F5344CB8AC3E}">
         <p14:creationId xmlns:p14="http://schemas.microsoft.com/office/powerpoint/2010/main" val="2738134855"/>
+      </p:ext>
+    </p:extLst>
+  </p:cSld>
+  <p:clrMapOvr>
+    <a:masterClrMapping/>
+  </p:clrMapOvr>
+</p:sld>
+</file>
+
+<file path=ppt/slides/slide24.xml><?xml version="1.0" encoding="utf-8"?>
+<p:sld xmlns:a="http://schemas.openxmlformats.org/drawingml/2006/main" xmlns:r="http://schemas.openxmlformats.org/officeDocument/2006/relationships" xmlns:p="http://schemas.openxmlformats.org/presentationml/2006/main">
+  <p:cSld>
+    <p:spTree>
+      <p:nvGrpSpPr>
+        <p:cNvPr id="1" name="">
+          <a:extLst>
+            <a:ext uri="{FF2B5EF4-FFF2-40B4-BE49-F238E27FC236}">
+              <a16:creationId xmlns:a16="http://schemas.microsoft.com/office/drawing/2014/main" id="{E36303A7-79AC-31FE-7C18-5352918621A4}"/>
+            </a:ext>
+          </a:extLst>
+        </p:cNvPr>
+        <p:cNvGrpSpPr/>
+        <p:nvPr/>
+      </p:nvGrpSpPr>
+      <p:grpSpPr>
+        <a:xfrm>
+          <a:off x="0" y="0"/>
+          <a:ext cx="0" cy="0"/>
+          <a:chOff x="0" y="0"/>
+          <a:chExt cx="0" cy="0"/>
+        </a:xfrm>
+      </p:grpSpPr>
+      <p:sp>
+        <p:nvSpPr>
+          <p:cNvPr id="2" name="標題 1">
+            <a:extLst>
+              <a:ext uri="{FF2B5EF4-FFF2-40B4-BE49-F238E27FC236}">
+                <a16:creationId xmlns:a16="http://schemas.microsoft.com/office/drawing/2014/main" id="{2EA619C4-B50A-9F79-5355-17C8A54C538D}"/>
+              </a:ext>
+            </a:extLst>
+          </p:cNvPr>
+          <p:cNvSpPr>
+            <a:spLocks noGrp="1"/>
+          </p:cNvSpPr>
+          <p:nvPr>
+            <p:ph type="title"/>
+          </p:nvPr>
+        </p:nvSpPr>
+        <p:spPr/>
+        <p:txBody>
+          <a:bodyPr/>
+          <a:lstStyle/>
+          <a:p>
+            <a:r>
+              <a:rPr lang="en-US" altLang="zh-TW" dirty="0"/>
+              <a:t>Structure (1/1)</a:t>
+            </a:r>
+            <a:endParaRPr lang="zh-TW" altLang="en-US" dirty="0"/>
+          </a:p>
+        </p:txBody>
+      </p:sp>
+      <p:sp>
+        <p:nvSpPr>
+          <p:cNvPr id="3" name="內容版面配置區 2">
+            <a:extLst>
+              <a:ext uri="{FF2B5EF4-FFF2-40B4-BE49-F238E27FC236}">
+                <a16:creationId xmlns:a16="http://schemas.microsoft.com/office/drawing/2014/main" id="{83B196B7-3219-9B33-8C9D-5027730061AB}"/>
+              </a:ext>
+            </a:extLst>
+          </p:cNvPr>
+          <p:cNvSpPr>
+            <a:spLocks noGrp="1"/>
+          </p:cNvSpPr>
+          <p:nvPr>
+            <p:ph idx="1"/>
+          </p:nvPr>
+        </p:nvSpPr>
+        <p:spPr/>
+        <p:txBody>
+          <a:bodyPr/>
+          <a:lstStyle/>
+          <a:p>
+            <a:r>
+              <a:rPr lang="zh-TW" altLang="en-US" dirty="0"/>
+              <a:t>分成 </a:t>
+            </a:r>
+            <a:r>
+              <a:rPr lang="en-US" altLang="zh-TW" dirty="0"/>
+              <a:t>packed &amp; unpacked struct</a:t>
+            </a:r>
+          </a:p>
+          <a:p>
+            <a:pPr lvl="1"/>
+            <a:r>
+              <a:rPr lang="en-US" altLang="zh-TW" dirty="0"/>
+              <a:t>packed struct</a:t>
+            </a:r>
+          </a:p>
+          <a:p>
+            <a:pPr lvl="2"/>
+            <a:r>
+              <a:rPr lang="zh-TW" altLang="en-US" dirty="0"/>
+              <a:t>使用 </a:t>
+            </a:r>
+            <a:r>
+              <a:rPr lang="en-US" altLang="zh-TW" dirty="0"/>
+              <a:t>packed </a:t>
+            </a:r>
+            <a:r>
+              <a:rPr lang="zh-TW" altLang="en-US" dirty="0"/>
+              <a:t>去宣告 </a:t>
+            </a:r>
+            <a:r>
+              <a:rPr lang="en-US" altLang="zh-TW" dirty="0"/>
+              <a:t>struct</a:t>
+            </a:r>
+            <a:r>
+              <a:rPr lang="zh-TW" altLang="en-US" dirty="0"/>
+              <a:t>，預設情況下它是無號的</a:t>
+            </a:r>
+            <a:endParaRPr lang="en-US" altLang="zh-TW" dirty="0"/>
+          </a:p>
+          <a:p>
+            <a:pPr lvl="2"/>
+            <a:r>
+              <a:rPr lang="zh-TW" altLang="en-US" dirty="0"/>
+              <a:t>資料以連續的位元方式儲存，沒有記憶體間隙</a:t>
+            </a:r>
+            <a:r>
+              <a:rPr lang="en-US" altLang="zh-TW" dirty="0"/>
+              <a:t>(padding)</a:t>
+            </a:r>
+          </a:p>
+          <a:p>
+            <a:pPr lvl="2"/>
+            <a:r>
+              <a:rPr lang="zh-TW" altLang="en-US" dirty="0"/>
+              <a:t>所有成員緊密排列，類似於一個連續的位向量</a:t>
+            </a:r>
+            <a:r>
+              <a:rPr lang="en-US" altLang="zh-TW" dirty="0"/>
+              <a:t>(bit vector)</a:t>
+            </a:r>
+          </a:p>
+          <a:p>
+            <a:pPr lvl="2"/>
+            <a:r>
+              <a:rPr lang="zh-TW" altLang="en-US" dirty="0"/>
+              <a:t>適合用於硬體設計中需要精確控制位元對應的場景，例如通訊協定封包或暫存器映射。</a:t>
+            </a:r>
+            <a:endParaRPr lang="en-US" altLang="zh-TW" dirty="0"/>
+          </a:p>
+          <a:p>
+            <a:pPr lvl="2"/>
+            <a:endParaRPr lang="en-US" altLang="zh-TW" dirty="0"/>
+          </a:p>
+          <a:p>
+            <a:pPr lvl="1"/>
+            <a:r>
+              <a:rPr lang="en-US" altLang="zh-TW" dirty="0"/>
+              <a:t>Packed Struct</a:t>
+            </a:r>
+            <a:r>
+              <a:rPr lang="zh-TW" altLang="en-US" dirty="0"/>
+              <a:t>：適合硬體設計，記憶體連續，支援位元操作，合成效率高，但限制於位元型別。</a:t>
+            </a:r>
+            <a:endParaRPr lang="en-US" altLang="zh-TW" dirty="0"/>
+          </a:p>
+          <a:p>
+            <a:pPr lvl="1"/>
+            <a:r>
+              <a:rPr lang="en-US" altLang="zh-TW" dirty="0"/>
+              <a:t>Unpacked Struct</a:t>
+            </a:r>
+            <a:r>
+              <a:rPr lang="zh-TW" altLang="en-US" dirty="0"/>
+              <a:t>：適合測試平台或軟體風格的資料結構，靈活但可能有記憶體間隙，合成效率較低。</a:t>
+            </a:r>
+            <a:endParaRPr lang="en-US" altLang="zh-TW" dirty="0"/>
+          </a:p>
+        </p:txBody>
+      </p:sp>
+    </p:spTree>
+    <p:extLst>
+      <p:ext uri="{BB962C8B-B14F-4D97-AF65-F5344CB8AC3E}">
+        <p14:creationId xmlns:p14="http://schemas.microsoft.com/office/powerpoint/2010/main" val="1932946088"/>
       </p:ext>
     </p:extLst>
   </p:cSld>

</xml_diff>

<commit_message>
Add: 1. Add control_flow example code 2. Add control_flow slide
</commit_message>
<xml_diff>
--- a/SystemVerilog_語法學習.pptx
+++ b/SystemVerilog_語法學習.pptx
@@ -5,7 +5,7 @@
     <p:sldMasterId id="2147483648" r:id="rId1"/>
   </p:sldMasterIdLst>
   <p:notesMasterIdLst>
-    <p:notesMasterId r:id="rId26"/>
+    <p:notesMasterId r:id="rId28"/>
   </p:notesMasterIdLst>
   <p:sldIdLst>
     <p:sldId id="256" r:id="rId2"/>
@@ -32,6 +32,8 @@
     <p:sldId id="286" r:id="rId23"/>
     <p:sldId id="287" r:id="rId24"/>
     <p:sldId id="288" r:id="rId25"/>
+    <p:sldId id="289" r:id="rId26"/>
+    <p:sldId id="291" r:id="rId27"/>
   </p:sldIdLst>
   <p:sldSz cx="12192000" cy="6858000"/>
   <p:notesSz cx="6858000" cy="9144000"/>
@@ -7342,17 +7344,21 @@
               <a:buAutoNum type="arabicPeriod"/>
             </a:pPr>
             <a:r>
-              <a:rPr lang="en-US" altLang="zh-TW" dirty="0"/>
-              <a:t>Data</a:t>
-            </a:r>
-            <a:r>
-              <a:rPr lang="zh-TW" altLang="en-US" dirty="0"/>
-              <a:t> </a:t>
-            </a:r>
-            <a:r>
-              <a:rPr lang="en-US" altLang="zh-TW" dirty="0"/>
-              <a:t>Type</a:t>
-            </a:r>
+              <a:rPr lang="en-US" altLang="zh-TW" dirty="0" err="1"/>
+              <a:t>Data_Type</a:t>
+            </a:r>
+            <a:endParaRPr lang="en-US" altLang="zh-TW" dirty="0"/>
+          </a:p>
+          <a:p>
+            <a:pPr marL="514350" indent="-514350">
+              <a:buFont typeface="+mj-lt"/>
+              <a:buAutoNum type="arabicPeriod"/>
+            </a:pPr>
+            <a:r>
+              <a:rPr lang="en-US" altLang="zh-TW" dirty="0" err="1"/>
+              <a:t>Control_Flow</a:t>
+            </a:r>
+            <a:endParaRPr lang="en-US" altLang="zh-TW" dirty="0"/>
           </a:p>
           <a:p>
             <a:pPr marL="514350" indent="-514350">
@@ -8647,6 +8653,201 @@
 </p:sld>
 </file>
 
+<file path=ppt/slides/slide25.xml><?xml version="1.0" encoding="utf-8"?>
+<p:sld xmlns:a="http://schemas.openxmlformats.org/drawingml/2006/main" xmlns:r="http://schemas.openxmlformats.org/officeDocument/2006/relationships" xmlns:p="http://schemas.openxmlformats.org/presentationml/2006/main">
+  <p:cSld>
+    <p:spTree>
+      <p:nvGrpSpPr>
+        <p:cNvPr id="1" name="">
+          <a:extLst>
+            <a:ext uri="{FF2B5EF4-FFF2-40B4-BE49-F238E27FC236}">
+              <a16:creationId xmlns:a16="http://schemas.microsoft.com/office/drawing/2014/main" id="{D2B13BD9-8BA5-A8D2-FB6E-E72D3D1A4EDA}"/>
+            </a:ext>
+          </a:extLst>
+        </p:cNvPr>
+        <p:cNvGrpSpPr/>
+        <p:nvPr/>
+      </p:nvGrpSpPr>
+      <p:grpSpPr>
+        <a:xfrm>
+          <a:off x="0" y="0"/>
+          <a:ext cx="0" cy="0"/>
+          <a:chOff x="0" y="0"/>
+          <a:chExt cx="0" cy="0"/>
+        </a:xfrm>
+      </p:grpSpPr>
+      <p:sp>
+        <p:nvSpPr>
+          <p:cNvPr id="2" name="標題 1">
+            <a:extLst>
+              <a:ext uri="{FF2B5EF4-FFF2-40B4-BE49-F238E27FC236}">
+                <a16:creationId xmlns:a16="http://schemas.microsoft.com/office/drawing/2014/main" id="{4D0A3B4E-2E47-6B00-39CA-15443D8423B2}"/>
+              </a:ext>
+            </a:extLst>
+          </p:cNvPr>
+          <p:cNvSpPr>
+            <a:spLocks noGrp="1"/>
+          </p:cNvSpPr>
+          <p:nvPr>
+            <p:ph type="ctrTitle"/>
+          </p:nvPr>
+        </p:nvSpPr>
+        <p:spPr/>
+        <p:txBody>
+          <a:bodyPr/>
+          <a:lstStyle/>
+          <a:p>
+            <a:r>
+              <a:rPr lang="en-US" altLang="zh-TW" dirty="0"/>
+              <a:t>Chapter 2</a:t>
+            </a:r>
+            <a:endParaRPr lang="zh-TW" altLang="en-US" dirty="0"/>
+          </a:p>
+        </p:txBody>
+      </p:sp>
+      <p:sp>
+        <p:nvSpPr>
+          <p:cNvPr id="3" name="副標題 2">
+            <a:extLst>
+              <a:ext uri="{FF2B5EF4-FFF2-40B4-BE49-F238E27FC236}">
+                <a16:creationId xmlns:a16="http://schemas.microsoft.com/office/drawing/2014/main" id="{0CC11A6F-0257-C09B-79F1-9E0A1C118590}"/>
+              </a:ext>
+            </a:extLst>
+          </p:cNvPr>
+          <p:cNvSpPr>
+            <a:spLocks noGrp="1"/>
+          </p:cNvSpPr>
+          <p:nvPr>
+            <p:ph type="subTitle" idx="1"/>
+          </p:nvPr>
+        </p:nvSpPr>
+        <p:spPr/>
+        <p:txBody>
+          <a:bodyPr>
+            <a:normAutofit/>
+          </a:bodyPr>
+          <a:lstStyle/>
+          <a:p>
+            <a:r>
+              <a:rPr lang="en-US" altLang="zh-TW" sz="4000" dirty="0" err="1"/>
+              <a:t>Control_Flow</a:t>
+            </a:r>
+            <a:endParaRPr lang="zh-TW" altLang="en-US" sz="4000" dirty="0"/>
+          </a:p>
+        </p:txBody>
+      </p:sp>
+    </p:spTree>
+    <p:extLst>
+      <p:ext uri="{BB962C8B-B14F-4D97-AF65-F5344CB8AC3E}">
+        <p14:creationId xmlns:p14="http://schemas.microsoft.com/office/powerpoint/2010/main" val="3560747079"/>
+      </p:ext>
+    </p:extLst>
+  </p:cSld>
+  <p:clrMapOvr>
+    <a:masterClrMapping/>
+  </p:clrMapOvr>
+</p:sld>
+</file>
+
+<file path=ppt/slides/slide26.xml><?xml version="1.0" encoding="utf-8"?>
+<p:sld xmlns:a="http://schemas.openxmlformats.org/drawingml/2006/main" xmlns:r="http://schemas.openxmlformats.org/officeDocument/2006/relationships" xmlns:p="http://schemas.openxmlformats.org/presentationml/2006/main">
+  <p:cSld>
+    <p:spTree>
+      <p:nvGrpSpPr>
+        <p:cNvPr id="1" name="">
+          <a:extLst>
+            <a:ext uri="{FF2B5EF4-FFF2-40B4-BE49-F238E27FC236}">
+              <a16:creationId xmlns:a16="http://schemas.microsoft.com/office/drawing/2014/main" id="{EA18B1B3-7583-9D87-4408-96BBC243FF99}"/>
+            </a:ext>
+          </a:extLst>
+        </p:cNvPr>
+        <p:cNvGrpSpPr/>
+        <p:nvPr/>
+      </p:nvGrpSpPr>
+      <p:grpSpPr>
+        <a:xfrm>
+          <a:off x="0" y="0"/>
+          <a:ext cx="0" cy="0"/>
+          <a:chOff x="0" y="0"/>
+          <a:chExt cx="0" cy="0"/>
+        </a:xfrm>
+      </p:grpSpPr>
+      <p:sp>
+        <p:nvSpPr>
+          <p:cNvPr id="2" name="標題 1">
+            <a:extLst>
+              <a:ext uri="{FF2B5EF4-FFF2-40B4-BE49-F238E27FC236}">
+                <a16:creationId xmlns:a16="http://schemas.microsoft.com/office/drawing/2014/main" id="{777BE6DA-00AE-F59D-E09D-54F7708135E9}"/>
+              </a:ext>
+            </a:extLst>
+          </p:cNvPr>
+          <p:cNvSpPr>
+            <a:spLocks noGrp="1"/>
+          </p:cNvSpPr>
+          <p:nvPr>
+            <p:ph type="title"/>
+          </p:nvPr>
+        </p:nvSpPr>
+        <p:spPr/>
+        <p:txBody>
+          <a:bodyPr/>
+          <a:lstStyle/>
+          <a:p>
+            <a:r>
+              <a:rPr lang="en-US" altLang="zh-TW" dirty="0"/>
+              <a:t>Types of looping constructs</a:t>
+            </a:r>
+            <a:endParaRPr lang="zh-TW" altLang="en-US" dirty="0"/>
+          </a:p>
+        </p:txBody>
+      </p:sp>
+      <p:pic>
+        <p:nvPicPr>
+          <p:cNvPr id="5" name="內容版面配置區 4">
+            <a:extLst>
+              <a:ext uri="{FF2B5EF4-FFF2-40B4-BE49-F238E27FC236}">
+                <a16:creationId xmlns:a16="http://schemas.microsoft.com/office/drawing/2014/main" id="{F2427AEE-18EB-5BAA-57DD-D77804D0DC26}"/>
+              </a:ext>
+            </a:extLst>
+          </p:cNvPr>
+          <p:cNvPicPr>
+            <a:picLocks noGrp="1" noChangeAspect="1"/>
+          </p:cNvPicPr>
+          <p:nvPr>
+            <p:ph idx="1"/>
+          </p:nvPr>
+        </p:nvPicPr>
+        <p:blipFill>
+          <a:blip r:embed="rId2"/>
+          <a:stretch>
+            <a:fillRect/>
+          </a:stretch>
+        </p:blipFill>
+        <p:spPr>
+          <a:xfrm>
+            <a:off x="1783061" y="2102247"/>
+            <a:ext cx="8625877" cy="3810794"/>
+          </a:xfrm>
+          <a:ln>
+            <a:solidFill>
+              <a:schemeClr val="tx1"/>
+            </a:solidFill>
+          </a:ln>
+        </p:spPr>
+      </p:pic>
+    </p:spTree>
+    <p:extLst>
+      <p:ext uri="{BB962C8B-B14F-4D97-AF65-F5344CB8AC3E}">
+        <p14:creationId xmlns:p14="http://schemas.microsoft.com/office/powerpoint/2010/main" val="4270003283"/>
+      </p:ext>
+    </p:extLst>
+  </p:cSld>
+  <p:clrMapOvr>
+    <a:masterClrMapping/>
+  </p:clrMapOvr>
+</p:sld>
+</file>
+
 <file path=ppt/slides/slide3.xml><?xml version="1.0" encoding="utf-8"?>
 <p:sld xmlns:a="http://schemas.openxmlformats.org/drawingml/2006/main" xmlns:r="http://schemas.openxmlformats.org/officeDocument/2006/relationships" xmlns:p="http://schemas.openxmlformats.org/presentationml/2006/main">
   <p:cSld>
@@ -8717,9 +8918,10 @@
           <a:lstStyle/>
           <a:p>
             <a:r>
-              <a:rPr lang="zh-TW" altLang="en-US" sz="4000" dirty="0"/>
-              <a:t>資料型態</a:t>
-            </a:r>
+              <a:rPr lang="en-US" altLang="zh-TW" sz="4000" dirty="0" err="1"/>
+              <a:t>Data_Type</a:t>
+            </a:r>
+            <a:endParaRPr lang="en-US" altLang="zh-TW" sz="4000" dirty="0"/>
           </a:p>
         </p:txBody>
       </p:sp>

</xml_diff>

<commit_message>
Add: 1. block/nonBlock example code 2. function/task example code 3. add block/nonBlock/function/task ppt
</commit_message>
<xml_diff>
--- a/SystemVerilog_語法學習.pptx
+++ b/SystemVerilog_語法學習.pptx
@@ -5,7 +5,7 @@
     <p:sldMasterId id="2147483648" r:id="rId1"/>
   </p:sldMasterIdLst>
   <p:notesMasterIdLst>
-    <p:notesMasterId r:id="rId28"/>
+    <p:notesMasterId r:id="rId34"/>
   </p:notesMasterIdLst>
   <p:sldIdLst>
     <p:sldId id="256" r:id="rId2"/>
@@ -34,6 +34,12 @@
     <p:sldId id="288" r:id="rId25"/>
     <p:sldId id="289" r:id="rId26"/>
     <p:sldId id="291" r:id="rId27"/>
+    <p:sldId id="292" r:id="rId28"/>
+    <p:sldId id="294" r:id="rId29"/>
+    <p:sldId id="295" r:id="rId30"/>
+    <p:sldId id="296" r:id="rId31"/>
+    <p:sldId id="297" r:id="rId32"/>
+    <p:sldId id="298" r:id="rId33"/>
   </p:sldIdLst>
   <p:sldSz cx="12192000" cy="6858000"/>
   <p:notesSz cx="6858000" cy="9144000"/>
@@ -222,7 +228,7 @@
           <a:p>
             <a:fld id="{28C483A5-4075-4A6E-B921-74BFA7B8EF67}" type="datetimeFigureOut">
               <a:rPr lang="zh-TW" altLang="en-US" smtClean="0"/>
-              <a:t>2025/4/22</a:t>
+              <a:t>2025/4/24</a:t>
             </a:fld>
             <a:endParaRPr lang="zh-TW" altLang="en-US"/>
           </a:p>
@@ -804,7 +810,7 @@
           <a:p>
             <a:fld id="{2365240E-6CA3-4772-8803-719FF1315E51}" type="datetimeFigureOut">
               <a:rPr lang="zh-TW" altLang="en-US" smtClean="0"/>
-              <a:t>2025/4/22</a:t>
+              <a:t>2025/4/24</a:t>
             </a:fld>
             <a:endParaRPr lang="zh-TW" altLang="en-US"/>
           </a:p>
@@ -1002,7 +1008,7 @@
           <a:p>
             <a:fld id="{2365240E-6CA3-4772-8803-719FF1315E51}" type="datetimeFigureOut">
               <a:rPr lang="zh-TW" altLang="en-US" smtClean="0"/>
-              <a:t>2025/4/22</a:t>
+              <a:t>2025/4/24</a:t>
             </a:fld>
             <a:endParaRPr lang="zh-TW" altLang="en-US"/>
           </a:p>
@@ -1210,7 +1216,7 @@
           <a:p>
             <a:fld id="{2365240E-6CA3-4772-8803-719FF1315E51}" type="datetimeFigureOut">
               <a:rPr lang="zh-TW" altLang="en-US" smtClean="0"/>
-              <a:t>2025/4/22</a:t>
+              <a:t>2025/4/24</a:t>
             </a:fld>
             <a:endParaRPr lang="zh-TW" altLang="en-US"/>
           </a:p>
@@ -1408,7 +1414,7 @@
           <a:p>
             <a:fld id="{2365240E-6CA3-4772-8803-719FF1315E51}" type="datetimeFigureOut">
               <a:rPr lang="zh-TW" altLang="en-US" smtClean="0"/>
-              <a:t>2025/4/22</a:t>
+              <a:t>2025/4/24</a:t>
             </a:fld>
             <a:endParaRPr lang="zh-TW" altLang="en-US"/>
           </a:p>
@@ -1683,7 +1689,7 @@
           <a:p>
             <a:fld id="{2365240E-6CA3-4772-8803-719FF1315E51}" type="datetimeFigureOut">
               <a:rPr lang="zh-TW" altLang="en-US" smtClean="0"/>
-              <a:t>2025/4/22</a:t>
+              <a:t>2025/4/24</a:t>
             </a:fld>
             <a:endParaRPr lang="zh-TW" altLang="en-US"/>
           </a:p>
@@ -1948,7 +1954,7 @@
           <a:p>
             <a:fld id="{2365240E-6CA3-4772-8803-719FF1315E51}" type="datetimeFigureOut">
               <a:rPr lang="zh-TW" altLang="en-US" smtClean="0"/>
-              <a:t>2025/4/22</a:t>
+              <a:t>2025/4/24</a:t>
             </a:fld>
             <a:endParaRPr lang="zh-TW" altLang="en-US"/>
           </a:p>
@@ -2360,7 +2366,7 @@
           <a:p>
             <a:fld id="{2365240E-6CA3-4772-8803-719FF1315E51}" type="datetimeFigureOut">
               <a:rPr lang="zh-TW" altLang="en-US" smtClean="0"/>
-              <a:t>2025/4/22</a:t>
+              <a:t>2025/4/24</a:t>
             </a:fld>
             <a:endParaRPr lang="zh-TW" altLang="en-US"/>
           </a:p>
@@ -2501,7 +2507,7 @@
           <a:p>
             <a:fld id="{2365240E-6CA3-4772-8803-719FF1315E51}" type="datetimeFigureOut">
               <a:rPr lang="zh-TW" altLang="en-US" smtClean="0"/>
-              <a:t>2025/4/22</a:t>
+              <a:t>2025/4/24</a:t>
             </a:fld>
             <a:endParaRPr lang="zh-TW" altLang="en-US"/>
           </a:p>
@@ -2614,7 +2620,7 @@
           <a:p>
             <a:fld id="{2365240E-6CA3-4772-8803-719FF1315E51}" type="datetimeFigureOut">
               <a:rPr lang="zh-TW" altLang="en-US" smtClean="0"/>
-              <a:t>2025/4/22</a:t>
+              <a:t>2025/4/24</a:t>
             </a:fld>
             <a:endParaRPr lang="zh-TW" altLang="en-US"/>
           </a:p>
@@ -2925,7 +2931,7 @@
           <a:p>
             <a:fld id="{2365240E-6CA3-4772-8803-719FF1315E51}" type="datetimeFigureOut">
               <a:rPr lang="zh-TW" altLang="en-US" smtClean="0"/>
-              <a:t>2025/4/22</a:t>
+              <a:t>2025/4/24</a:t>
             </a:fld>
             <a:endParaRPr lang="zh-TW" altLang="en-US"/>
           </a:p>
@@ -3213,7 +3219,7 @@
           <a:p>
             <a:fld id="{2365240E-6CA3-4772-8803-719FF1315E51}" type="datetimeFigureOut">
               <a:rPr lang="zh-TW" altLang="en-US" smtClean="0"/>
-              <a:t>2025/4/22</a:t>
+              <a:t>2025/4/24</a:t>
             </a:fld>
             <a:endParaRPr lang="zh-TW" altLang="en-US"/>
           </a:p>
@@ -3454,7 +3460,7 @@
           <a:p>
             <a:fld id="{2365240E-6CA3-4772-8803-719FF1315E51}" type="datetimeFigureOut">
               <a:rPr lang="zh-TW" altLang="en-US" smtClean="0"/>
-              <a:t>2025/4/22</a:t>
+              <a:t>2025/4/24</a:t>
             </a:fld>
             <a:endParaRPr lang="zh-TW" altLang="en-US"/>
           </a:p>
@@ -8795,7 +8801,7 @@
           <a:p>
             <a:r>
               <a:rPr lang="en-US" altLang="zh-TW" dirty="0"/>
-              <a:t>Types of looping constructs</a:t>
+              <a:t>Types of looping constructs (1/1)</a:t>
             </a:r>
             <a:endParaRPr lang="zh-TW" altLang="en-US" dirty="0"/>
           </a:p>
@@ -8848,6 +8854,1189 @@
 </p:sld>
 </file>
 
+<file path=ppt/slides/slide27.xml><?xml version="1.0" encoding="utf-8"?>
+<p:sld xmlns:a="http://schemas.openxmlformats.org/drawingml/2006/main" xmlns:r="http://schemas.openxmlformats.org/officeDocument/2006/relationships" xmlns:p="http://schemas.openxmlformats.org/presentationml/2006/main">
+  <p:cSld>
+    <p:spTree>
+      <p:nvGrpSpPr>
+        <p:cNvPr id="1" name="">
+          <a:extLst>
+            <a:ext uri="{FF2B5EF4-FFF2-40B4-BE49-F238E27FC236}">
+              <a16:creationId xmlns:a16="http://schemas.microsoft.com/office/drawing/2014/main" id="{5659EEAB-F945-CCCC-5BB6-FF0F77A6D9C9}"/>
+            </a:ext>
+          </a:extLst>
+        </p:cNvPr>
+        <p:cNvGrpSpPr/>
+        <p:nvPr/>
+      </p:nvGrpSpPr>
+      <p:grpSpPr>
+        <a:xfrm>
+          <a:off x="0" y="0"/>
+          <a:ext cx="0" cy="0"/>
+          <a:chOff x="0" y="0"/>
+          <a:chExt cx="0" cy="0"/>
+        </a:xfrm>
+      </p:grpSpPr>
+      <p:sp>
+        <p:nvSpPr>
+          <p:cNvPr id="2" name="標題 1">
+            <a:extLst>
+              <a:ext uri="{FF2B5EF4-FFF2-40B4-BE49-F238E27FC236}">
+                <a16:creationId xmlns:a16="http://schemas.microsoft.com/office/drawing/2014/main" id="{F346DA6D-C004-8954-2EA8-9AE711C9B809}"/>
+              </a:ext>
+            </a:extLst>
+          </p:cNvPr>
+          <p:cNvSpPr>
+            <a:spLocks noGrp="1"/>
+          </p:cNvSpPr>
+          <p:nvPr>
+            <p:ph type="title"/>
+          </p:nvPr>
+        </p:nvSpPr>
+        <p:spPr/>
+        <p:txBody>
+          <a:bodyPr/>
+          <a:lstStyle/>
+          <a:p>
+            <a:r>
+              <a:rPr lang="en-US" altLang="zh-TW" dirty="0"/>
+              <a:t>Types of if-else statement (1/2)</a:t>
+            </a:r>
+            <a:endParaRPr lang="zh-TW" altLang="en-US" dirty="0"/>
+          </a:p>
+        </p:txBody>
+      </p:sp>
+      <p:sp>
+        <p:nvSpPr>
+          <p:cNvPr id="8" name="內容版面配置區 7">
+            <a:extLst>
+              <a:ext uri="{FF2B5EF4-FFF2-40B4-BE49-F238E27FC236}">
+                <a16:creationId xmlns:a16="http://schemas.microsoft.com/office/drawing/2014/main" id="{AA3F0585-FAAC-90F5-39EA-7B39EF4A348B}"/>
+              </a:ext>
+            </a:extLst>
+          </p:cNvPr>
+          <p:cNvSpPr>
+            <a:spLocks noGrp="1"/>
+          </p:cNvSpPr>
+          <p:nvPr>
+            <p:ph idx="1"/>
+          </p:nvPr>
+        </p:nvSpPr>
+        <p:spPr/>
+        <p:txBody>
+          <a:bodyPr/>
+          <a:lstStyle/>
+          <a:p>
+            <a:r>
+              <a:rPr lang="zh-TW" altLang="en-US" dirty="0">
+                <a:latin typeface="標楷體" panose="03000509000000000000" pitchFamily="65" charset="-120"/>
+                <a:ea typeface="標楷體" panose="03000509000000000000" pitchFamily="65" charset="-120"/>
+              </a:rPr>
+              <a:t>分成三種 </a:t>
+            </a:r>
+            <a:r>
+              <a:rPr lang="en-US" altLang="zh-TW" dirty="0">
+                <a:latin typeface="標楷體" panose="03000509000000000000" pitchFamily="65" charset="-120"/>
+                <a:ea typeface="標楷體" panose="03000509000000000000" pitchFamily="65" charset="-120"/>
+              </a:rPr>
+              <a:t>if-else</a:t>
+            </a:r>
+          </a:p>
+          <a:p>
+            <a:pPr marL="971550" lvl="1" indent="-514350">
+              <a:buFont typeface="+mj-lt"/>
+              <a:buAutoNum type="arabicPeriod"/>
+            </a:pPr>
+            <a:r>
+              <a:rPr lang="en-US" altLang="zh-TW" dirty="0">
+                <a:latin typeface="標楷體" panose="03000509000000000000" pitchFamily="65" charset="-120"/>
+                <a:ea typeface="標楷體" panose="03000509000000000000" pitchFamily="65" charset="-120"/>
+              </a:rPr>
+              <a:t>unique-if</a:t>
+            </a:r>
+          </a:p>
+          <a:p>
+            <a:pPr lvl="2"/>
+            <a:r>
+              <a:rPr lang="zh-TW" altLang="en-US" dirty="0">
+                <a:latin typeface="標楷體" panose="03000509000000000000" pitchFamily="65" charset="-120"/>
+                <a:ea typeface="標楷體" panose="03000509000000000000" pitchFamily="65" charset="-120"/>
+              </a:rPr>
+              <a:t>如果設計要求條件互斥且</a:t>
+            </a:r>
+            <a:r>
+              <a:rPr lang="zh-TW" altLang="en-US" dirty="0">
+                <a:solidFill>
+                  <a:srgbClr val="FF0000"/>
+                </a:solidFill>
+                <a:latin typeface="標楷體" panose="03000509000000000000" pitchFamily="65" charset="-120"/>
+                <a:ea typeface="標楷體" panose="03000509000000000000" pitchFamily="65" charset="-120"/>
+              </a:rPr>
+              <a:t>必須有一個分支執行</a:t>
+            </a:r>
+            <a:endParaRPr lang="en-US" altLang="zh-TW" dirty="0">
+              <a:solidFill>
+                <a:srgbClr val="FF0000"/>
+              </a:solidFill>
+              <a:latin typeface="標楷體" panose="03000509000000000000" pitchFamily="65" charset="-120"/>
+              <a:ea typeface="標楷體" panose="03000509000000000000" pitchFamily="65" charset="-120"/>
+            </a:endParaRPr>
+          </a:p>
+          <a:p>
+            <a:pPr marL="971550" lvl="1" indent="-514350">
+              <a:buFont typeface="+mj-lt"/>
+              <a:buAutoNum type="arabicPeriod"/>
+            </a:pPr>
+            <a:r>
+              <a:rPr lang="en-US" altLang="zh-TW" dirty="0">
+                <a:latin typeface="標楷體" panose="03000509000000000000" pitchFamily="65" charset="-120"/>
+                <a:ea typeface="標楷體" panose="03000509000000000000" pitchFamily="65" charset="-120"/>
+              </a:rPr>
+              <a:t>unique0-if</a:t>
+            </a:r>
+          </a:p>
+          <a:p>
+            <a:pPr lvl="2"/>
+            <a:r>
+              <a:rPr lang="zh-TW" altLang="en-US" dirty="0">
+                <a:latin typeface="標楷體" panose="03000509000000000000" pitchFamily="65" charset="-120"/>
+                <a:ea typeface="標楷體" panose="03000509000000000000" pitchFamily="65" charset="-120"/>
+              </a:rPr>
+              <a:t>如果設計要求條件互斥但</a:t>
+            </a:r>
+            <a:r>
+              <a:rPr lang="zh-TW" altLang="en-US" dirty="0">
+                <a:solidFill>
+                  <a:srgbClr val="FF0000"/>
+                </a:solidFill>
+                <a:latin typeface="標楷體" panose="03000509000000000000" pitchFamily="65" charset="-120"/>
+                <a:ea typeface="標楷體" panose="03000509000000000000" pitchFamily="65" charset="-120"/>
+              </a:rPr>
+              <a:t>允許無匹配的情況</a:t>
+            </a:r>
+            <a:endParaRPr lang="en-US" altLang="zh-TW" dirty="0">
+              <a:solidFill>
+                <a:srgbClr val="FF0000"/>
+              </a:solidFill>
+              <a:latin typeface="標楷體" panose="03000509000000000000" pitchFamily="65" charset="-120"/>
+              <a:ea typeface="標楷體" panose="03000509000000000000" pitchFamily="65" charset="-120"/>
+            </a:endParaRPr>
+          </a:p>
+          <a:p>
+            <a:pPr marL="971550" lvl="1" indent="-514350">
+              <a:buFont typeface="+mj-lt"/>
+              <a:buAutoNum type="arabicPeriod"/>
+            </a:pPr>
+            <a:r>
+              <a:rPr lang="en-US" altLang="zh-TW" dirty="0">
+                <a:latin typeface="標楷體" panose="03000509000000000000" pitchFamily="65" charset="-120"/>
+                <a:ea typeface="標楷體" panose="03000509000000000000" pitchFamily="65" charset="-120"/>
+              </a:rPr>
+              <a:t>priority-if</a:t>
+            </a:r>
+          </a:p>
+          <a:p>
+            <a:pPr lvl="2"/>
+            <a:r>
+              <a:rPr lang="zh-TW" altLang="en-US" dirty="0">
+                <a:latin typeface="標楷體" panose="03000509000000000000" pitchFamily="65" charset="-120"/>
+                <a:ea typeface="標楷體" panose="03000509000000000000" pitchFamily="65" charset="-120"/>
+              </a:rPr>
+              <a:t>如果設計需要明確的優先級（條件可能重疊）</a:t>
+            </a:r>
+          </a:p>
+        </p:txBody>
+      </p:sp>
+    </p:spTree>
+    <p:extLst>
+      <p:ext uri="{BB962C8B-B14F-4D97-AF65-F5344CB8AC3E}">
+        <p14:creationId xmlns:p14="http://schemas.microsoft.com/office/powerpoint/2010/main" val="3349485263"/>
+      </p:ext>
+    </p:extLst>
+  </p:cSld>
+  <p:clrMapOvr>
+    <a:masterClrMapping/>
+  </p:clrMapOvr>
+</p:sld>
+</file>
+
+<file path=ppt/slides/slide28.xml><?xml version="1.0" encoding="utf-8"?>
+<p:sld xmlns:a="http://schemas.openxmlformats.org/drawingml/2006/main" xmlns:r="http://schemas.openxmlformats.org/officeDocument/2006/relationships" xmlns:p="http://schemas.openxmlformats.org/presentationml/2006/main">
+  <p:cSld>
+    <p:spTree>
+      <p:nvGrpSpPr>
+        <p:cNvPr id="1" name="">
+          <a:extLst>
+            <a:ext uri="{FF2B5EF4-FFF2-40B4-BE49-F238E27FC236}">
+              <a16:creationId xmlns:a16="http://schemas.microsoft.com/office/drawing/2014/main" id="{B4CD9330-CF62-46D4-FE2A-66D3CDF8F093}"/>
+            </a:ext>
+          </a:extLst>
+        </p:cNvPr>
+        <p:cNvGrpSpPr/>
+        <p:nvPr/>
+      </p:nvGrpSpPr>
+      <p:grpSpPr>
+        <a:xfrm>
+          <a:off x="0" y="0"/>
+          <a:ext cx="0" cy="0"/>
+          <a:chOff x="0" y="0"/>
+          <a:chExt cx="0" cy="0"/>
+        </a:xfrm>
+      </p:grpSpPr>
+      <p:sp>
+        <p:nvSpPr>
+          <p:cNvPr id="2" name="標題 1">
+            <a:extLst>
+              <a:ext uri="{FF2B5EF4-FFF2-40B4-BE49-F238E27FC236}">
+                <a16:creationId xmlns:a16="http://schemas.microsoft.com/office/drawing/2014/main" id="{5EDA8297-BB63-21A9-C936-65BA2733AEDB}"/>
+              </a:ext>
+            </a:extLst>
+          </p:cNvPr>
+          <p:cNvSpPr>
+            <a:spLocks noGrp="1"/>
+          </p:cNvSpPr>
+          <p:nvPr>
+            <p:ph type="title"/>
+          </p:nvPr>
+        </p:nvSpPr>
+        <p:spPr/>
+        <p:txBody>
+          <a:bodyPr/>
+          <a:lstStyle/>
+          <a:p>
+            <a:r>
+              <a:rPr lang="en-US" altLang="zh-TW" dirty="0"/>
+              <a:t>Types of if-else statement (2/2)</a:t>
+            </a:r>
+            <a:endParaRPr lang="zh-TW" altLang="en-US" dirty="0"/>
+          </a:p>
+        </p:txBody>
+      </p:sp>
+      <p:graphicFrame>
+        <p:nvGraphicFramePr>
+          <p:cNvPr id="3" name="內容版面配置區 2">
+            <a:extLst>
+              <a:ext uri="{FF2B5EF4-FFF2-40B4-BE49-F238E27FC236}">
+                <a16:creationId xmlns:a16="http://schemas.microsoft.com/office/drawing/2014/main" id="{6B0C8CE8-6761-8C06-B857-F9FF791CFC44}"/>
+              </a:ext>
+            </a:extLst>
+          </p:cNvPr>
+          <p:cNvGraphicFramePr>
+            <a:graphicFrameLocks noGrp="1"/>
+          </p:cNvGraphicFramePr>
+          <p:nvPr>
+            <p:ph idx="1"/>
+            <p:extLst>
+              <p:ext uri="{D42A27DB-BD31-4B8C-83A1-F6EECF244321}">
+                <p14:modId xmlns:p14="http://schemas.microsoft.com/office/powerpoint/2010/main" val="1092824365"/>
+              </p:ext>
+            </p:extLst>
+          </p:nvPr>
+        </p:nvGraphicFramePr>
+        <p:xfrm>
+          <a:off x="838200" y="2159431"/>
+          <a:ext cx="10515600" cy="3657600"/>
+        </p:xfrm>
+        <a:graphic>
+          <a:graphicData uri="http://schemas.openxmlformats.org/drawingml/2006/table">
+            <a:tbl>
+              <a:tblPr>
+                <a:tableStyleId>{3C2FFA5D-87B4-456A-9821-1D502468CF0F}</a:tableStyleId>
+              </a:tblPr>
+              <a:tblGrid>
+                <a:gridCol w="2628900">
+                  <a:extLst>
+                    <a:ext uri="{9D8B030D-6E8A-4147-A177-3AD203B41FA5}">
+                      <a16:colId xmlns:a16="http://schemas.microsoft.com/office/drawing/2014/main" val="4062575233"/>
+                    </a:ext>
+                  </a:extLst>
+                </a:gridCol>
+                <a:gridCol w="2628900">
+                  <a:extLst>
+                    <a:ext uri="{9D8B030D-6E8A-4147-A177-3AD203B41FA5}">
+                      <a16:colId xmlns:a16="http://schemas.microsoft.com/office/drawing/2014/main" val="4166921860"/>
+                    </a:ext>
+                  </a:extLst>
+                </a:gridCol>
+                <a:gridCol w="2628900">
+                  <a:extLst>
+                    <a:ext uri="{9D8B030D-6E8A-4147-A177-3AD203B41FA5}">
+                      <a16:colId xmlns:a16="http://schemas.microsoft.com/office/drawing/2014/main" val="1051170119"/>
+                    </a:ext>
+                  </a:extLst>
+                </a:gridCol>
+                <a:gridCol w="2628900">
+                  <a:extLst>
+                    <a:ext uri="{9D8B030D-6E8A-4147-A177-3AD203B41FA5}">
+                      <a16:colId xmlns:a16="http://schemas.microsoft.com/office/drawing/2014/main" val="2809639685"/>
+                    </a:ext>
+                  </a:extLst>
+                </a:gridCol>
+              </a:tblGrid>
+              <a:tr h="0">
+                <a:tc>
+                  <a:txBody>
+                    <a:bodyPr/>
+                    <a:lstStyle/>
+                    <a:p>
+                      <a:r>
+                        <a:rPr lang="zh-TW" altLang="en-US" dirty="0"/>
+                        <a:t>特性</a:t>
+                      </a:r>
+                      <a:endParaRPr lang="zh-TW" altLang="en-US" dirty="0">
+                        <a:latin typeface="標楷體" panose="03000509000000000000" pitchFamily="65" charset="-120"/>
+                        <a:ea typeface="標楷體" panose="03000509000000000000" pitchFamily="65" charset="-120"/>
+                      </a:endParaRPr>
+                    </a:p>
+                  </a:txBody>
+                  <a:tcPr anchor="ctr"/>
+                </a:tc>
+                <a:tc>
+                  <a:txBody>
+                    <a:bodyPr/>
+                    <a:lstStyle/>
+                    <a:p>
+                      <a:r>
+                        <a:rPr lang="en-US" dirty="0"/>
+                        <a:t>unique-if</a:t>
+                      </a:r>
+                      <a:endParaRPr lang="en-US" dirty="0">
+                        <a:latin typeface="標楷體" panose="03000509000000000000" pitchFamily="65" charset="-120"/>
+                        <a:ea typeface="標楷體" panose="03000509000000000000" pitchFamily="65" charset="-120"/>
+                      </a:endParaRPr>
+                    </a:p>
+                  </a:txBody>
+                  <a:tcPr anchor="ctr"/>
+                </a:tc>
+                <a:tc>
+                  <a:txBody>
+                    <a:bodyPr/>
+                    <a:lstStyle/>
+                    <a:p>
+                      <a:r>
+                        <a:rPr lang="en-US"/>
+                        <a:t>unique0-if</a:t>
+                      </a:r>
+                      <a:endParaRPr lang="en-US">
+                        <a:latin typeface="標楷體" panose="03000509000000000000" pitchFamily="65" charset="-120"/>
+                        <a:ea typeface="標楷體" panose="03000509000000000000" pitchFamily="65" charset="-120"/>
+                      </a:endParaRPr>
+                    </a:p>
+                  </a:txBody>
+                  <a:tcPr anchor="ctr"/>
+                </a:tc>
+                <a:tc>
+                  <a:txBody>
+                    <a:bodyPr/>
+                    <a:lstStyle/>
+                    <a:p>
+                      <a:r>
+                        <a:rPr lang="en-US"/>
+                        <a:t>priority-if</a:t>
+                      </a:r>
+                      <a:endParaRPr lang="en-US">
+                        <a:latin typeface="標楷體" panose="03000509000000000000" pitchFamily="65" charset="-120"/>
+                        <a:ea typeface="標楷體" panose="03000509000000000000" pitchFamily="65" charset="-120"/>
+                      </a:endParaRPr>
+                    </a:p>
+                  </a:txBody>
+                  <a:tcPr anchor="ctr"/>
+                </a:tc>
+                <a:extLst>
+                  <a:ext uri="{0D108BD9-81ED-4DB2-BD59-A6C34878D82A}">
+                    <a16:rowId xmlns:a16="http://schemas.microsoft.com/office/drawing/2014/main" val="3279298641"/>
+                  </a:ext>
+                </a:extLst>
+              </a:tr>
+              <a:tr h="0">
+                <a:tc>
+                  <a:txBody>
+                    <a:bodyPr/>
+                    <a:lstStyle/>
+                    <a:p>
+                      <a:r>
+                        <a:rPr lang="zh-TW" altLang="en-US" b="1" dirty="0">
+                          <a:effectLst/>
+                        </a:rPr>
+                        <a:t>條件互斥性</a:t>
+                      </a:r>
+                      <a:endParaRPr lang="zh-TW" altLang="en-US" dirty="0">
+                        <a:effectLst/>
+                        <a:latin typeface="標楷體" panose="03000509000000000000" pitchFamily="65" charset="-120"/>
+                        <a:ea typeface="標楷體" panose="03000509000000000000" pitchFamily="65" charset="-120"/>
+                      </a:endParaRPr>
+                    </a:p>
+                  </a:txBody>
+                  <a:tcPr anchor="ctr"/>
+                </a:tc>
+                <a:tc>
+                  <a:txBody>
+                    <a:bodyPr/>
+                    <a:lstStyle/>
+                    <a:p>
+                      <a:r>
+                        <a:rPr lang="zh-TW" altLang="en-US" dirty="0">
+                          <a:effectLst/>
+                        </a:rPr>
+                        <a:t>必須互斥</a:t>
+                      </a:r>
+                      <a:endParaRPr lang="zh-TW" altLang="en-US" dirty="0">
+                        <a:effectLst/>
+                        <a:latin typeface="標楷體" panose="03000509000000000000" pitchFamily="65" charset="-120"/>
+                        <a:ea typeface="標楷體" panose="03000509000000000000" pitchFamily="65" charset="-120"/>
+                      </a:endParaRPr>
+                    </a:p>
+                  </a:txBody>
+                  <a:tcPr anchor="ctr">
+                    <a:solidFill>
+                      <a:schemeClr val="bg1"/>
+                    </a:solidFill>
+                  </a:tcPr>
+                </a:tc>
+                <a:tc>
+                  <a:txBody>
+                    <a:bodyPr/>
+                    <a:lstStyle/>
+                    <a:p>
+                      <a:r>
+                        <a:rPr lang="zh-TW" altLang="en-US">
+                          <a:effectLst/>
+                        </a:rPr>
+                        <a:t>必須互斥</a:t>
+                      </a:r>
+                      <a:endParaRPr lang="zh-TW" altLang="en-US">
+                        <a:effectLst/>
+                        <a:latin typeface="標楷體" panose="03000509000000000000" pitchFamily="65" charset="-120"/>
+                        <a:ea typeface="標楷體" panose="03000509000000000000" pitchFamily="65" charset="-120"/>
+                      </a:endParaRPr>
+                    </a:p>
+                  </a:txBody>
+                  <a:tcPr anchor="ctr">
+                    <a:solidFill>
+                      <a:schemeClr val="bg1"/>
+                    </a:solidFill>
+                  </a:tcPr>
+                </a:tc>
+                <a:tc>
+                  <a:txBody>
+                    <a:bodyPr/>
+                    <a:lstStyle/>
+                    <a:p>
+                      <a:r>
+                        <a:rPr lang="zh-TW" altLang="en-US">
+                          <a:effectLst/>
+                        </a:rPr>
+                        <a:t>不要求互斥</a:t>
+                      </a:r>
+                      <a:endParaRPr lang="zh-TW" altLang="en-US">
+                        <a:effectLst/>
+                        <a:latin typeface="標楷體" panose="03000509000000000000" pitchFamily="65" charset="-120"/>
+                        <a:ea typeface="標楷體" panose="03000509000000000000" pitchFamily="65" charset="-120"/>
+                      </a:endParaRPr>
+                    </a:p>
+                  </a:txBody>
+                  <a:tcPr anchor="ctr">
+                    <a:solidFill>
+                      <a:schemeClr val="bg1"/>
+                    </a:solidFill>
+                  </a:tcPr>
+                </a:tc>
+                <a:extLst>
+                  <a:ext uri="{0D108BD9-81ED-4DB2-BD59-A6C34878D82A}">
+                    <a16:rowId xmlns:a16="http://schemas.microsoft.com/office/drawing/2014/main" val="3541248258"/>
+                  </a:ext>
+                </a:extLst>
+              </a:tr>
+              <a:tr h="0">
+                <a:tc>
+                  <a:txBody>
+                    <a:bodyPr/>
+                    <a:lstStyle/>
+                    <a:p>
+                      <a:r>
+                        <a:rPr lang="zh-TW" altLang="en-US" b="1">
+                          <a:effectLst/>
+                        </a:rPr>
+                        <a:t>多條件同時為真</a:t>
+                      </a:r>
+                      <a:endParaRPr lang="zh-TW" altLang="en-US">
+                        <a:effectLst/>
+                        <a:latin typeface="標楷體" panose="03000509000000000000" pitchFamily="65" charset="-120"/>
+                        <a:ea typeface="標楷體" panose="03000509000000000000" pitchFamily="65" charset="-120"/>
+                      </a:endParaRPr>
+                    </a:p>
+                  </a:txBody>
+                  <a:tcPr anchor="ctr"/>
+                </a:tc>
+                <a:tc>
+                  <a:txBody>
+                    <a:bodyPr/>
+                    <a:lstStyle/>
+                    <a:p>
+                      <a:r>
+                        <a:rPr lang="zh-TW" altLang="en-US" dirty="0">
+                          <a:effectLst/>
+                        </a:rPr>
+                        <a:t>報錯（違規）</a:t>
+                      </a:r>
+                      <a:endParaRPr lang="zh-TW" altLang="en-US" dirty="0">
+                        <a:effectLst/>
+                        <a:latin typeface="標楷體" panose="03000509000000000000" pitchFamily="65" charset="-120"/>
+                        <a:ea typeface="標楷體" panose="03000509000000000000" pitchFamily="65" charset="-120"/>
+                      </a:endParaRPr>
+                    </a:p>
+                  </a:txBody>
+                  <a:tcPr anchor="ctr">
+                    <a:solidFill>
+                      <a:schemeClr val="bg1"/>
+                    </a:solidFill>
+                  </a:tcPr>
+                </a:tc>
+                <a:tc>
+                  <a:txBody>
+                    <a:bodyPr/>
+                    <a:lstStyle/>
+                    <a:p>
+                      <a:r>
+                        <a:rPr lang="zh-TW" altLang="en-US" dirty="0">
+                          <a:effectLst/>
+                        </a:rPr>
+                        <a:t>報錯（違規）</a:t>
+                      </a:r>
+                      <a:endParaRPr lang="zh-TW" altLang="en-US" dirty="0">
+                        <a:effectLst/>
+                        <a:latin typeface="標楷體" panose="03000509000000000000" pitchFamily="65" charset="-120"/>
+                        <a:ea typeface="標楷體" panose="03000509000000000000" pitchFamily="65" charset="-120"/>
+                      </a:endParaRPr>
+                    </a:p>
+                  </a:txBody>
+                  <a:tcPr anchor="ctr">
+                    <a:solidFill>
+                      <a:schemeClr val="bg1"/>
+                    </a:solidFill>
+                  </a:tcPr>
+                </a:tc>
+                <a:tc>
+                  <a:txBody>
+                    <a:bodyPr/>
+                    <a:lstStyle/>
+                    <a:p>
+                      <a:r>
+                        <a:rPr lang="zh-TW" altLang="en-US">
+                          <a:effectLst/>
+                        </a:rPr>
+                        <a:t>按優先級執行第一個為真的分支</a:t>
+                      </a:r>
+                      <a:endParaRPr lang="zh-TW" altLang="en-US">
+                        <a:effectLst/>
+                        <a:latin typeface="標楷體" panose="03000509000000000000" pitchFamily="65" charset="-120"/>
+                        <a:ea typeface="標楷體" panose="03000509000000000000" pitchFamily="65" charset="-120"/>
+                      </a:endParaRPr>
+                    </a:p>
+                  </a:txBody>
+                  <a:tcPr anchor="ctr">
+                    <a:solidFill>
+                      <a:schemeClr val="bg1"/>
+                    </a:solidFill>
+                  </a:tcPr>
+                </a:tc>
+                <a:extLst>
+                  <a:ext uri="{0D108BD9-81ED-4DB2-BD59-A6C34878D82A}">
+                    <a16:rowId xmlns:a16="http://schemas.microsoft.com/office/drawing/2014/main" val="3346375611"/>
+                  </a:ext>
+                </a:extLst>
+              </a:tr>
+              <a:tr h="0">
+                <a:tc>
+                  <a:txBody>
+                    <a:bodyPr/>
+                    <a:lstStyle/>
+                    <a:p>
+                      <a:r>
+                        <a:rPr lang="zh-TW" altLang="en-US" b="1">
+                          <a:effectLst/>
+                        </a:rPr>
+                        <a:t>無條件為真</a:t>
+                      </a:r>
+                      <a:endParaRPr lang="zh-TW" altLang="en-US">
+                        <a:effectLst/>
+                        <a:latin typeface="標楷體" panose="03000509000000000000" pitchFamily="65" charset="-120"/>
+                        <a:ea typeface="標楷體" panose="03000509000000000000" pitchFamily="65" charset="-120"/>
+                      </a:endParaRPr>
+                    </a:p>
+                  </a:txBody>
+                  <a:tcPr anchor="ctr"/>
+                </a:tc>
+                <a:tc>
+                  <a:txBody>
+                    <a:bodyPr/>
+                    <a:lstStyle/>
+                    <a:p>
+                      <a:r>
+                        <a:rPr lang="zh-TW" altLang="en-US">
+                          <a:effectLst/>
+                        </a:rPr>
+                        <a:t>允許（執行 </a:t>
+                      </a:r>
+                      <a:r>
+                        <a:rPr lang="en-US" altLang="zh-TW">
+                          <a:effectLst/>
+                        </a:rPr>
+                        <a:t>else </a:t>
+                      </a:r>
+                      <a:r>
+                        <a:rPr lang="zh-TW" altLang="en-US">
+                          <a:effectLst/>
+                        </a:rPr>
+                        <a:t>或無動作）</a:t>
+                      </a:r>
+                      <a:endParaRPr lang="zh-TW" altLang="en-US">
+                        <a:effectLst/>
+                        <a:latin typeface="標楷體" panose="03000509000000000000" pitchFamily="65" charset="-120"/>
+                        <a:ea typeface="標楷體" panose="03000509000000000000" pitchFamily="65" charset="-120"/>
+                      </a:endParaRPr>
+                    </a:p>
+                  </a:txBody>
+                  <a:tcPr anchor="ctr">
+                    <a:solidFill>
+                      <a:schemeClr val="bg1"/>
+                    </a:solidFill>
+                  </a:tcPr>
+                </a:tc>
+                <a:tc>
+                  <a:txBody>
+                    <a:bodyPr/>
+                    <a:lstStyle/>
+                    <a:p>
+                      <a:r>
+                        <a:rPr lang="zh-TW" altLang="en-US" dirty="0">
+                          <a:effectLst/>
+                        </a:rPr>
+                        <a:t>允許（無動作）</a:t>
+                      </a:r>
+                      <a:endParaRPr lang="zh-TW" altLang="en-US" dirty="0">
+                        <a:effectLst/>
+                        <a:latin typeface="標楷體" panose="03000509000000000000" pitchFamily="65" charset="-120"/>
+                        <a:ea typeface="標楷體" panose="03000509000000000000" pitchFamily="65" charset="-120"/>
+                      </a:endParaRPr>
+                    </a:p>
+                  </a:txBody>
+                  <a:tcPr anchor="ctr">
+                    <a:solidFill>
+                      <a:schemeClr val="bg1"/>
+                    </a:solidFill>
+                  </a:tcPr>
+                </a:tc>
+                <a:tc>
+                  <a:txBody>
+                    <a:bodyPr/>
+                    <a:lstStyle/>
+                    <a:p>
+                      <a:r>
+                        <a:rPr lang="zh-TW" altLang="en-US" dirty="0">
+                          <a:effectLst/>
+                        </a:rPr>
+                        <a:t>允許（執行 </a:t>
+                      </a:r>
+                      <a:r>
+                        <a:rPr lang="en-US" altLang="zh-TW" dirty="0">
+                          <a:effectLst/>
+                        </a:rPr>
+                        <a:t>else </a:t>
+                      </a:r>
+                      <a:r>
+                        <a:rPr lang="zh-TW" altLang="en-US" dirty="0">
+                          <a:effectLst/>
+                        </a:rPr>
+                        <a:t>或無動作）</a:t>
+                      </a:r>
+                      <a:endParaRPr lang="zh-TW" altLang="en-US" dirty="0">
+                        <a:effectLst/>
+                        <a:latin typeface="標楷體" panose="03000509000000000000" pitchFamily="65" charset="-120"/>
+                        <a:ea typeface="標楷體" panose="03000509000000000000" pitchFamily="65" charset="-120"/>
+                      </a:endParaRPr>
+                    </a:p>
+                  </a:txBody>
+                  <a:tcPr anchor="ctr">
+                    <a:solidFill>
+                      <a:schemeClr val="bg1"/>
+                    </a:solidFill>
+                  </a:tcPr>
+                </a:tc>
+                <a:extLst>
+                  <a:ext uri="{0D108BD9-81ED-4DB2-BD59-A6C34878D82A}">
+                    <a16:rowId xmlns:a16="http://schemas.microsoft.com/office/drawing/2014/main" val="1753052823"/>
+                  </a:ext>
+                </a:extLst>
+              </a:tr>
+              <a:tr h="0">
+                <a:tc>
+                  <a:txBody>
+                    <a:bodyPr/>
+                    <a:lstStyle/>
+                    <a:p>
+                      <a:r>
+                        <a:rPr lang="zh-TW" altLang="en-US" b="1">
+                          <a:effectLst/>
+                        </a:rPr>
+                        <a:t>優先級</a:t>
+                      </a:r>
+                      <a:endParaRPr lang="zh-TW" altLang="en-US">
+                        <a:effectLst/>
+                        <a:latin typeface="標楷體" panose="03000509000000000000" pitchFamily="65" charset="-120"/>
+                        <a:ea typeface="標楷體" panose="03000509000000000000" pitchFamily="65" charset="-120"/>
+                      </a:endParaRPr>
+                    </a:p>
+                  </a:txBody>
+                  <a:tcPr anchor="ctr"/>
+                </a:tc>
+                <a:tc>
+                  <a:txBody>
+                    <a:bodyPr/>
+                    <a:lstStyle/>
+                    <a:p>
+                      <a:r>
+                        <a:rPr lang="zh-TW" altLang="en-US">
+                          <a:effectLst/>
+                        </a:rPr>
+                        <a:t>無優先級（假設互斥）</a:t>
+                      </a:r>
+                      <a:endParaRPr lang="zh-TW" altLang="en-US">
+                        <a:effectLst/>
+                        <a:latin typeface="標楷體" panose="03000509000000000000" pitchFamily="65" charset="-120"/>
+                        <a:ea typeface="標楷體" panose="03000509000000000000" pitchFamily="65" charset="-120"/>
+                      </a:endParaRPr>
+                    </a:p>
+                  </a:txBody>
+                  <a:tcPr anchor="ctr">
+                    <a:solidFill>
+                      <a:schemeClr val="bg1"/>
+                    </a:solidFill>
+                  </a:tcPr>
+                </a:tc>
+                <a:tc>
+                  <a:txBody>
+                    <a:bodyPr/>
+                    <a:lstStyle/>
+                    <a:p>
+                      <a:r>
+                        <a:rPr lang="zh-TW" altLang="en-US">
+                          <a:effectLst/>
+                        </a:rPr>
+                        <a:t>無優先級（假設互斥）</a:t>
+                      </a:r>
+                      <a:endParaRPr lang="zh-TW" altLang="en-US">
+                        <a:effectLst/>
+                        <a:latin typeface="標楷體" panose="03000509000000000000" pitchFamily="65" charset="-120"/>
+                        <a:ea typeface="標楷體" panose="03000509000000000000" pitchFamily="65" charset="-120"/>
+                      </a:endParaRPr>
+                    </a:p>
+                  </a:txBody>
+                  <a:tcPr anchor="ctr">
+                    <a:solidFill>
+                      <a:schemeClr val="bg1"/>
+                    </a:solidFill>
+                  </a:tcPr>
+                </a:tc>
+                <a:tc>
+                  <a:txBody>
+                    <a:bodyPr/>
+                    <a:lstStyle/>
+                    <a:p>
+                      <a:r>
+                        <a:rPr lang="zh-TW" altLang="en-US" dirty="0">
+                          <a:effectLst/>
+                        </a:rPr>
+                        <a:t>有明確優先級（從上到下）</a:t>
+                      </a:r>
+                      <a:endParaRPr lang="zh-TW" altLang="en-US" dirty="0">
+                        <a:effectLst/>
+                        <a:latin typeface="標楷體" panose="03000509000000000000" pitchFamily="65" charset="-120"/>
+                        <a:ea typeface="標楷體" panose="03000509000000000000" pitchFamily="65" charset="-120"/>
+                      </a:endParaRPr>
+                    </a:p>
+                  </a:txBody>
+                  <a:tcPr anchor="ctr">
+                    <a:solidFill>
+                      <a:schemeClr val="bg1"/>
+                    </a:solidFill>
+                  </a:tcPr>
+                </a:tc>
+                <a:extLst>
+                  <a:ext uri="{0D108BD9-81ED-4DB2-BD59-A6C34878D82A}">
+                    <a16:rowId xmlns:a16="http://schemas.microsoft.com/office/drawing/2014/main" val="4190139157"/>
+                  </a:ext>
+                </a:extLst>
+              </a:tr>
+              <a:tr h="0">
+                <a:tc>
+                  <a:txBody>
+                    <a:bodyPr/>
+                    <a:lstStyle/>
+                    <a:p>
+                      <a:r>
+                        <a:rPr lang="zh-TW" altLang="en-US" b="1">
+                          <a:effectLst/>
+                        </a:rPr>
+                        <a:t>典型應用</a:t>
+                      </a:r>
+                      <a:endParaRPr lang="zh-TW" altLang="en-US">
+                        <a:effectLst/>
+                        <a:latin typeface="標楷體" panose="03000509000000000000" pitchFamily="65" charset="-120"/>
+                        <a:ea typeface="標楷體" panose="03000509000000000000" pitchFamily="65" charset="-120"/>
+                      </a:endParaRPr>
+                    </a:p>
+                  </a:txBody>
+                  <a:tcPr anchor="ctr"/>
+                </a:tc>
+                <a:tc>
+                  <a:txBody>
+                    <a:bodyPr/>
+                    <a:lstStyle/>
+                    <a:p>
+                      <a:r>
+                        <a:rPr lang="zh-TW" altLang="en-US">
+                          <a:effectLst/>
+                        </a:rPr>
+                        <a:t>解碼器、互斥控制邏輯</a:t>
+                      </a:r>
+                      <a:endParaRPr lang="zh-TW" altLang="en-US">
+                        <a:effectLst/>
+                        <a:latin typeface="標楷體" panose="03000509000000000000" pitchFamily="65" charset="-120"/>
+                        <a:ea typeface="標楷體" panose="03000509000000000000" pitchFamily="65" charset="-120"/>
+                      </a:endParaRPr>
+                    </a:p>
+                  </a:txBody>
+                  <a:tcPr anchor="ctr">
+                    <a:solidFill>
+                      <a:schemeClr val="bg1"/>
+                    </a:solidFill>
+                  </a:tcPr>
+                </a:tc>
+                <a:tc>
+                  <a:txBody>
+                    <a:bodyPr/>
+                    <a:lstStyle/>
+                    <a:p>
+                      <a:r>
+                        <a:rPr lang="zh-TW" altLang="en-US">
+                          <a:effectLst/>
+                        </a:rPr>
+                        <a:t>靈活的互斥邏輯</a:t>
+                      </a:r>
+                      <a:endParaRPr lang="zh-TW" altLang="en-US">
+                        <a:effectLst/>
+                        <a:latin typeface="標楷體" panose="03000509000000000000" pitchFamily="65" charset="-120"/>
+                        <a:ea typeface="標楷體" panose="03000509000000000000" pitchFamily="65" charset="-120"/>
+                      </a:endParaRPr>
+                    </a:p>
+                  </a:txBody>
+                  <a:tcPr anchor="ctr">
+                    <a:solidFill>
+                      <a:schemeClr val="bg1"/>
+                    </a:solidFill>
+                  </a:tcPr>
+                </a:tc>
+                <a:tc>
+                  <a:txBody>
+                    <a:bodyPr/>
+                    <a:lstStyle/>
+                    <a:p>
+                      <a:r>
+                        <a:rPr lang="zh-TW" altLang="en-US" dirty="0">
+                          <a:effectLst/>
+                        </a:rPr>
+                        <a:t>優先級編碼器、仲裁器</a:t>
+                      </a:r>
+                      <a:endParaRPr lang="zh-TW" altLang="en-US" dirty="0">
+                        <a:effectLst/>
+                        <a:latin typeface="標楷體" panose="03000509000000000000" pitchFamily="65" charset="-120"/>
+                        <a:ea typeface="標楷體" panose="03000509000000000000" pitchFamily="65" charset="-120"/>
+                      </a:endParaRPr>
+                    </a:p>
+                  </a:txBody>
+                  <a:tcPr anchor="ctr">
+                    <a:solidFill>
+                      <a:schemeClr val="bg1"/>
+                    </a:solidFill>
+                  </a:tcPr>
+                </a:tc>
+                <a:extLst>
+                  <a:ext uri="{0D108BD9-81ED-4DB2-BD59-A6C34878D82A}">
+                    <a16:rowId xmlns:a16="http://schemas.microsoft.com/office/drawing/2014/main" val="2386249700"/>
+                  </a:ext>
+                </a:extLst>
+              </a:tr>
+              <a:tr h="0">
+                <a:tc>
+                  <a:txBody>
+                    <a:bodyPr/>
+                    <a:lstStyle/>
+                    <a:p>
+                      <a:r>
+                        <a:rPr lang="zh-TW" altLang="en-US" b="1" dirty="0">
+                          <a:effectLst/>
+                        </a:rPr>
+                        <a:t>綜合優化</a:t>
+                      </a:r>
+                      <a:endParaRPr lang="zh-TW" altLang="en-US" dirty="0">
+                        <a:effectLst/>
+                        <a:latin typeface="標楷體" panose="03000509000000000000" pitchFamily="65" charset="-120"/>
+                        <a:ea typeface="標楷體" panose="03000509000000000000" pitchFamily="65" charset="-120"/>
+                      </a:endParaRPr>
+                    </a:p>
+                  </a:txBody>
+                  <a:tcPr anchor="ctr"/>
+                </a:tc>
+                <a:tc>
+                  <a:txBody>
+                    <a:bodyPr/>
+                    <a:lstStyle/>
+                    <a:p>
+                      <a:r>
+                        <a:rPr lang="zh-TW" altLang="en-US">
+                          <a:effectLst/>
+                        </a:rPr>
+                        <a:t>假設互斥，可能生成更小電路</a:t>
+                      </a:r>
+                      <a:endParaRPr lang="zh-TW" altLang="en-US">
+                        <a:effectLst/>
+                        <a:latin typeface="標楷體" panose="03000509000000000000" pitchFamily="65" charset="-120"/>
+                        <a:ea typeface="標楷體" panose="03000509000000000000" pitchFamily="65" charset="-120"/>
+                      </a:endParaRPr>
+                    </a:p>
+                  </a:txBody>
+                  <a:tcPr anchor="ctr">
+                    <a:solidFill>
+                      <a:schemeClr val="bg1"/>
+                    </a:solidFill>
+                  </a:tcPr>
+                </a:tc>
+                <a:tc>
+                  <a:txBody>
+                    <a:bodyPr/>
+                    <a:lstStyle/>
+                    <a:p>
+                      <a:r>
+                        <a:rPr lang="zh-TW" altLang="en-US">
+                          <a:effectLst/>
+                        </a:rPr>
+                        <a:t>假設互斥，允許無匹配</a:t>
+                      </a:r>
+                      <a:endParaRPr lang="zh-TW" altLang="en-US">
+                        <a:effectLst/>
+                        <a:latin typeface="標楷體" panose="03000509000000000000" pitchFamily="65" charset="-120"/>
+                        <a:ea typeface="標楷體" panose="03000509000000000000" pitchFamily="65" charset="-120"/>
+                      </a:endParaRPr>
+                    </a:p>
+                  </a:txBody>
+                  <a:tcPr anchor="ctr">
+                    <a:solidFill>
+                      <a:schemeClr val="bg1"/>
+                    </a:solidFill>
+                  </a:tcPr>
+                </a:tc>
+                <a:tc>
+                  <a:txBody>
+                    <a:bodyPr/>
+                    <a:lstStyle/>
+                    <a:p>
+                      <a:r>
+                        <a:rPr lang="zh-TW" altLang="en-US" dirty="0">
+                          <a:effectLst/>
+                        </a:rPr>
+                        <a:t>生成優先級邏輯，可能更大電路</a:t>
+                      </a:r>
+                      <a:endParaRPr lang="zh-TW" altLang="en-US" dirty="0">
+                        <a:effectLst/>
+                        <a:latin typeface="標楷體" panose="03000509000000000000" pitchFamily="65" charset="-120"/>
+                        <a:ea typeface="標楷體" panose="03000509000000000000" pitchFamily="65" charset="-120"/>
+                      </a:endParaRPr>
+                    </a:p>
+                  </a:txBody>
+                  <a:tcPr anchor="ctr">
+                    <a:solidFill>
+                      <a:schemeClr val="bg1"/>
+                    </a:solidFill>
+                  </a:tcPr>
+                </a:tc>
+                <a:extLst>
+                  <a:ext uri="{0D108BD9-81ED-4DB2-BD59-A6C34878D82A}">
+                    <a16:rowId xmlns:a16="http://schemas.microsoft.com/office/drawing/2014/main" val="79167767"/>
+                  </a:ext>
+                </a:extLst>
+              </a:tr>
+            </a:tbl>
+          </a:graphicData>
+        </a:graphic>
+      </p:graphicFrame>
+    </p:spTree>
+    <p:extLst>
+      <p:ext uri="{BB962C8B-B14F-4D97-AF65-F5344CB8AC3E}">
+        <p14:creationId xmlns:p14="http://schemas.microsoft.com/office/powerpoint/2010/main" val="49674518"/>
+      </p:ext>
+    </p:extLst>
+  </p:cSld>
+  <p:clrMapOvr>
+    <a:masterClrMapping/>
+  </p:clrMapOvr>
+</p:sld>
+</file>
+
+<file path=ppt/slides/slide29.xml><?xml version="1.0" encoding="utf-8"?>
+<p:sld xmlns:a="http://schemas.openxmlformats.org/drawingml/2006/main" xmlns:r="http://schemas.openxmlformats.org/officeDocument/2006/relationships" xmlns:p="http://schemas.openxmlformats.org/presentationml/2006/main">
+  <p:cSld>
+    <p:spTree>
+      <p:nvGrpSpPr>
+        <p:cNvPr id="1" name="">
+          <a:extLst>
+            <a:ext uri="{FF2B5EF4-FFF2-40B4-BE49-F238E27FC236}">
+              <a16:creationId xmlns:a16="http://schemas.microsoft.com/office/drawing/2014/main" id="{74B13E4E-2440-8D30-9150-4C05670D724F}"/>
+            </a:ext>
+          </a:extLst>
+        </p:cNvPr>
+        <p:cNvGrpSpPr/>
+        <p:nvPr/>
+      </p:nvGrpSpPr>
+      <p:grpSpPr>
+        <a:xfrm>
+          <a:off x="0" y="0"/>
+          <a:ext cx="0" cy="0"/>
+          <a:chOff x="0" y="0"/>
+          <a:chExt cx="0" cy="0"/>
+        </a:xfrm>
+      </p:grpSpPr>
+      <p:sp>
+        <p:nvSpPr>
+          <p:cNvPr id="2" name="標題 1">
+            <a:extLst>
+              <a:ext uri="{FF2B5EF4-FFF2-40B4-BE49-F238E27FC236}">
+                <a16:creationId xmlns:a16="http://schemas.microsoft.com/office/drawing/2014/main" id="{8D62297A-CF91-04C3-C760-A0A76A01E119}"/>
+              </a:ext>
+            </a:extLst>
+          </p:cNvPr>
+          <p:cNvSpPr>
+            <a:spLocks noGrp="1"/>
+          </p:cNvSpPr>
+          <p:nvPr>
+            <p:ph type="title"/>
+          </p:nvPr>
+        </p:nvSpPr>
+        <p:spPr/>
+        <p:txBody>
+          <a:bodyPr>
+            <a:normAutofit/>
+          </a:bodyPr>
+          <a:lstStyle/>
+          <a:p>
+            <a:r>
+              <a:rPr lang="en-US" altLang="zh-TW" sz="3600" dirty="0"/>
+              <a:t>Blocking &amp; Non-Blocking assignment statement (1/2)</a:t>
+            </a:r>
+            <a:endParaRPr lang="zh-TW" altLang="en-US" sz="3600" dirty="0"/>
+          </a:p>
+        </p:txBody>
+      </p:sp>
+      <p:sp>
+        <p:nvSpPr>
+          <p:cNvPr id="4" name="內容版面配置區 3">
+            <a:extLst>
+              <a:ext uri="{FF2B5EF4-FFF2-40B4-BE49-F238E27FC236}">
+                <a16:creationId xmlns:a16="http://schemas.microsoft.com/office/drawing/2014/main" id="{FA41A0A4-526A-954F-A6B5-229295D93A07}"/>
+              </a:ext>
+            </a:extLst>
+          </p:cNvPr>
+          <p:cNvSpPr>
+            <a:spLocks noGrp="1"/>
+          </p:cNvSpPr>
+          <p:nvPr>
+            <p:ph idx="1"/>
+          </p:nvPr>
+        </p:nvSpPr>
+        <p:spPr/>
+        <p:txBody>
+          <a:bodyPr/>
+          <a:lstStyle/>
+          <a:p>
+            <a:r>
+              <a:rPr lang="zh-TW" altLang="en-US" dirty="0"/>
+              <a:t>賦值分為兩類</a:t>
+            </a:r>
+            <a:endParaRPr lang="en-US" altLang="zh-TW" dirty="0"/>
+          </a:p>
+          <a:p>
+            <a:pPr marL="971550" lvl="1" indent="-514350">
+              <a:buFont typeface="+mj-lt"/>
+              <a:buAutoNum type="arabicPeriod"/>
+            </a:pPr>
+            <a:r>
+              <a:rPr lang="zh-TW" altLang="en-US" dirty="0"/>
+              <a:t>阻塞賦值 </a:t>
+            </a:r>
+            <a:r>
+              <a:rPr lang="en-US" altLang="zh-TW" dirty="0"/>
+              <a:t>(Blocking Assignment) </a:t>
+            </a:r>
+          </a:p>
+          <a:p>
+            <a:pPr lvl="2"/>
+            <a:r>
+              <a:rPr lang="zh-TW" altLang="en-US" dirty="0"/>
+              <a:t>阻塞賦值是立即執行的，當前語句完成賦值後，才會執行下一條語句。</a:t>
+            </a:r>
+            <a:endParaRPr lang="en-US" altLang="zh-TW" dirty="0"/>
+          </a:p>
+          <a:p>
+            <a:pPr marL="971550" lvl="1" indent="-514350">
+              <a:buFont typeface="+mj-lt"/>
+              <a:buAutoNum type="arabicPeriod"/>
+            </a:pPr>
+            <a:r>
+              <a:rPr lang="zh-TW" altLang="en-US" dirty="0"/>
+              <a:t>非阻塞賦值 </a:t>
+            </a:r>
+            <a:r>
+              <a:rPr lang="en-US" altLang="zh-TW" dirty="0"/>
+              <a:t>(Non-Blocking Assignment)</a:t>
+            </a:r>
+          </a:p>
+          <a:p>
+            <a:pPr lvl="2"/>
+            <a:r>
+              <a:rPr lang="zh-TW" altLang="en-US" dirty="0"/>
+              <a:t>非阻塞賦值是延遲執行的，</a:t>
+            </a:r>
+            <a:br>
+              <a:rPr lang="en-US" altLang="zh-TW" dirty="0"/>
+            </a:br>
+            <a:r>
+              <a:rPr lang="zh-TW" altLang="en-US" dirty="0"/>
+              <a:t>賦值操作在當前模擬時間步（</a:t>
+            </a:r>
+            <a:r>
+              <a:rPr lang="en-US" altLang="zh-TW" dirty="0"/>
+              <a:t>time step</a:t>
+            </a:r>
+            <a:r>
+              <a:rPr lang="zh-TW" altLang="en-US" dirty="0"/>
+              <a:t>）的調度階段完成。</a:t>
+            </a:r>
+          </a:p>
+        </p:txBody>
+      </p:sp>
+    </p:spTree>
+    <p:extLst>
+      <p:ext uri="{BB962C8B-B14F-4D97-AF65-F5344CB8AC3E}">
+        <p14:creationId xmlns:p14="http://schemas.microsoft.com/office/powerpoint/2010/main" val="2997544188"/>
+      </p:ext>
+    </p:extLst>
+  </p:cSld>
+  <p:clrMapOvr>
+    <a:masterClrMapping/>
+  </p:clrMapOvr>
+</p:sld>
+</file>
+
 <file path=ppt/slides/slide3.xml><?xml version="1.0" encoding="utf-8"?>
 <p:sld xmlns:a="http://schemas.openxmlformats.org/drawingml/2006/main" xmlns:r="http://schemas.openxmlformats.org/officeDocument/2006/relationships" xmlns:p="http://schemas.openxmlformats.org/presentationml/2006/main">
   <p:cSld>
@@ -8929,6 +10118,1694 @@
     <p:extLst>
       <p:ext uri="{BB962C8B-B14F-4D97-AF65-F5344CB8AC3E}">
         <p14:creationId xmlns:p14="http://schemas.microsoft.com/office/powerpoint/2010/main" val="3558549456"/>
+      </p:ext>
+    </p:extLst>
+  </p:cSld>
+  <p:clrMapOvr>
+    <a:masterClrMapping/>
+  </p:clrMapOvr>
+</p:sld>
+</file>
+
+<file path=ppt/slides/slide30.xml><?xml version="1.0" encoding="utf-8"?>
+<p:sld xmlns:a="http://schemas.openxmlformats.org/drawingml/2006/main" xmlns:r="http://schemas.openxmlformats.org/officeDocument/2006/relationships" xmlns:p="http://schemas.openxmlformats.org/presentationml/2006/main">
+  <p:cSld>
+    <p:spTree>
+      <p:nvGrpSpPr>
+        <p:cNvPr id="1" name="">
+          <a:extLst>
+            <a:ext uri="{FF2B5EF4-FFF2-40B4-BE49-F238E27FC236}">
+              <a16:creationId xmlns:a16="http://schemas.microsoft.com/office/drawing/2014/main" id="{31C9084A-D001-8580-0A37-1BA5AE8DC865}"/>
+            </a:ext>
+          </a:extLst>
+        </p:cNvPr>
+        <p:cNvGrpSpPr/>
+        <p:nvPr/>
+      </p:nvGrpSpPr>
+      <p:grpSpPr>
+        <a:xfrm>
+          <a:off x="0" y="0"/>
+          <a:ext cx="0" cy="0"/>
+          <a:chOff x="0" y="0"/>
+          <a:chExt cx="0" cy="0"/>
+        </a:xfrm>
+      </p:grpSpPr>
+      <p:sp>
+        <p:nvSpPr>
+          <p:cNvPr id="2" name="標題 1">
+            <a:extLst>
+              <a:ext uri="{FF2B5EF4-FFF2-40B4-BE49-F238E27FC236}">
+                <a16:creationId xmlns:a16="http://schemas.microsoft.com/office/drawing/2014/main" id="{DC48EDD2-F9BD-1E64-2AE0-25DD88EC35B6}"/>
+              </a:ext>
+            </a:extLst>
+          </p:cNvPr>
+          <p:cNvSpPr>
+            <a:spLocks noGrp="1"/>
+          </p:cNvSpPr>
+          <p:nvPr>
+            <p:ph type="title"/>
+          </p:nvPr>
+        </p:nvSpPr>
+        <p:spPr/>
+        <p:txBody>
+          <a:bodyPr>
+            <a:normAutofit/>
+          </a:bodyPr>
+          <a:lstStyle/>
+          <a:p>
+            <a:r>
+              <a:rPr lang="en-US" altLang="zh-TW" sz="3600" dirty="0"/>
+              <a:t>Blocking &amp; Non-Blocking assignment statement (2/2)</a:t>
+            </a:r>
+            <a:endParaRPr lang="zh-TW" altLang="en-US" sz="3600" dirty="0"/>
+          </a:p>
+        </p:txBody>
+      </p:sp>
+      <p:graphicFrame>
+        <p:nvGraphicFramePr>
+          <p:cNvPr id="8" name="內容版面配置區 7">
+            <a:extLst>
+              <a:ext uri="{FF2B5EF4-FFF2-40B4-BE49-F238E27FC236}">
+                <a16:creationId xmlns:a16="http://schemas.microsoft.com/office/drawing/2014/main" id="{F2D1DC93-CEEF-5E76-2040-446F3D7259E2}"/>
+              </a:ext>
+            </a:extLst>
+          </p:cNvPr>
+          <p:cNvGraphicFramePr>
+            <a:graphicFrameLocks noGrp="1"/>
+          </p:cNvGraphicFramePr>
+          <p:nvPr>
+            <p:ph idx="1"/>
+            <p:extLst>
+              <p:ext uri="{D42A27DB-BD31-4B8C-83A1-F6EECF244321}">
+                <p14:modId xmlns:p14="http://schemas.microsoft.com/office/powerpoint/2010/main" val="1380537736"/>
+              </p:ext>
+            </p:extLst>
+          </p:nvPr>
+        </p:nvGraphicFramePr>
+        <p:xfrm>
+          <a:off x="838200" y="2466409"/>
+          <a:ext cx="10515600" cy="2926080"/>
+        </p:xfrm>
+        <a:graphic>
+          <a:graphicData uri="http://schemas.openxmlformats.org/drawingml/2006/table">
+            <a:tbl>
+              <a:tblPr>
+                <a:tableStyleId>{3C2FFA5D-87B4-456A-9821-1D502468CF0F}</a:tableStyleId>
+              </a:tblPr>
+              <a:tblGrid>
+                <a:gridCol w="1918063">
+                  <a:extLst>
+                    <a:ext uri="{9D8B030D-6E8A-4147-A177-3AD203B41FA5}">
+                      <a16:colId xmlns:a16="http://schemas.microsoft.com/office/drawing/2014/main" val="1891592324"/>
+                    </a:ext>
+                  </a:extLst>
+                </a:gridCol>
+                <a:gridCol w="4441371">
+                  <a:extLst>
+                    <a:ext uri="{9D8B030D-6E8A-4147-A177-3AD203B41FA5}">
+                      <a16:colId xmlns:a16="http://schemas.microsoft.com/office/drawing/2014/main" val="1858761629"/>
+                    </a:ext>
+                  </a:extLst>
+                </a:gridCol>
+                <a:gridCol w="4156166">
+                  <a:extLst>
+                    <a:ext uri="{9D8B030D-6E8A-4147-A177-3AD203B41FA5}">
+                      <a16:colId xmlns:a16="http://schemas.microsoft.com/office/drawing/2014/main" val="1351351421"/>
+                    </a:ext>
+                  </a:extLst>
+                </a:gridCol>
+              </a:tblGrid>
+              <a:tr h="0">
+                <a:tc>
+                  <a:txBody>
+                    <a:bodyPr/>
+                    <a:lstStyle/>
+                    <a:p>
+                      <a:r>
+                        <a:rPr lang="zh-TW" altLang="en-US"/>
+                        <a:t>特性</a:t>
+                      </a:r>
+                    </a:p>
+                  </a:txBody>
+                  <a:tcPr anchor="ctr"/>
+                </a:tc>
+                <a:tc>
+                  <a:txBody>
+                    <a:bodyPr/>
+                    <a:lstStyle/>
+                    <a:p>
+                      <a:pPr algn="ctr"/>
+                      <a:r>
+                        <a:rPr lang="zh-TW" altLang="en-US" dirty="0"/>
+                        <a:t>阻塞賦值 </a:t>
+                      </a:r>
+                      <a:r>
+                        <a:rPr lang="en-US" altLang="zh-TW" dirty="0"/>
+                        <a:t>(=)</a:t>
+                      </a:r>
+                    </a:p>
+                  </a:txBody>
+                  <a:tcPr anchor="ctr"/>
+                </a:tc>
+                <a:tc>
+                  <a:txBody>
+                    <a:bodyPr/>
+                    <a:lstStyle/>
+                    <a:p>
+                      <a:pPr algn="ctr"/>
+                      <a:r>
+                        <a:rPr lang="zh-TW" altLang="en-US"/>
+                        <a:t>非阻塞賦值 </a:t>
+                      </a:r>
+                      <a:r>
+                        <a:rPr lang="en-US" altLang="zh-TW"/>
+                        <a:t>(&lt;=)</a:t>
+                      </a:r>
+                    </a:p>
+                  </a:txBody>
+                  <a:tcPr anchor="ctr"/>
+                </a:tc>
+                <a:extLst>
+                  <a:ext uri="{0D108BD9-81ED-4DB2-BD59-A6C34878D82A}">
+                    <a16:rowId xmlns:a16="http://schemas.microsoft.com/office/drawing/2014/main" val="3981007323"/>
+                  </a:ext>
+                </a:extLst>
+              </a:tr>
+              <a:tr h="0">
+                <a:tc>
+                  <a:txBody>
+                    <a:bodyPr/>
+                    <a:lstStyle/>
+                    <a:p>
+                      <a:r>
+                        <a:rPr lang="zh-TW" altLang="en-US" b="1">
+                          <a:effectLst/>
+                        </a:rPr>
+                        <a:t>符號</a:t>
+                      </a:r>
+                      <a:endParaRPr lang="zh-TW" altLang="en-US">
+                        <a:effectLst/>
+                      </a:endParaRPr>
+                    </a:p>
+                  </a:txBody>
+                  <a:tcPr anchor="ctr"/>
+                </a:tc>
+                <a:tc>
+                  <a:txBody>
+                    <a:bodyPr/>
+                    <a:lstStyle/>
+                    <a:p>
+                      <a:pPr algn="ctr"/>
+                      <a:r>
+                        <a:rPr lang="en-US" altLang="zh-TW" dirty="0">
+                          <a:effectLst/>
+                        </a:rPr>
+                        <a:t>=</a:t>
+                      </a:r>
+                    </a:p>
+                  </a:txBody>
+                  <a:tcPr anchor="ctr">
+                    <a:solidFill>
+                      <a:schemeClr val="bg1"/>
+                    </a:solidFill>
+                  </a:tcPr>
+                </a:tc>
+                <a:tc>
+                  <a:txBody>
+                    <a:bodyPr/>
+                    <a:lstStyle/>
+                    <a:p>
+                      <a:pPr algn="ctr"/>
+                      <a:r>
+                        <a:rPr lang="en-US" altLang="zh-TW" dirty="0">
+                          <a:effectLst/>
+                        </a:rPr>
+                        <a:t>&lt;=</a:t>
+                      </a:r>
+                    </a:p>
+                  </a:txBody>
+                  <a:tcPr anchor="ctr">
+                    <a:solidFill>
+                      <a:schemeClr val="bg1"/>
+                    </a:solidFill>
+                  </a:tcPr>
+                </a:tc>
+                <a:extLst>
+                  <a:ext uri="{0D108BD9-81ED-4DB2-BD59-A6C34878D82A}">
+                    <a16:rowId xmlns:a16="http://schemas.microsoft.com/office/drawing/2014/main" val="3879712632"/>
+                  </a:ext>
+                </a:extLst>
+              </a:tr>
+              <a:tr h="0">
+                <a:tc>
+                  <a:txBody>
+                    <a:bodyPr/>
+                    <a:lstStyle/>
+                    <a:p>
+                      <a:r>
+                        <a:rPr lang="zh-TW" altLang="en-US" b="1">
+                          <a:effectLst/>
+                        </a:rPr>
+                        <a:t>執行時機</a:t>
+                      </a:r>
+                      <a:endParaRPr lang="zh-TW" altLang="en-US">
+                        <a:effectLst/>
+                      </a:endParaRPr>
+                    </a:p>
+                  </a:txBody>
+                  <a:tcPr anchor="ctr"/>
+                </a:tc>
+                <a:tc>
+                  <a:txBody>
+                    <a:bodyPr/>
+                    <a:lstStyle/>
+                    <a:p>
+                      <a:pPr algn="ctr"/>
+                      <a:r>
+                        <a:rPr lang="zh-TW" altLang="en-US" dirty="0">
+                          <a:effectLst/>
+                        </a:rPr>
+                        <a:t>立即執行</a:t>
+                      </a:r>
+                    </a:p>
+                  </a:txBody>
+                  <a:tcPr anchor="ctr">
+                    <a:solidFill>
+                      <a:schemeClr val="bg1"/>
+                    </a:solidFill>
+                  </a:tcPr>
+                </a:tc>
+                <a:tc>
+                  <a:txBody>
+                    <a:bodyPr/>
+                    <a:lstStyle/>
+                    <a:p>
+                      <a:pPr algn="ctr"/>
+                      <a:r>
+                        <a:rPr lang="zh-TW" altLang="en-US" dirty="0">
+                          <a:effectLst/>
+                        </a:rPr>
+                        <a:t>延遲到模擬時間步結束</a:t>
+                      </a:r>
+                    </a:p>
+                  </a:txBody>
+                  <a:tcPr anchor="ctr">
+                    <a:solidFill>
+                      <a:schemeClr val="bg1"/>
+                    </a:solidFill>
+                  </a:tcPr>
+                </a:tc>
+                <a:extLst>
+                  <a:ext uri="{0D108BD9-81ED-4DB2-BD59-A6C34878D82A}">
+                    <a16:rowId xmlns:a16="http://schemas.microsoft.com/office/drawing/2014/main" val="2045156624"/>
+                  </a:ext>
+                </a:extLst>
+              </a:tr>
+              <a:tr h="0">
+                <a:tc>
+                  <a:txBody>
+                    <a:bodyPr/>
+                    <a:lstStyle/>
+                    <a:p>
+                      <a:r>
+                        <a:rPr lang="zh-TW" altLang="en-US" b="1">
+                          <a:effectLst/>
+                        </a:rPr>
+                        <a:t>模擬行為</a:t>
+                      </a:r>
+                      <a:endParaRPr lang="zh-TW" altLang="en-US">
+                        <a:effectLst/>
+                      </a:endParaRPr>
+                    </a:p>
+                  </a:txBody>
+                  <a:tcPr anchor="ctr"/>
+                </a:tc>
+                <a:tc>
+                  <a:txBody>
+                    <a:bodyPr/>
+                    <a:lstStyle/>
+                    <a:p>
+                      <a:pPr algn="ctr"/>
+                      <a:r>
+                        <a:rPr lang="zh-TW" altLang="en-US">
+                          <a:effectLst/>
+                        </a:rPr>
+                        <a:t>順序執行，立即更新變數</a:t>
+                      </a:r>
+                    </a:p>
+                  </a:txBody>
+                  <a:tcPr anchor="ctr">
+                    <a:solidFill>
+                      <a:schemeClr val="bg1"/>
+                    </a:solidFill>
+                  </a:tcPr>
+                </a:tc>
+                <a:tc>
+                  <a:txBody>
+                    <a:bodyPr/>
+                    <a:lstStyle/>
+                    <a:p>
+                      <a:pPr algn="ctr"/>
+                      <a:r>
+                        <a:rPr lang="zh-TW" altLang="en-US" dirty="0">
+                          <a:effectLst/>
+                        </a:rPr>
+                        <a:t>並行執行，所有更新同時發生</a:t>
+                      </a:r>
+                    </a:p>
+                  </a:txBody>
+                  <a:tcPr anchor="ctr">
+                    <a:solidFill>
+                      <a:schemeClr val="bg1"/>
+                    </a:solidFill>
+                  </a:tcPr>
+                </a:tc>
+                <a:extLst>
+                  <a:ext uri="{0D108BD9-81ED-4DB2-BD59-A6C34878D82A}">
+                    <a16:rowId xmlns:a16="http://schemas.microsoft.com/office/drawing/2014/main" val="3279167946"/>
+                  </a:ext>
+                </a:extLst>
+              </a:tr>
+              <a:tr h="0">
+                <a:tc>
+                  <a:txBody>
+                    <a:bodyPr/>
+                    <a:lstStyle/>
+                    <a:p>
+                      <a:r>
+                        <a:rPr lang="zh-TW" altLang="en-US" b="1">
+                          <a:effectLst/>
+                        </a:rPr>
+                        <a:t>變數影響</a:t>
+                      </a:r>
+                      <a:endParaRPr lang="zh-TW" altLang="en-US">
+                        <a:effectLst/>
+                      </a:endParaRPr>
+                    </a:p>
+                  </a:txBody>
+                  <a:tcPr anchor="ctr"/>
+                </a:tc>
+                <a:tc>
+                  <a:txBody>
+                    <a:bodyPr/>
+                    <a:lstStyle/>
+                    <a:p>
+                      <a:pPr algn="ctr"/>
+                      <a:r>
+                        <a:rPr lang="zh-TW" altLang="en-US">
+                          <a:effectLst/>
+                        </a:rPr>
+                        <a:t>後續語句使用更新後的值</a:t>
+                      </a:r>
+                    </a:p>
+                  </a:txBody>
+                  <a:tcPr anchor="ctr">
+                    <a:solidFill>
+                      <a:schemeClr val="bg1"/>
+                    </a:solidFill>
+                  </a:tcPr>
+                </a:tc>
+                <a:tc>
+                  <a:txBody>
+                    <a:bodyPr/>
+                    <a:lstStyle/>
+                    <a:p>
+                      <a:pPr algn="ctr"/>
+                      <a:r>
+                        <a:rPr lang="zh-TW" altLang="en-US" dirty="0">
+                          <a:effectLst/>
+                        </a:rPr>
+                        <a:t>後續語句使用舊值</a:t>
+                      </a:r>
+                    </a:p>
+                  </a:txBody>
+                  <a:tcPr anchor="ctr">
+                    <a:solidFill>
+                      <a:schemeClr val="bg1"/>
+                    </a:solidFill>
+                  </a:tcPr>
+                </a:tc>
+                <a:extLst>
+                  <a:ext uri="{0D108BD9-81ED-4DB2-BD59-A6C34878D82A}">
+                    <a16:rowId xmlns:a16="http://schemas.microsoft.com/office/drawing/2014/main" val="530303401"/>
+                  </a:ext>
+                </a:extLst>
+              </a:tr>
+              <a:tr h="0">
+                <a:tc>
+                  <a:txBody>
+                    <a:bodyPr/>
+                    <a:lstStyle/>
+                    <a:p>
+                      <a:r>
+                        <a:rPr lang="zh-TW" altLang="en-US" b="1">
+                          <a:effectLst/>
+                        </a:rPr>
+                        <a:t>典型應用</a:t>
+                      </a:r>
+                      <a:endParaRPr lang="zh-TW" altLang="en-US">
+                        <a:effectLst/>
+                      </a:endParaRPr>
+                    </a:p>
+                  </a:txBody>
+                  <a:tcPr anchor="ctr"/>
+                </a:tc>
+                <a:tc>
+                  <a:txBody>
+                    <a:bodyPr/>
+                    <a:lstStyle/>
+                    <a:p>
+                      <a:pPr algn="ctr"/>
+                      <a:r>
+                        <a:rPr lang="zh-TW" altLang="en-US">
+                          <a:effectLst/>
+                        </a:rPr>
+                        <a:t>組合邏輯（</a:t>
+                      </a:r>
+                      <a:r>
+                        <a:rPr lang="en-US">
+                          <a:effectLst/>
+                        </a:rPr>
+                        <a:t>always_comb）</a:t>
+                      </a:r>
+                    </a:p>
+                  </a:txBody>
+                  <a:tcPr anchor="ctr">
+                    <a:solidFill>
+                      <a:schemeClr val="bg1"/>
+                    </a:solidFill>
+                  </a:tcPr>
+                </a:tc>
+                <a:tc>
+                  <a:txBody>
+                    <a:bodyPr/>
+                    <a:lstStyle/>
+                    <a:p>
+                      <a:pPr algn="ctr"/>
+                      <a:r>
+                        <a:rPr lang="zh-TW" altLang="en-US" dirty="0">
+                          <a:effectLst/>
+                        </a:rPr>
+                        <a:t>時序邏輯（</a:t>
+                      </a:r>
+                      <a:r>
+                        <a:rPr lang="en-US" dirty="0" err="1">
+                          <a:effectLst/>
+                        </a:rPr>
+                        <a:t>always_ff</a:t>
+                      </a:r>
+                      <a:r>
+                        <a:rPr lang="en-US" dirty="0">
+                          <a:effectLst/>
+                        </a:rPr>
+                        <a:t>）</a:t>
+                      </a:r>
+                    </a:p>
+                  </a:txBody>
+                  <a:tcPr anchor="ctr">
+                    <a:solidFill>
+                      <a:schemeClr val="bg1"/>
+                    </a:solidFill>
+                  </a:tcPr>
+                </a:tc>
+                <a:extLst>
+                  <a:ext uri="{0D108BD9-81ED-4DB2-BD59-A6C34878D82A}">
+                    <a16:rowId xmlns:a16="http://schemas.microsoft.com/office/drawing/2014/main" val="2621723382"/>
+                  </a:ext>
+                </a:extLst>
+              </a:tr>
+              <a:tr h="0">
+                <a:tc>
+                  <a:txBody>
+                    <a:bodyPr/>
+                    <a:lstStyle/>
+                    <a:p>
+                      <a:r>
+                        <a:rPr lang="zh-TW" altLang="en-US" b="1">
+                          <a:effectLst/>
+                        </a:rPr>
+                        <a:t>硬體對應</a:t>
+                      </a:r>
+                      <a:endParaRPr lang="zh-TW" altLang="en-US">
+                        <a:effectLst/>
+                      </a:endParaRPr>
+                    </a:p>
+                  </a:txBody>
+                  <a:tcPr anchor="ctr"/>
+                </a:tc>
+                <a:tc>
+                  <a:txBody>
+                    <a:bodyPr/>
+                    <a:lstStyle/>
+                    <a:p>
+                      <a:pPr algn="ctr"/>
+                      <a:r>
+                        <a:rPr lang="zh-TW" altLang="en-US">
+                          <a:effectLst/>
+                        </a:rPr>
+                        <a:t>模擬連線或組合邏輯</a:t>
+                      </a:r>
+                    </a:p>
+                  </a:txBody>
+                  <a:tcPr anchor="ctr">
+                    <a:solidFill>
+                      <a:schemeClr val="bg1"/>
+                    </a:solidFill>
+                  </a:tcPr>
+                </a:tc>
+                <a:tc>
+                  <a:txBody>
+                    <a:bodyPr/>
+                    <a:lstStyle/>
+                    <a:p>
+                      <a:pPr algn="ctr"/>
+                      <a:r>
+                        <a:rPr lang="zh-TW" altLang="en-US" dirty="0">
+                          <a:effectLst/>
+                        </a:rPr>
+                        <a:t>模擬寄存器或觸發器</a:t>
+                      </a:r>
+                    </a:p>
+                  </a:txBody>
+                  <a:tcPr anchor="ctr">
+                    <a:solidFill>
+                      <a:schemeClr val="bg1"/>
+                    </a:solidFill>
+                  </a:tcPr>
+                </a:tc>
+                <a:extLst>
+                  <a:ext uri="{0D108BD9-81ED-4DB2-BD59-A6C34878D82A}">
+                    <a16:rowId xmlns:a16="http://schemas.microsoft.com/office/drawing/2014/main" val="1971322369"/>
+                  </a:ext>
+                </a:extLst>
+              </a:tr>
+              <a:tr h="0">
+                <a:tc>
+                  <a:txBody>
+                    <a:bodyPr/>
+                    <a:lstStyle/>
+                    <a:p>
+                      <a:r>
+                        <a:rPr lang="zh-TW" altLang="en-US" b="1">
+                          <a:effectLst/>
+                        </a:rPr>
+                        <a:t>潛在風險</a:t>
+                      </a:r>
+                      <a:endParaRPr lang="zh-TW" altLang="en-US">
+                        <a:effectLst/>
+                      </a:endParaRPr>
+                    </a:p>
+                  </a:txBody>
+                  <a:tcPr anchor="ctr"/>
+                </a:tc>
+                <a:tc>
+                  <a:txBody>
+                    <a:bodyPr/>
+                    <a:lstStyle/>
+                    <a:p>
+                      <a:pPr algn="ctr"/>
+                      <a:r>
+                        <a:rPr lang="zh-TW" altLang="en-US">
+                          <a:effectLst/>
+                        </a:rPr>
+                        <a:t>在時序邏輯中可能導致 </a:t>
+                      </a:r>
+                      <a:r>
+                        <a:rPr lang="en-US">
+                          <a:effectLst/>
+                        </a:rPr>
+                        <a:t>race condition</a:t>
+                      </a:r>
+                    </a:p>
+                  </a:txBody>
+                  <a:tcPr anchor="ctr">
+                    <a:solidFill>
+                      <a:schemeClr val="bg1"/>
+                    </a:solidFill>
+                  </a:tcPr>
+                </a:tc>
+                <a:tc>
+                  <a:txBody>
+                    <a:bodyPr/>
+                    <a:lstStyle/>
+                    <a:p>
+                      <a:pPr algn="ctr"/>
+                      <a:r>
+                        <a:rPr lang="zh-TW" altLang="en-US" dirty="0">
+                          <a:effectLst/>
+                        </a:rPr>
+                        <a:t>在組合邏輯中可能導致不必要延遲</a:t>
+                      </a:r>
+                    </a:p>
+                  </a:txBody>
+                  <a:tcPr anchor="ctr">
+                    <a:solidFill>
+                      <a:schemeClr val="bg1"/>
+                    </a:solidFill>
+                  </a:tcPr>
+                </a:tc>
+                <a:extLst>
+                  <a:ext uri="{0D108BD9-81ED-4DB2-BD59-A6C34878D82A}">
+                    <a16:rowId xmlns:a16="http://schemas.microsoft.com/office/drawing/2014/main" val="944193943"/>
+                  </a:ext>
+                </a:extLst>
+              </a:tr>
+            </a:tbl>
+          </a:graphicData>
+        </a:graphic>
+      </p:graphicFrame>
+    </p:spTree>
+    <p:extLst>
+      <p:ext uri="{BB962C8B-B14F-4D97-AF65-F5344CB8AC3E}">
+        <p14:creationId xmlns:p14="http://schemas.microsoft.com/office/powerpoint/2010/main" val="4202042436"/>
+      </p:ext>
+    </p:extLst>
+  </p:cSld>
+  <p:clrMapOvr>
+    <a:masterClrMapping/>
+  </p:clrMapOvr>
+</p:sld>
+</file>
+
+<file path=ppt/slides/slide31.xml><?xml version="1.0" encoding="utf-8"?>
+<p:sld xmlns:a="http://schemas.openxmlformats.org/drawingml/2006/main" xmlns:r="http://schemas.openxmlformats.org/officeDocument/2006/relationships" xmlns:p="http://schemas.openxmlformats.org/presentationml/2006/main">
+  <p:cSld>
+    <p:spTree>
+      <p:nvGrpSpPr>
+        <p:cNvPr id="1" name="">
+          <a:extLst>
+            <a:ext uri="{FF2B5EF4-FFF2-40B4-BE49-F238E27FC236}">
+              <a16:creationId xmlns:a16="http://schemas.microsoft.com/office/drawing/2014/main" id="{EE00125B-B640-54E5-2AA2-69D2AA8C7EAA}"/>
+            </a:ext>
+          </a:extLst>
+        </p:cNvPr>
+        <p:cNvGrpSpPr/>
+        <p:nvPr/>
+      </p:nvGrpSpPr>
+      <p:grpSpPr>
+        <a:xfrm>
+          <a:off x="0" y="0"/>
+          <a:ext cx="0" cy="0"/>
+          <a:chOff x="0" y="0"/>
+          <a:chExt cx="0" cy="0"/>
+        </a:xfrm>
+      </p:grpSpPr>
+      <p:sp>
+        <p:nvSpPr>
+          <p:cNvPr id="2" name="標題 1">
+            <a:extLst>
+              <a:ext uri="{FF2B5EF4-FFF2-40B4-BE49-F238E27FC236}">
+                <a16:creationId xmlns:a16="http://schemas.microsoft.com/office/drawing/2014/main" id="{ABCD1E13-904F-AC36-7145-DBE8749A759E}"/>
+              </a:ext>
+            </a:extLst>
+          </p:cNvPr>
+          <p:cNvSpPr>
+            <a:spLocks noGrp="1"/>
+          </p:cNvSpPr>
+          <p:nvPr>
+            <p:ph type="title"/>
+          </p:nvPr>
+        </p:nvSpPr>
+        <p:spPr/>
+        <p:txBody>
+          <a:bodyPr/>
+          <a:lstStyle/>
+          <a:p>
+            <a:r>
+              <a:rPr lang="en-US" altLang="zh-TW" dirty="0"/>
+              <a:t>Function &amp; Task </a:t>
+            </a:r>
+            <a:r>
+              <a:rPr lang="en-US" altLang="zh-TW"/>
+              <a:t>(1/2)</a:t>
+            </a:r>
+            <a:endParaRPr lang="zh-TW" altLang="en-US" dirty="0"/>
+          </a:p>
+        </p:txBody>
+      </p:sp>
+      <p:sp>
+        <p:nvSpPr>
+          <p:cNvPr id="4" name="內容版面配置區 3">
+            <a:extLst>
+              <a:ext uri="{FF2B5EF4-FFF2-40B4-BE49-F238E27FC236}">
+                <a16:creationId xmlns:a16="http://schemas.microsoft.com/office/drawing/2014/main" id="{C73DBF86-4806-58C3-B255-578731156CD4}"/>
+              </a:ext>
+            </a:extLst>
+          </p:cNvPr>
+          <p:cNvSpPr>
+            <a:spLocks noGrp="1"/>
+          </p:cNvSpPr>
+          <p:nvPr>
+            <p:ph idx="1"/>
+          </p:nvPr>
+        </p:nvSpPr>
+        <p:spPr/>
+        <p:txBody>
+          <a:bodyPr/>
+          <a:lstStyle/>
+          <a:p>
+            <a:r>
+              <a:rPr lang="en-US" altLang="zh-TW" dirty="0"/>
+              <a:t>Task</a:t>
+            </a:r>
+          </a:p>
+          <a:p>
+            <a:pPr lvl="1"/>
+            <a:r>
+              <a:rPr lang="zh-TW" altLang="en-US" dirty="0"/>
+              <a:t>可以消耗時間，使用</a:t>
+            </a:r>
+            <a:r>
+              <a:rPr lang="en-US" altLang="zh-TW" dirty="0"/>
+              <a:t>input, output, </a:t>
+            </a:r>
+            <a:r>
+              <a:rPr lang="en-US" altLang="zh-TW" dirty="0" err="1"/>
+              <a:t>inout</a:t>
+            </a:r>
+            <a:r>
+              <a:rPr lang="en-US" altLang="zh-TW" dirty="0"/>
+              <a:t> </a:t>
+            </a:r>
+            <a:r>
+              <a:rPr lang="zh-TW" altLang="en-US" dirty="0"/>
+              <a:t>來傳遞參數</a:t>
+            </a:r>
+            <a:endParaRPr lang="en-US" altLang="zh-TW" dirty="0"/>
+          </a:p>
+          <a:p>
+            <a:pPr lvl="1"/>
+            <a:r>
+              <a:rPr lang="zh-TW" altLang="en-US" dirty="0"/>
+              <a:t>沒有</a:t>
+            </a:r>
+            <a:r>
+              <a:rPr lang="en-US" altLang="zh-TW" dirty="0"/>
+              <a:t>return</a:t>
+            </a:r>
+            <a:r>
+              <a:rPr lang="zh-TW" altLang="en-US" dirty="0"/>
+              <a:t>值</a:t>
+            </a:r>
+            <a:endParaRPr lang="en-US" altLang="zh-TW" dirty="0"/>
+          </a:p>
+          <a:p>
+            <a:pPr lvl="1"/>
+            <a:endParaRPr lang="en-US" altLang="zh-TW" dirty="0"/>
+          </a:p>
+          <a:p>
+            <a:r>
+              <a:rPr lang="en-US" altLang="zh-TW" dirty="0"/>
+              <a:t>Function</a:t>
+            </a:r>
+          </a:p>
+          <a:p>
+            <a:pPr lvl="1"/>
+            <a:r>
+              <a:rPr lang="en-US" altLang="zh-TW" dirty="0"/>
+              <a:t>Function </a:t>
+            </a:r>
+            <a:r>
+              <a:rPr lang="zh-TW" altLang="en-US" dirty="0"/>
+              <a:t>不可以消耗時間，所以不能有以下時間控制</a:t>
+            </a:r>
+            <a:r>
+              <a:rPr lang="en-US" altLang="zh-TW" dirty="0"/>
+              <a:t>statements</a:t>
+            </a:r>
+          </a:p>
+          <a:p>
+            <a:pPr lvl="2"/>
+            <a:r>
+              <a:rPr lang="en-US" altLang="zh-TW" dirty="0"/>
+              <a:t>@, #, fork join, or wait</a:t>
+            </a:r>
+          </a:p>
+          <a:p>
+            <a:pPr lvl="1"/>
+            <a:r>
+              <a:rPr lang="en-US" altLang="zh-TW" dirty="0"/>
+              <a:t>Function</a:t>
+            </a:r>
+            <a:r>
+              <a:rPr lang="zh-TW" altLang="en-US" dirty="0"/>
+              <a:t>不能呼叫 </a:t>
+            </a:r>
+            <a:r>
+              <a:rPr lang="en-US" altLang="zh-TW" dirty="0"/>
+              <a:t>task</a:t>
+            </a:r>
+            <a:r>
+              <a:rPr lang="zh-TW" altLang="en-US" dirty="0"/>
+              <a:t>，因為 </a:t>
+            </a:r>
+            <a:r>
+              <a:rPr lang="en-US" altLang="zh-TW" dirty="0"/>
+              <a:t>task </a:t>
+            </a:r>
+            <a:r>
+              <a:rPr lang="zh-TW" altLang="en-US" dirty="0"/>
+              <a:t>可以消耗時間</a:t>
+            </a:r>
+            <a:endParaRPr lang="en-US" altLang="zh-TW" dirty="0"/>
+          </a:p>
+          <a:p>
+            <a:pPr lvl="1"/>
+            <a:endParaRPr lang="en-US" altLang="zh-TW" dirty="0"/>
+          </a:p>
+          <a:p>
+            <a:pPr lvl="1"/>
+            <a:endParaRPr lang="zh-TW" altLang="en-US" dirty="0"/>
+          </a:p>
+        </p:txBody>
+      </p:sp>
+    </p:spTree>
+    <p:extLst>
+      <p:ext uri="{BB962C8B-B14F-4D97-AF65-F5344CB8AC3E}">
+        <p14:creationId xmlns:p14="http://schemas.microsoft.com/office/powerpoint/2010/main" val="1428634424"/>
+      </p:ext>
+    </p:extLst>
+  </p:cSld>
+  <p:clrMapOvr>
+    <a:masterClrMapping/>
+  </p:clrMapOvr>
+</p:sld>
+</file>
+
+<file path=ppt/slides/slide32.xml><?xml version="1.0" encoding="utf-8"?>
+<p:sld xmlns:a="http://schemas.openxmlformats.org/drawingml/2006/main" xmlns:r="http://schemas.openxmlformats.org/officeDocument/2006/relationships" xmlns:p="http://schemas.openxmlformats.org/presentationml/2006/main">
+  <p:cSld>
+    <p:spTree>
+      <p:nvGrpSpPr>
+        <p:cNvPr id="1" name="">
+          <a:extLst>
+            <a:ext uri="{FF2B5EF4-FFF2-40B4-BE49-F238E27FC236}">
+              <a16:creationId xmlns:a16="http://schemas.microsoft.com/office/drawing/2014/main" id="{DA10FDD6-BAC4-6B2B-F173-428BDA97BC9C}"/>
+            </a:ext>
+          </a:extLst>
+        </p:cNvPr>
+        <p:cNvGrpSpPr/>
+        <p:nvPr/>
+      </p:nvGrpSpPr>
+      <p:grpSpPr>
+        <a:xfrm>
+          <a:off x="0" y="0"/>
+          <a:ext cx="0" cy="0"/>
+          <a:chOff x="0" y="0"/>
+          <a:chExt cx="0" cy="0"/>
+        </a:xfrm>
+      </p:grpSpPr>
+      <p:sp>
+        <p:nvSpPr>
+          <p:cNvPr id="2" name="標題 1">
+            <a:extLst>
+              <a:ext uri="{FF2B5EF4-FFF2-40B4-BE49-F238E27FC236}">
+                <a16:creationId xmlns:a16="http://schemas.microsoft.com/office/drawing/2014/main" id="{490421B0-EAD6-ED34-6602-5DEBAD693AB3}"/>
+              </a:ext>
+            </a:extLst>
+          </p:cNvPr>
+          <p:cNvSpPr>
+            <a:spLocks noGrp="1"/>
+          </p:cNvSpPr>
+          <p:nvPr>
+            <p:ph type="title"/>
+          </p:nvPr>
+        </p:nvSpPr>
+        <p:spPr/>
+        <p:txBody>
+          <a:bodyPr/>
+          <a:lstStyle/>
+          <a:p>
+            <a:r>
+              <a:rPr lang="en-US" altLang="zh-TW" dirty="0"/>
+              <a:t>Function &amp; Task (2/2)</a:t>
+            </a:r>
+            <a:endParaRPr lang="zh-TW" altLang="en-US" dirty="0"/>
+          </a:p>
+        </p:txBody>
+      </p:sp>
+      <p:graphicFrame>
+        <p:nvGraphicFramePr>
+          <p:cNvPr id="3" name="內容版面配置區 2">
+            <a:extLst>
+              <a:ext uri="{FF2B5EF4-FFF2-40B4-BE49-F238E27FC236}">
+                <a16:creationId xmlns:a16="http://schemas.microsoft.com/office/drawing/2014/main" id="{5EC1A54D-2706-07D6-4E6C-DC7FBD29FB7E}"/>
+              </a:ext>
+            </a:extLst>
+          </p:cNvPr>
+          <p:cNvGraphicFramePr>
+            <a:graphicFrameLocks noGrp="1"/>
+          </p:cNvGraphicFramePr>
+          <p:nvPr>
+            <p:ph idx="1"/>
+            <p:extLst>
+              <p:ext uri="{D42A27DB-BD31-4B8C-83A1-F6EECF244321}">
+                <p14:modId xmlns:p14="http://schemas.microsoft.com/office/powerpoint/2010/main" val="3337194851"/>
+              </p:ext>
+            </p:extLst>
+          </p:nvPr>
+        </p:nvGraphicFramePr>
+        <p:xfrm>
+          <a:off x="1190080" y="1816857"/>
+          <a:ext cx="9811839" cy="4395000"/>
+        </p:xfrm>
+        <a:graphic>
+          <a:graphicData uri="http://schemas.openxmlformats.org/drawingml/2006/table">
+            <a:tbl>
+              <a:tblPr>
+                <a:tableStyleId>{3C2FFA5D-87B4-456A-9821-1D502468CF0F}</a:tableStyleId>
+              </a:tblPr>
+              <a:tblGrid>
+                <a:gridCol w="3270613">
+                  <a:extLst>
+                    <a:ext uri="{9D8B030D-6E8A-4147-A177-3AD203B41FA5}">
+                      <a16:colId xmlns:a16="http://schemas.microsoft.com/office/drawing/2014/main" val="4236410290"/>
+                    </a:ext>
+                  </a:extLst>
+                </a:gridCol>
+                <a:gridCol w="3270613">
+                  <a:extLst>
+                    <a:ext uri="{9D8B030D-6E8A-4147-A177-3AD203B41FA5}">
+                      <a16:colId xmlns:a16="http://schemas.microsoft.com/office/drawing/2014/main" val="1031527539"/>
+                    </a:ext>
+                  </a:extLst>
+                </a:gridCol>
+                <a:gridCol w="3270613">
+                  <a:extLst>
+                    <a:ext uri="{9D8B030D-6E8A-4147-A177-3AD203B41FA5}">
+                      <a16:colId xmlns:a16="http://schemas.microsoft.com/office/drawing/2014/main" val="3293534543"/>
+                    </a:ext>
+                  </a:extLst>
+                </a:gridCol>
+              </a:tblGrid>
+              <a:tr h="341281">
+                <a:tc>
+                  <a:txBody>
+                    <a:bodyPr/>
+                    <a:lstStyle/>
+                    <a:p>
+                      <a:r>
+                        <a:rPr lang="zh-TW" altLang="en-US" sz="1700"/>
+                        <a:t>特性</a:t>
+                      </a:r>
+                    </a:p>
+                  </a:txBody>
+                  <a:tcPr marL="85320" marR="85320" marT="42660" marB="42660" anchor="ctr"/>
+                </a:tc>
+                <a:tc>
+                  <a:txBody>
+                    <a:bodyPr/>
+                    <a:lstStyle/>
+                    <a:p>
+                      <a:r>
+                        <a:rPr lang="en-US" sz="1700"/>
+                        <a:t>Function</a:t>
+                      </a:r>
+                    </a:p>
+                  </a:txBody>
+                  <a:tcPr marL="85320" marR="85320" marT="42660" marB="42660" anchor="ctr"/>
+                </a:tc>
+                <a:tc>
+                  <a:txBody>
+                    <a:bodyPr/>
+                    <a:lstStyle/>
+                    <a:p>
+                      <a:r>
+                        <a:rPr lang="en-US" sz="1700"/>
+                        <a:t>Task</a:t>
+                      </a:r>
+                    </a:p>
+                  </a:txBody>
+                  <a:tcPr marL="85320" marR="85320" marT="42660" marB="42660" anchor="ctr"/>
+                </a:tc>
+                <a:extLst>
+                  <a:ext uri="{0D108BD9-81ED-4DB2-BD59-A6C34878D82A}">
+                    <a16:rowId xmlns:a16="http://schemas.microsoft.com/office/drawing/2014/main" val="1040889488"/>
+                  </a:ext>
+                </a:extLst>
+              </a:tr>
+              <a:tr h="597242">
+                <a:tc>
+                  <a:txBody>
+                    <a:bodyPr/>
+                    <a:lstStyle/>
+                    <a:p>
+                      <a:r>
+                        <a:rPr lang="zh-TW" altLang="en-US" sz="1700" b="1">
+                          <a:effectLst/>
+                        </a:rPr>
+                        <a:t>模擬時間</a:t>
+                      </a:r>
+                      <a:endParaRPr lang="zh-TW" altLang="en-US" sz="1700">
+                        <a:effectLst/>
+                      </a:endParaRPr>
+                    </a:p>
+                  </a:txBody>
+                  <a:tcPr marL="85320" marR="85320" marT="42660" marB="42660" anchor="ctr"/>
+                </a:tc>
+                <a:tc>
+                  <a:txBody>
+                    <a:bodyPr/>
+                    <a:lstStyle/>
+                    <a:p>
+                      <a:r>
+                        <a:rPr lang="zh-TW" altLang="en-US" sz="1700" dirty="0">
+                          <a:effectLst/>
+                        </a:rPr>
+                        <a:t>不消耗模擬時間（立即執行）</a:t>
+                      </a:r>
+                    </a:p>
+                  </a:txBody>
+                  <a:tcPr marL="85320" marR="85320" marT="42660" marB="42660" anchor="ctr">
+                    <a:solidFill>
+                      <a:schemeClr val="bg1"/>
+                    </a:solidFill>
+                  </a:tcPr>
+                </a:tc>
+                <a:tc>
+                  <a:txBody>
+                    <a:bodyPr/>
+                    <a:lstStyle/>
+                    <a:p>
+                      <a:r>
+                        <a:rPr lang="zh-TW" altLang="en-US" sz="1700">
+                          <a:effectLst/>
+                        </a:rPr>
+                        <a:t>可以消耗模擬時間（支持延遲、等待）</a:t>
+                      </a:r>
+                    </a:p>
+                  </a:txBody>
+                  <a:tcPr marL="85320" marR="85320" marT="42660" marB="42660" anchor="ctr">
+                    <a:solidFill>
+                      <a:schemeClr val="bg1"/>
+                    </a:solidFill>
+                  </a:tcPr>
+                </a:tc>
+                <a:extLst>
+                  <a:ext uri="{0D108BD9-81ED-4DB2-BD59-A6C34878D82A}">
+                    <a16:rowId xmlns:a16="http://schemas.microsoft.com/office/drawing/2014/main" val="362553322"/>
+                  </a:ext>
+                </a:extLst>
+              </a:tr>
+              <a:tr h="597242">
+                <a:tc>
+                  <a:txBody>
+                    <a:bodyPr/>
+                    <a:lstStyle/>
+                    <a:p>
+                      <a:r>
+                        <a:rPr lang="zh-TW" altLang="en-US" sz="1700" b="1">
+                          <a:effectLst/>
+                        </a:rPr>
+                        <a:t>返回值</a:t>
+                      </a:r>
+                      <a:endParaRPr lang="zh-TW" altLang="en-US" sz="1700">
+                        <a:effectLst/>
+                      </a:endParaRPr>
+                    </a:p>
+                  </a:txBody>
+                  <a:tcPr marL="85320" marR="85320" marT="42660" marB="42660" anchor="ctr"/>
+                </a:tc>
+                <a:tc>
+                  <a:txBody>
+                    <a:bodyPr/>
+                    <a:lstStyle/>
+                    <a:p>
+                      <a:r>
+                        <a:rPr lang="zh-TW" altLang="en-US" sz="1700" dirty="0">
+                          <a:effectLst/>
+                        </a:rPr>
+                        <a:t>可以有返回值（默認為 </a:t>
+                      </a:r>
+                      <a:r>
+                        <a:rPr lang="en-US" sz="1700" dirty="0">
+                          <a:effectLst/>
+                        </a:rPr>
+                        <a:t>void）</a:t>
+                      </a:r>
+                    </a:p>
+                  </a:txBody>
+                  <a:tcPr marL="85320" marR="85320" marT="42660" marB="42660" anchor="ctr">
+                    <a:solidFill>
+                      <a:schemeClr val="bg1"/>
+                    </a:solidFill>
+                  </a:tcPr>
+                </a:tc>
+                <a:tc>
+                  <a:txBody>
+                    <a:bodyPr/>
+                    <a:lstStyle/>
+                    <a:p>
+                      <a:r>
+                        <a:rPr lang="zh-TW" altLang="en-US" sz="1700">
+                          <a:effectLst/>
+                        </a:rPr>
+                        <a:t>無返回值（僅通過 </a:t>
+                      </a:r>
+                      <a:r>
+                        <a:rPr lang="en-US" altLang="zh-TW" sz="1700">
+                          <a:effectLst/>
+                        </a:rPr>
+                        <a:t>output/inout </a:t>
+                      </a:r>
+                      <a:r>
+                        <a:rPr lang="zh-TW" altLang="en-US" sz="1700">
+                          <a:effectLst/>
+                        </a:rPr>
+                        <a:t>傳遞結果）</a:t>
+                      </a:r>
+                    </a:p>
+                  </a:txBody>
+                  <a:tcPr marL="85320" marR="85320" marT="42660" marB="42660" anchor="ctr">
+                    <a:solidFill>
+                      <a:schemeClr val="bg1"/>
+                    </a:solidFill>
+                  </a:tcPr>
+                </a:tc>
+                <a:extLst>
+                  <a:ext uri="{0D108BD9-81ED-4DB2-BD59-A6C34878D82A}">
+                    <a16:rowId xmlns:a16="http://schemas.microsoft.com/office/drawing/2014/main" val="2078316018"/>
+                  </a:ext>
+                </a:extLst>
+              </a:tr>
+              <a:tr h="341281">
+                <a:tc>
+                  <a:txBody>
+                    <a:bodyPr/>
+                    <a:lstStyle/>
+                    <a:p>
+                      <a:r>
+                        <a:rPr lang="zh-TW" altLang="en-US" sz="1700" b="1">
+                          <a:effectLst/>
+                        </a:rPr>
+                        <a:t>語法結構</a:t>
+                      </a:r>
+                      <a:endParaRPr lang="zh-TW" altLang="en-US" sz="1700">
+                        <a:effectLst/>
+                      </a:endParaRPr>
+                    </a:p>
+                  </a:txBody>
+                  <a:tcPr marL="85320" marR="85320" marT="42660" marB="42660" anchor="ctr"/>
+                </a:tc>
+                <a:tc>
+                  <a:txBody>
+                    <a:bodyPr/>
+                    <a:lstStyle/>
+                    <a:p>
+                      <a:r>
+                        <a:rPr lang="zh-TW" altLang="en-US" sz="1700">
+                          <a:effectLst/>
+                        </a:rPr>
+                        <a:t>使用 </a:t>
+                      </a:r>
+                      <a:r>
+                        <a:rPr lang="en-US" sz="1700">
+                          <a:effectLst/>
+                        </a:rPr>
+                        <a:t>function </a:t>
+                      </a:r>
+                      <a:r>
+                        <a:rPr lang="zh-TW" altLang="en-US" sz="1700">
+                          <a:effectLst/>
+                        </a:rPr>
+                        <a:t>和 </a:t>
+                      </a:r>
+                      <a:r>
+                        <a:rPr lang="en-US" sz="1700">
+                          <a:effectLst/>
+                        </a:rPr>
+                        <a:t>endfunction</a:t>
+                      </a:r>
+                    </a:p>
+                  </a:txBody>
+                  <a:tcPr marL="85320" marR="85320" marT="42660" marB="42660" anchor="ctr">
+                    <a:solidFill>
+                      <a:schemeClr val="bg1"/>
+                    </a:solidFill>
+                  </a:tcPr>
+                </a:tc>
+                <a:tc>
+                  <a:txBody>
+                    <a:bodyPr/>
+                    <a:lstStyle/>
+                    <a:p>
+                      <a:r>
+                        <a:rPr lang="zh-TW" altLang="en-US" sz="1700" dirty="0">
+                          <a:effectLst/>
+                        </a:rPr>
+                        <a:t>使用 </a:t>
+                      </a:r>
+                      <a:r>
+                        <a:rPr lang="en-US" sz="1700" dirty="0">
+                          <a:effectLst/>
+                        </a:rPr>
+                        <a:t>task </a:t>
+                      </a:r>
+                      <a:r>
+                        <a:rPr lang="zh-TW" altLang="en-US" sz="1700" dirty="0">
+                          <a:effectLst/>
+                        </a:rPr>
+                        <a:t>和 </a:t>
+                      </a:r>
+                      <a:r>
+                        <a:rPr lang="en-US" sz="1700" dirty="0" err="1">
+                          <a:effectLst/>
+                        </a:rPr>
+                        <a:t>endtask</a:t>
+                      </a:r>
+                      <a:endParaRPr lang="en-US" sz="1700" dirty="0">
+                        <a:effectLst/>
+                      </a:endParaRPr>
+                    </a:p>
+                  </a:txBody>
+                  <a:tcPr marL="85320" marR="85320" marT="42660" marB="42660" anchor="ctr">
+                    <a:solidFill>
+                      <a:schemeClr val="bg1"/>
+                    </a:solidFill>
+                  </a:tcPr>
+                </a:tc>
+                <a:extLst>
+                  <a:ext uri="{0D108BD9-81ED-4DB2-BD59-A6C34878D82A}">
+                    <a16:rowId xmlns:a16="http://schemas.microsoft.com/office/drawing/2014/main" val="3936878939"/>
+                  </a:ext>
+                </a:extLst>
+              </a:tr>
+              <a:tr h="597242">
+                <a:tc>
+                  <a:txBody>
+                    <a:bodyPr/>
+                    <a:lstStyle/>
+                    <a:p>
+                      <a:r>
+                        <a:rPr lang="zh-TW" altLang="en-US" sz="1700" b="1">
+                          <a:effectLst/>
+                        </a:rPr>
+                        <a:t>時序控制</a:t>
+                      </a:r>
+                      <a:endParaRPr lang="zh-TW" altLang="en-US" sz="1700">
+                        <a:effectLst/>
+                      </a:endParaRPr>
+                    </a:p>
+                  </a:txBody>
+                  <a:tcPr marL="85320" marR="85320" marT="42660" marB="42660" anchor="ctr"/>
+                </a:tc>
+                <a:tc>
+                  <a:txBody>
+                    <a:bodyPr/>
+                    <a:lstStyle/>
+                    <a:p>
+                      <a:r>
+                        <a:rPr lang="zh-TW" altLang="en-US" sz="1700">
+                          <a:effectLst/>
+                        </a:rPr>
+                        <a:t>不能包含時序控制語句（如 </a:t>
+                      </a:r>
+                      <a:r>
+                        <a:rPr lang="en-US" altLang="zh-TW" sz="1700">
+                          <a:effectLst/>
+                        </a:rPr>
+                        <a:t>#</a:t>
+                      </a:r>
+                      <a:r>
+                        <a:rPr lang="en-US" sz="1700">
+                          <a:effectLst/>
+                        </a:rPr>
+                        <a:t>delay, @(posedge clk)）</a:t>
+                      </a:r>
+                    </a:p>
+                  </a:txBody>
+                  <a:tcPr marL="85320" marR="85320" marT="42660" marB="42660" anchor="ctr">
+                    <a:solidFill>
+                      <a:schemeClr val="bg1"/>
+                    </a:solidFill>
+                  </a:tcPr>
+                </a:tc>
+                <a:tc>
+                  <a:txBody>
+                    <a:bodyPr/>
+                    <a:lstStyle/>
+                    <a:p>
+                      <a:r>
+                        <a:rPr lang="zh-TW" altLang="en-US" sz="1700" dirty="0">
+                          <a:effectLst/>
+                        </a:rPr>
+                        <a:t>可以包含時序控制語句</a:t>
+                      </a:r>
+                    </a:p>
+                  </a:txBody>
+                  <a:tcPr marL="85320" marR="85320" marT="42660" marB="42660" anchor="ctr">
+                    <a:solidFill>
+                      <a:schemeClr val="bg1"/>
+                    </a:solidFill>
+                  </a:tcPr>
+                </a:tc>
+                <a:extLst>
+                  <a:ext uri="{0D108BD9-81ED-4DB2-BD59-A6C34878D82A}">
+                    <a16:rowId xmlns:a16="http://schemas.microsoft.com/office/drawing/2014/main" val="2901754860"/>
+                  </a:ext>
+                </a:extLst>
+              </a:tr>
+              <a:tr h="597242">
+                <a:tc>
+                  <a:txBody>
+                    <a:bodyPr/>
+                    <a:lstStyle/>
+                    <a:p>
+                      <a:r>
+                        <a:rPr lang="zh-TW" altLang="en-US" sz="1700" b="1">
+                          <a:effectLst/>
+                        </a:rPr>
+                        <a:t>賦值類型</a:t>
+                      </a:r>
+                      <a:endParaRPr lang="zh-TW" altLang="en-US" sz="1700">
+                        <a:effectLst/>
+                      </a:endParaRPr>
+                    </a:p>
+                  </a:txBody>
+                  <a:tcPr marL="85320" marR="85320" marT="42660" marB="42660" anchor="ctr"/>
+                </a:tc>
+                <a:tc>
+                  <a:txBody>
+                    <a:bodyPr/>
+                    <a:lstStyle/>
+                    <a:p>
+                      <a:r>
+                        <a:rPr lang="zh-TW" altLang="en-US" sz="1700">
+                          <a:effectLst/>
+                        </a:rPr>
+                        <a:t>通常使用</a:t>
+                      </a:r>
+                      <a:r>
+                        <a:rPr lang="zh-TW" altLang="en-US" sz="1700" b="1">
+                          <a:effectLst/>
+                        </a:rPr>
+                        <a:t>阻塞賦值 </a:t>
+                      </a:r>
+                      <a:r>
+                        <a:rPr lang="en-US" altLang="zh-TW" sz="1700" b="1">
+                          <a:effectLst/>
+                        </a:rPr>
+                        <a:t>(=)</a:t>
+                      </a:r>
+                      <a:endParaRPr lang="zh-TW" altLang="en-US" sz="1700">
+                        <a:effectLst/>
+                      </a:endParaRPr>
+                    </a:p>
+                  </a:txBody>
+                  <a:tcPr marL="85320" marR="85320" marT="42660" marB="42660" anchor="ctr">
+                    <a:solidFill>
+                      <a:schemeClr val="bg1"/>
+                    </a:solidFill>
+                  </a:tcPr>
+                </a:tc>
+                <a:tc>
+                  <a:txBody>
+                    <a:bodyPr/>
+                    <a:lstStyle/>
+                    <a:p>
+                      <a:r>
+                        <a:rPr lang="zh-TW" altLang="en-US" sz="1700" dirty="0">
+                          <a:effectLst/>
+                        </a:rPr>
+                        <a:t>可以使用</a:t>
+                      </a:r>
+                      <a:r>
+                        <a:rPr lang="zh-TW" altLang="en-US" sz="1700" b="1" dirty="0">
+                          <a:effectLst/>
+                        </a:rPr>
+                        <a:t>阻塞 </a:t>
+                      </a:r>
+                      <a:r>
+                        <a:rPr lang="en-US" altLang="zh-TW" sz="1700" b="1" dirty="0">
+                          <a:effectLst/>
+                        </a:rPr>
+                        <a:t>(=) </a:t>
+                      </a:r>
+                      <a:r>
+                        <a:rPr lang="zh-TW" altLang="en-US" sz="1700" b="1" dirty="0">
+                          <a:effectLst/>
+                        </a:rPr>
+                        <a:t>或非阻塞 </a:t>
+                      </a:r>
+                      <a:r>
+                        <a:rPr lang="en-US" altLang="zh-TW" sz="1700" b="1" dirty="0">
+                          <a:effectLst/>
+                        </a:rPr>
+                        <a:t>(&lt;=)</a:t>
+                      </a:r>
+                      <a:r>
+                        <a:rPr lang="zh-TW" altLang="en-US" sz="1700" dirty="0">
+                          <a:effectLst/>
+                        </a:rPr>
+                        <a:t> 賦值</a:t>
+                      </a:r>
+                    </a:p>
+                  </a:txBody>
+                  <a:tcPr marL="85320" marR="85320" marT="42660" marB="42660" anchor="ctr">
+                    <a:solidFill>
+                      <a:schemeClr val="bg1"/>
+                    </a:solidFill>
+                  </a:tcPr>
+                </a:tc>
+                <a:extLst>
+                  <a:ext uri="{0D108BD9-81ED-4DB2-BD59-A6C34878D82A}">
+                    <a16:rowId xmlns:a16="http://schemas.microsoft.com/office/drawing/2014/main" val="2104303002"/>
+                  </a:ext>
+                </a:extLst>
+              </a:tr>
+              <a:tr h="341281">
+                <a:tc>
+                  <a:txBody>
+                    <a:bodyPr/>
+                    <a:lstStyle/>
+                    <a:p>
+                      <a:r>
+                        <a:rPr lang="zh-TW" altLang="en-US" sz="1700" b="1">
+                          <a:effectLst/>
+                        </a:rPr>
+                        <a:t>輸入</a:t>
+                      </a:r>
+                      <a:r>
+                        <a:rPr lang="en-US" altLang="zh-TW" sz="1700" b="1">
+                          <a:effectLst/>
+                        </a:rPr>
+                        <a:t>/</a:t>
+                      </a:r>
+                      <a:r>
+                        <a:rPr lang="zh-TW" altLang="en-US" sz="1700" b="1">
+                          <a:effectLst/>
+                        </a:rPr>
+                        <a:t>輸出</a:t>
+                      </a:r>
+                      <a:endParaRPr lang="zh-TW" altLang="en-US" sz="1700">
+                        <a:effectLst/>
+                      </a:endParaRPr>
+                    </a:p>
+                  </a:txBody>
+                  <a:tcPr marL="85320" marR="85320" marT="42660" marB="42660" anchor="ctr"/>
+                </a:tc>
+                <a:tc>
+                  <a:txBody>
+                    <a:bodyPr/>
+                    <a:lstStyle/>
+                    <a:p>
+                      <a:r>
+                        <a:rPr lang="zh-TW" altLang="en-US" sz="1700">
+                          <a:effectLst/>
+                        </a:rPr>
+                        <a:t>支持 </a:t>
+                      </a:r>
+                      <a:r>
+                        <a:rPr lang="en-US" sz="1700">
+                          <a:effectLst/>
+                        </a:rPr>
+                        <a:t>input、output、inout </a:t>
+                      </a:r>
+                      <a:r>
+                        <a:rPr lang="zh-TW" altLang="en-US" sz="1700">
+                          <a:effectLst/>
+                        </a:rPr>
+                        <a:t>參數</a:t>
+                      </a:r>
+                    </a:p>
+                  </a:txBody>
+                  <a:tcPr marL="85320" marR="85320" marT="42660" marB="42660" anchor="ctr">
+                    <a:solidFill>
+                      <a:schemeClr val="bg1"/>
+                    </a:solidFill>
+                  </a:tcPr>
+                </a:tc>
+                <a:tc>
+                  <a:txBody>
+                    <a:bodyPr/>
+                    <a:lstStyle/>
+                    <a:p>
+                      <a:r>
+                        <a:rPr lang="zh-TW" altLang="en-US" sz="1700">
+                          <a:effectLst/>
+                        </a:rPr>
+                        <a:t>支持 </a:t>
+                      </a:r>
+                      <a:r>
+                        <a:rPr lang="en-US" sz="1700">
+                          <a:effectLst/>
+                        </a:rPr>
+                        <a:t>input、output、inout </a:t>
+                      </a:r>
+                      <a:r>
+                        <a:rPr lang="zh-TW" altLang="en-US" sz="1700">
+                          <a:effectLst/>
+                        </a:rPr>
+                        <a:t>參數</a:t>
+                      </a:r>
+                    </a:p>
+                  </a:txBody>
+                  <a:tcPr marL="85320" marR="85320" marT="42660" marB="42660" anchor="ctr">
+                    <a:solidFill>
+                      <a:schemeClr val="bg1"/>
+                    </a:solidFill>
+                  </a:tcPr>
+                </a:tc>
+                <a:extLst>
+                  <a:ext uri="{0D108BD9-81ED-4DB2-BD59-A6C34878D82A}">
+                    <a16:rowId xmlns:a16="http://schemas.microsoft.com/office/drawing/2014/main" val="2567458254"/>
+                  </a:ext>
+                </a:extLst>
+              </a:tr>
+              <a:tr h="597242">
+                <a:tc>
+                  <a:txBody>
+                    <a:bodyPr/>
+                    <a:lstStyle/>
+                    <a:p>
+                      <a:r>
+                        <a:rPr lang="zh-TW" altLang="en-US" sz="1700" b="1">
+                          <a:effectLst/>
+                        </a:rPr>
+                        <a:t>調用場景</a:t>
+                      </a:r>
+                      <a:endParaRPr lang="zh-TW" altLang="en-US" sz="1700">
+                        <a:effectLst/>
+                      </a:endParaRPr>
+                    </a:p>
+                  </a:txBody>
+                  <a:tcPr marL="85320" marR="85320" marT="42660" marB="42660" anchor="ctr"/>
+                </a:tc>
+                <a:tc>
+                  <a:txBody>
+                    <a:bodyPr/>
+                    <a:lstStyle/>
+                    <a:p>
+                      <a:r>
+                        <a:rPr lang="zh-TW" altLang="en-US" sz="1700">
+                          <a:effectLst/>
+                        </a:rPr>
+                        <a:t>用於組合邏輯計算（例如數學運算、邏輯處理）</a:t>
+                      </a:r>
+                    </a:p>
+                  </a:txBody>
+                  <a:tcPr marL="85320" marR="85320" marT="42660" marB="42660" anchor="ctr">
+                    <a:solidFill>
+                      <a:schemeClr val="bg1"/>
+                    </a:solidFill>
+                  </a:tcPr>
+                </a:tc>
+                <a:tc>
+                  <a:txBody>
+                    <a:bodyPr/>
+                    <a:lstStyle/>
+                    <a:p>
+                      <a:r>
+                        <a:rPr lang="zh-TW" altLang="en-US" sz="1700" dirty="0">
+                          <a:effectLst/>
+                        </a:rPr>
+                        <a:t>用於時序邏輯或行為模擬（例如測試平台、協議實現）</a:t>
+                      </a:r>
+                    </a:p>
+                  </a:txBody>
+                  <a:tcPr marL="85320" marR="85320" marT="42660" marB="42660" anchor="ctr">
+                    <a:solidFill>
+                      <a:schemeClr val="bg1"/>
+                    </a:solidFill>
+                  </a:tcPr>
+                </a:tc>
+                <a:extLst>
+                  <a:ext uri="{0D108BD9-81ED-4DB2-BD59-A6C34878D82A}">
+                    <a16:rowId xmlns:a16="http://schemas.microsoft.com/office/drawing/2014/main" val="3348221552"/>
+                  </a:ext>
+                </a:extLst>
+              </a:tr>
+              <a:tr h="341281">
+                <a:tc>
+                  <a:txBody>
+                    <a:bodyPr/>
+                    <a:lstStyle/>
+                    <a:p>
+                      <a:r>
+                        <a:rPr lang="zh-TW" altLang="en-US" sz="1700" b="1">
+                          <a:effectLst/>
+                        </a:rPr>
+                        <a:t>執行範圍</a:t>
+                      </a:r>
+                      <a:endParaRPr lang="zh-TW" altLang="en-US" sz="1700">
+                        <a:effectLst/>
+                      </a:endParaRPr>
+                    </a:p>
+                  </a:txBody>
+                  <a:tcPr marL="85320" marR="85320" marT="42660" marB="42660" anchor="ctr"/>
+                </a:tc>
+                <a:tc>
+                  <a:txBody>
+                    <a:bodyPr/>
+                    <a:lstStyle/>
+                    <a:p>
+                      <a:r>
+                        <a:rPr lang="zh-TW" altLang="en-US" sz="1700">
+                          <a:effectLst/>
+                        </a:rPr>
+                        <a:t>必須在單個模擬時間步內完成</a:t>
+                      </a:r>
+                    </a:p>
+                  </a:txBody>
+                  <a:tcPr marL="85320" marR="85320" marT="42660" marB="42660" anchor="ctr">
+                    <a:solidFill>
+                      <a:schemeClr val="bg1"/>
+                    </a:solidFill>
+                  </a:tcPr>
+                </a:tc>
+                <a:tc>
+                  <a:txBody>
+                    <a:bodyPr/>
+                    <a:lstStyle/>
+                    <a:p>
+                      <a:r>
+                        <a:rPr lang="zh-TW" altLang="en-US" sz="1700" dirty="0">
+                          <a:effectLst/>
+                        </a:rPr>
+                        <a:t>可以跨多個模擬時間步執行</a:t>
+                      </a:r>
+                    </a:p>
+                  </a:txBody>
+                  <a:tcPr marL="85320" marR="85320" marT="42660" marB="42660" anchor="ctr">
+                    <a:solidFill>
+                      <a:schemeClr val="bg1"/>
+                    </a:solidFill>
+                  </a:tcPr>
+                </a:tc>
+                <a:extLst>
+                  <a:ext uri="{0D108BD9-81ED-4DB2-BD59-A6C34878D82A}">
+                    <a16:rowId xmlns:a16="http://schemas.microsoft.com/office/drawing/2014/main" val="2783160343"/>
+                  </a:ext>
+                </a:extLst>
+              </a:tr>
+            </a:tbl>
+          </a:graphicData>
+        </a:graphic>
+      </p:graphicFrame>
+    </p:spTree>
+    <p:extLst>
+      <p:ext uri="{BB962C8B-B14F-4D97-AF65-F5344CB8AC3E}">
+        <p14:creationId xmlns:p14="http://schemas.microsoft.com/office/powerpoint/2010/main" val="1705198278"/>
       </p:ext>
     </p:extLst>
   </p:cSld>

</xml_diff>

<commit_message>
Modify: SystemVerilog_語法學習.pptx 1. add Processes slide
</commit_message>
<xml_diff>
--- a/SystemVerilog_語法學習.pptx
+++ b/SystemVerilog_語法學習.pptx
@@ -5,7 +5,7 @@
     <p:sldMasterId id="2147483648" r:id="rId1"/>
   </p:sldMasterIdLst>
   <p:notesMasterIdLst>
-    <p:notesMasterId r:id="rId34"/>
+    <p:notesMasterId r:id="rId37"/>
   </p:notesMasterIdLst>
   <p:sldIdLst>
     <p:sldId id="256" r:id="rId2"/>
@@ -40,6 +40,9 @@
     <p:sldId id="296" r:id="rId31"/>
     <p:sldId id="297" r:id="rId32"/>
     <p:sldId id="298" r:id="rId33"/>
+    <p:sldId id="299" r:id="rId34"/>
+    <p:sldId id="300" r:id="rId35"/>
+    <p:sldId id="301" r:id="rId36"/>
   </p:sldIdLst>
   <p:sldSz cx="12192000" cy="6858000"/>
   <p:notesSz cx="6858000" cy="9144000"/>
@@ -228,7 +231,7 @@
           <a:p>
             <a:fld id="{28C483A5-4075-4A6E-B921-74BFA7B8EF67}" type="datetimeFigureOut">
               <a:rPr lang="zh-TW" altLang="en-US" smtClean="0"/>
-              <a:t>2025/4/24</a:t>
+              <a:t>2025/4/29</a:t>
             </a:fld>
             <a:endParaRPr lang="zh-TW" altLang="en-US"/>
           </a:p>
@@ -810,7 +813,7 @@
           <a:p>
             <a:fld id="{2365240E-6CA3-4772-8803-719FF1315E51}" type="datetimeFigureOut">
               <a:rPr lang="zh-TW" altLang="en-US" smtClean="0"/>
-              <a:t>2025/4/24</a:t>
+              <a:t>2025/4/29</a:t>
             </a:fld>
             <a:endParaRPr lang="zh-TW" altLang="en-US"/>
           </a:p>
@@ -1008,7 +1011,7 @@
           <a:p>
             <a:fld id="{2365240E-6CA3-4772-8803-719FF1315E51}" type="datetimeFigureOut">
               <a:rPr lang="zh-TW" altLang="en-US" smtClean="0"/>
-              <a:t>2025/4/24</a:t>
+              <a:t>2025/4/29</a:t>
             </a:fld>
             <a:endParaRPr lang="zh-TW" altLang="en-US"/>
           </a:p>
@@ -1216,7 +1219,7 @@
           <a:p>
             <a:fld id="{2365240E-6CA3-4772-8803-719FF1315E51}" type="datetimeFigureOut">
               <a:rPr lang="zh-TW" altLang="en-US" smtClean="0"/>
-              <a:t>2025/4/24</a:t>
+              <a:t>2025/4/29</a:t>
             </a:fld>
             <a:endParaRPr lang="zh-TW" altLang="en-US"/>
           </a:p>
@@ -1414,7 +1417,7 @@
           <a:p>
             <a:fld id="{2365240E-6CA3-4772-8803-719FF1315E51}" type="datetimeFigureOut">
               <a:rPr lang="zh-TW" altLang="en-US" smtClean="0"/>
-              <a:t>2025/4/24</a:t>
+              <a:t>2025/4/29</a:t>
             </a:fld>
             <a:endParaRPr lang="zh-TW" altLang="en-US"/>
           </a:p>
@@ -1689,7 +1692,7 @@
           <a:p>
             <a:fld id="{2365240E-6CA3-4772-8803-719FF1315E51}" type="datetimeFigureOut">
               <a:rPr lang="zh-TW" altLang="en-US" smtClean="0"/>
-              <a:t>2025/4/24</a:t>
+              <a:t>2025/4/29</a:t>
             </a:fld>
             <a:endParaRPr lang="zh-TW" altLang="en-US"/>
           </a:p>
@@ -1954,7 +1957,7 @@
           <a:p>
             <a:fld id="{2365240E-6CA3-4772-8803-719FF1315E51}" type="datetimeFigureOut">
               <a:rPr lang="zh-TW" altLang="en-US" smtClean="0"/>
-              <a:t>2025/4/24</a:t>
+              <a:t>2025/4/29</a:t>
             </a:fld>
             <a:endParaRPr lang="zh-TW" altLang="en-US"/>
           </a:p>
@@ -2366,7 +2369,7 @@
           <a:p>
             <a:fld id="{2365240E-6CA3-4772-8803-719FF1315E51}" type="datetimeFigureOut">
               <a:rPr lang="zh-TW" altLang="en-US" smtClean="0"/>
-              <a:t>2025/4/24</a:t>
+              <a:t>2025/4/29</a:t>
             </a:fld>
             <a:endParaRPr lang="zh-TW" altLang="en-US"/>
           </a:p>
@@ -2507,7 +2510,7 @@
           <a:p>
             <a:fld id="{2365240E-6CA3-4772-8803-719FF1315E51}" type="datetimeFigureOut">
               <a:rPr lang="zh-TW" altLang="en-US" smtClean="0"/>
-              <a:t>2025/4/24</a:t>
+              <a:t>2025/4/29</a:t>
             </a:fld>
             <a:endParaRPr lang="zh-TW" altLang="en-US"/>
           </a:p>
@@ -2620,7 +2623,7 @@
           <a:p>
             <a:fld id="{2365240E-6CA3-4772-8803-719FF1315E51}" type="datetimeFigureOut">
               <a:rPr lang="zh-TW" altLang="en-US" smtClean="0"/>
-              <a:t>2025/4/24</a:t>
+              <a:t>2025/4/29</a:t>
             </a:fld>
             <a:endParaRPr lang="zh-TW" altLang="en-US"/>
           </a:p>
@@ -2931,7 +2934,7 @@
           <a:p>
             <a:fld id="{2365240E-6CA3-4772-8803-719FF1315E51}" type="datetimeFigureOut">
               <a:rPr lang="zh-TW" altLang="en-US" smtClean="0"/>
-              <a:t>2025/4/24</a:t>
+              <a:t>2025/4/29</a:t>
             </a:fld>
             <a:endParaRPr lang="zh-TW" altLang="en-US"/>
           </a:p>
@@ -3219,7 +3222,7 @@
           <a:p>
             <a:fld id="{2365240E-6CA3-4772-8803-719FF1315E51}" type="datetimeFigureOut">
               <a:rPr lang="zh-TW" altLang="en-US" smtClean="0"/>
-              <a:t>2025/4/24</a:t>
+              <a:t>2025/4/29</a:t>
             </a:fld>
             <a:endParaRPr lang="zh-TW" altLang="en-US"/>
           </a:p>
@@ -3460,7 +3463,7 @@
           <a:p>
             <a:fld id="{2365240E-6CA3-4772-8803-719FF1315E51}" type="datetimeFigureOut">
               <a:rPr lang="zh-TW" altLang="en-US" smtClean="0"/>
-              <a:t>2025/4/24</a:t>
+              <a:t>2025/4/29</a:t>
             </a:fld>
             <a:endParaRPr lang="zh-TW" altLang="en-US"/>
           </a:p>
@@ -7365,6 +7368,16 @@
               <a:t>Control_Flow</a:t>
             </a:r>
             <a:endParaRPr lang="en-US" altLang="zh-TW" dirty="0"/>
+          </a:p>
+          <a:p>
+            <a:pPr marL="514350" indent="-514350">
+              <a:buFont typeface="+mj-lt"/>
+              <a:buAutoNum type="arabicPeriod"/>
+            </a:pPr>
+            <a:r>
+              <a:rPr lang="en-US" altLang="zh-TW" dirty="0"/>
+              <a:t>Processes</a:t>
+            </a:r>
           </a:p>
           <a:p>
             <a:pPr marL="514350" indent="-514350">
@@ -11815,6 +11828,544 @@
 </p:sld>
 </file>
 
+<file path=ppt/slides/slide33.xml><?xml version="1.0" encoding="utf-8"?>
+<p:sld xmlns:a="http://schemas.openxmlformats.org/drawingml/2006/main" xmlns:r="http://schemas.openxmlformats.org/officeDocument/2006/relationships" xmlns:p="http://schemas.openxmlformats.org/presentationml/2006/main">
+  <p:cSld>
+    <p:spTree>
+      <p:nvGrpSpPr>
+        <p:cNvPr id="1" name="">
+          <a:extLst>
+            <a:ext uri="{FF2B5EF4-FFF2-40B4-BE49-F238E27FC236}">
+              <a16:creationId xmlns:a16="http://schemas.microsoft.com/office/drawing/2014/main" id="{9DD3AC83-0E4A-F251-0BDF-C4C3D74D297F}"/>
+            </a:ext>
+          </a:extLst>
+        </p:cNvPr>
+        <p:cNvGrpSpPr/>
+        <p:nvPr/>
+      </p:nvGrpSpPr>
+      <p:grpSpPr>
+        <a:xfrm>
+          <a:off x="0" y="0"/>
+          <a:ext cx="0" cy="0"/>
+          <a:chOff x="0" y="0"/>
+          <a:chExt cx="0" cy="0"/>
+        </a:xfrm>
+      </p:grpSpPr>
+      <p:sp>
+        <p:nvSpPr>
+          <p:cNvPr id="2" name="標題 1">
+            <a:extLst>
+              <a:ext uri="{FF2B5EF4-FFF2-40B4-BE49-F238E27FC236}">
+                <a16:creationId xmlns:a16="http://schemas.microsoft.com/office/drawing/2014/main" id="{FB746C57-A0ED-2F68-7C4C-1C3EE8E9458B}"/>
+              </a:ext>
+            </a:extLst>
+          </p:cNvPr>
+          <p:cNvSpPr>
+            <a:spLocks noGrp="1"/>
+          </p:cNvSpPr>
+          <p:nvPr>
+            <p:ph type="ctrTitle"/>
+          </p:nvPr>
+        </p:nvSpPr>
+        <p:spPr/>
+        <p:txBody>
+          <a:bodyPr/>
+          <a:lstStyle/>
+          <a:p>
+            <a:r>
+              <a:rPr lang="en-US" altLang="zh-TW" dirty="0"/>
+              <a:t>Chapter 3</a:t>
+            </a:r>
+            <a:endParaRPr lang="zh-TW" altLang="en-US" dirty="0"/>
+          </a:p>
+        </p:txBody>
+      </p:sp>
+      <p:sp>
+        <p:nvSpPr>
+          <p:cNvPr id="3" name="副標題 2">
+            <a:extLst>
+              <a:ext uri="{FF2B5EF4-FFF2-40B4-BE49-F238E27FC236}">
+                <a16:creationId xmlns:a16="http://schemas.microsoft.com/office/drawing/2014/main" id="{2DEBF20A-1FA7-2C88-43D4-F5CED54A99C7}"/>
+              </a:ext>
+            </a:extLst>
+          </p:cNvPr>
+          <p:cNvSpPr>
+            <a:spLocks noGrp="1"/>
+          </p:cNvSpPr>
+          <p:nvPr>
+            <p:ph type="subTitle" idx="1"/>
+          </p:nvPr>
+        </p:nvSpPr>
+        <p:spPr/>
+        <p:txBody>
+          <a:bodyPr>
+            <a:normAutofit/>
+          </a:bodyPr>
+          <a:lstStyle/>
+          <a:p>
+            <a:r>
+              <a:rPr lang="en-US" altLang="zh-TW" sz="4000" dirty="0"/>
+              <a:t>Processes</a:t>
+            </a:r>
+          </a:p>
+        </p:txBody>
+      </p:sp>
+    </p:spTree>
+    <p:extLst>
+      <p:ext uri="{BB962C8B-B14F-4D97-AF65-F5344CB8AC3E}">
+        <p14:creationId xmlns:p14="http://schemas.microsoft.com/office/powerpoint/2010/main" val="3772105667"/>
+      </p:ext>
+    </p:extLst>
+  </p:cSld>
+  <p:clrMapOvr>
+    <a:masterClrMapping/>
+  </p:clrMapOvr>
+</p:sld>
+</file>
+
+<file path=ppt/slides/slide34.xml><?xml version="1.0" encoding="utf-8"?>
+<p:sld xmlns:a="http://schemas.openxmlformats.org/drawingml/2006/main" xmlns:r="http://schemas.openxmlformats.org/officeDocument/2006/relationships" xmlns:p="http://schemas.openxmlformats.org/presentationml/2006/main">
+  <p:cSld>
+    <p:spTree>
+      <p:nvGrpSpPr>
+        <p:cNvPr id="1" name="">
+          <a:extLst>
+            <a:ext uri="{FF2B5EF4-FFF2-40B4-BE49-F238E27FC236}">
+              <a16:creationId xmlns:a16="http://schemas.microsoft.com/office/drawing/2014/main" id="{AD8E5609-0AC1-B325-F8B6-8A5D288D673C}"/>
+            </a:ext>
+          </a:extLst>
+        </p:cNvPr>
+        <p:cNvGrpSpPr/>
+        <p:nvPr/>
+      </p:nvGrpSpPr>
+      <p:grpSpPr>
+        <a:xfrm>
+          <a:off x="0" y="0"/>
+          <a:ext cx="0" cy="0"/>
+          <a:chOff x="0" y="0"/>
+          <a:chExt cx="0" cy="0"/>
+        </a:xfrm>
+      </p:grpSpPr>
+      <p:sp>
+        <p:nvSpPr>
+          <p:cNvPr id="2" name="標題 1">
+            <a:extLst>
+              <a:ext uri="{FF2B5EF4-FFF2-40B4-BE49-F238E27FC236}">
+                <a16:creationId xmlns:a16="http://schemas.microsoft.com/office/drawing/2014/main" id="{D35AE1EF-D28E-344E-3916-4B110FCB910F}"/>
+              </a:ext>
+            </a:extLst>
+          </p:cNvPr>
+          <p:cNvSpPr>
+            <a:spLocks noGrp="1"/>
+          </p:cNvSpPr>
+          <p:nvPr>
+            <p:ph type="title"/>
+          </p:nvPr>
+        </p:nvSpPr>
+        <p:spPr/>
+        <p:txBody>
+          <a:bodyPr/>
+          <a:lstStyle/>
+          <a:p>
+            <a:r>
+              <a:rPr lang="en-US" altLang="zh-TW" dirty="0"/>
+              <a:t>fork </a:t>
+            </a:r>
+            <a:r>
+              <a:rPr lang="en-US" altLang="zh-TW"/>
+              <a:t>(1/2)</a:t>
+            </a:r>
+            <a:endParaRPr lang="zh-TW" altLang="en-US" dirty="0"/>
+          </a:p>
+        </p:txBody>
+      </p:sp>
+      <p:sp>
+        <p:nvSpPr>
+          <p:cNvPr id="4" name="內容版面配置區 3">
+            <a:extLst>
+              <a:ext uri="{FF2B5EF4-FFF2-40B4-BE49-F238E27FC236}">
+                <a16:creationId xmlns:a16="http://schemas.microsoft.com/office/drawing/2014/main" id="{35C98F15-E43A-2747-BB58-2B452E866C27}"/>
+              </a:ext>
+            </a:extLst>
+          </p:cNvPr>
+          <p:cNvSpPr>
+            <a:spLocks noGrp="1"/>
+          </p:cNvSpPr>
+          <p:nvPr>
+            <p:ph idx="1"/>
+          </p:nvPr>
+        </p:nvSpPr>
+        <p:spPr/>
+        <p:txBody>
+          <a:bodyPr/>
+          <a:lstStyle/>
+          <a:p>
+            <a:r>
+              <a:rPr lang="en-US" altLang="zh-TW" dirty="0"/>
+              <a:t>fork </a:t>
+            </a:r>
+            <a:r>
+              <a:rPr lang="zh-TW" altLang="en-US" dirty="0"/>
+              <a:t>分成三種</a:t>
+            </a:r>
+            <a:endParaRPr lang="en-US" altLang="zh-TW" dirty="0"/>
+          </a:p>
+          <a:p>
+            <a:pPr marL="914400" lvl="1" indent="-457200">
+              <a:buFont typeface="+mj-lt"/>
+              <a:buAutoNum type="arabicPeriod"/>
+            </a:pPr>
+            <a:r>
+              <a:rPr lang="en-US" altLang="zh-TW" dirty="0"/>
+              <a:t>fork </a:t>
+            </a:r>
+            <a:r>
+              <a:rPr lang="zh-TW" altLang="en-US" dirty="0"/>
+              <a:t>  </a:t>
+            </a:r>
+            <a:r>
+              <a:rPr lang="en-US" altLang="zh-TW" dirty="0"/>
+              <a:t>join</a:t>
+            </a:r>
+          </a:p>
+          <a:p>
+            <a:pPr lvl="2"/>
+            <a:r>
+              <a:rPr lang="zh-TW" altLang="en-US" dirty="0"/>
+              <a:t>需要所有 </a:t>
+            </a:r>
+            <a:r>
+              <a:rPr lang="en-US" altLang="zh-TW" dirty="0"/>
+              <a:t>thread </a:t>
+            </a:r>
+            <a:r>
+              <a:rPr lang="zh-TW" altLang="en-US" dirty="0"/>
+              <a:t>完成後才會離開 </a:t>
+            </a:r>
+            <a:r>
+              <a:rPr lang="en-US" altLang="zh-TW" dirty="0"/>
+              <a:t>fork</a:t>
+            </a:r>
+            <a:r>
+              <a:rPr lang="zh-TW" altLang="en-US" dirty="0"/>
+              <a:t> 區塊往下執行</a:t>
+            </a:r>
+            <a:endParaRPr lang="en-US" altLang="zh-TW" dirty="0"/>
+          </a:p>
+          <a:p>
+            <a:pPr marL="914400" lvl="1" indent="-457200">
+              <a:buFont typeface="+mj-lt"/>
+              <a:buAutoNum type="arabicPeriod"/>
+            </a:pPr>
+            <a:r>
+              <a:rPr lang="en-US" altLang="zh-TW" dirty="0"/>
+              <a:t>fork </a:t>
+            </a:r>
+            <a:r>
+              <a:rPr lang="zh-TW" altLang="en-US" dirty="0"/>
+              <a:t>  </a:t>
+            </a:r>
+            <a:r>
+              <a:rPr lang="en-US" altLang="zh-TW" dirty="0" err="1"/>
+              <a:t>join_any</a:t>
+            </a:r>
+            <a:endParaRPr lang="en-US" altLang="zh-TW" dirty="0"/>
+          </a:p>
+          <a:p>
+            <a:pPr lvl="2"/>
+            <a:r>
+              <a:rPr lang="zh-TW" altLang="en-US" dirty="0"/>
+              <a:t>只要有其中一個 </a:t>
+            </a:r>
+            <a:r>
+              <a:rPr lang="en-US" altLang="zh-TW" dirty="0"/>
+              <a:t>thread </a:t>
+            </a:r>
+            <a:r>
+              <a:rPr lang="zh-TW" altLang="en-US" dirty="0"/>
+              <a:t>完成，就會離開 </a:t>
+            </a:r>
+            <a:r>
+              <a:rPr lang="en-US" altLang="zh-TW" dirty="0"/>
+              <a:t>fork </a:t>
+            </a:r>
+            <a:r>
+              <a:rPr lang="zh-TW" altLang="en-US" dirty="0"/>
+              <a:t>區塊往下執行</a:t>
+            </a:r>
+            <a:endParaRPr lang="en-US" altLang="zh-TW" dirty="0"/>
+          </a:p>
+          <a:p>
+            <a:pPr marL="914400" lvl="1" indent="-457200">
+              <a:buFont typeface="+mj-lt"/>
+              <a:buAutoNum type="arabicPeriod"/>
+            </a:pPr>
+            <a:r>
+              <a:rPr lang="en-US" altLang="zh-TW" dirty="0"/>
+              <a:t>fork </a:t>
+            </a:r>
+            <a:r>
+              <a:rPr lang="zh-TW" altLang="en-US" dirty="0"/>
+              <a:t>  </a:t>
+            </a:r>
+            <a:r>
+              <a:rPr lang="en-US" altLang="zh-TW" dirty="0" err="1"/>
+              <a:t>join_none</a:t>
+            </a:r>
+            <a:endParaRPr lang="en-US" altLang="zh-TW" dirty="0"/>
+          </a:p>
+          <a:p>
+            <a:pPr lvl="2"/>
+            <a:r>
+              <a:rPr lang="zh-TW" altLang="en-US" dirty="0"/>
+              <a:t>不管 </a:t>
+            </a:r>
+            <a:r>
+              <a:rPr lang="en-US" altLang="zh-TW" dirty="0"/>
+              <a:t>thread</a:t>
+            </a:r>
+            <a:r>
+              <a:rPr lang="zh-TW" altLang="en-US" dirty="0"/>
+              <a:t> 是否完成，都直接離開</a:t>
+            </a:r>
+            <a:r>
+              <a:rPr lang="en-US" altLang="zh-TW" dirty="0"/>
+              <a:t>fork</a:t>
+            </a:r>
+            <a:r>
+              <a:rPr lang="zh-TW" altLang="en-US" dirty="0"/>
+              <a:t>區塊往下執行</a:t>
+            </a:r>
+            <a:endParaRPr lang="en-US" altLang="zh-TW" dirty="0"/>
+          </a:p>
+          <a:p>
+            <a:pPr lvl="1"/>
+            <a:endParaRPr lang="zh-TW" altLang="en-US" dirty="0"/>
+          </a:p>
+        </p:txBody>
+      </p:sp>
+      <p:pic>
+        <p:nvPicPr>
+          <p:cNvPr id="1026" name="Picture 2" descr="fork-join">
+            <a:extLst>
+              <a:ext uri="{FF2B5EF4-FFF2-40B4-BE49-F238E27FC236}">
+                <a16:creationId xmlns:a16="http://schemas.microsoft.com/office/drawing/2014/main" id="{0AA6CE6C-6F36-BB25-E023-61C14ED64E5E}"/>
+              </a:ext>
+            </a:extLst>
+          </p:cNvPr>
+          <p:cNvPicPr>
+            <a:picLocks noChangeAspect="1" noChangeArrowheads="1"/>
+          </p:cNvPicPr>
+          <p:nvPr/>
+        </p:nvPicPr>
+        <p:blipFill>
+          <a:blip r:embed="rId2">
+            <a:extLst>
+              <a:ext uri="{28A0092B-C50C-407E-A947-70E740481C1C}">
+                <a14:useLocalDpi xmlns:a14="http://schemas.microsoft.com/office/drawing/2010/main" val="0"/>
+              </a:ext>
+            </a:extLst>
+          </a:blip>
+          <a:srcRect/>
+          <a:stretch>
+            <a:fillRect/>
+          </a:stretch>
+        </p:blipFill>
+        <p:spPr bwMode="auto">
+          <a:xfrm>
+            <a:off x="3449622" y="4651601"/>
+            <a:ext cx="5292755" cy="2074187"/>
+          </a:xfrm>
+          <a:prstGeom prst="rect">
+            <a:avLst/>
+          </a:prstGeom>
+          <a:noFill/>
+          <a:ln>
+            <a:solidFill>
+              <a:schemeClr val="tx1"/>
+            </a:solidFill>
+          </a:ln>
+          <a:extLst>
+            <a:ext uri="{909E8E84-426E-40DD-AFC4-6F175D3DCCD1}">
+              <a14:hiddenFill xmlns:a14="http://schemas.microsoft.com/office/drawing/2010/main">
+                <a:solidFill>
+                  <a:srgbClr val="FFFFFF"/>
+                </a:solidFill>
+              </a14:hiddenFill>
+            </a:ext>
+          </a:extLst>
+        </p:spPr>
+      </p:pic>
+    </p:spTree>
+    <p:extLst>
+      <p:ext uri="{BB962C8B-B14F-4D97-AF65-F5344CB8AC3E}">
+        <p14:creationId xmlns:p14="http://schemas.microsoft.com/office/powerpoint/2010/main" val="2962073340"/>
+      </p:ext>
+    </p:extLst>
+  </p:cSld>
+  <p:clrMapOvr>
+    <a:masterClrMapping/>
+  </p:clrMapOvr>
+</p:sld>
+</file>
+
+<file path=ppt/slides/slide35.xml><?xml version="1.0" encoding="utf-8"?>
+<p:sld xmlns:a="http://schemas.openxmlformats.org/drawingml/2006/main" xmlns:r="http://schemas.openxmlformats.org/officeDocument/2006/relationships" xmlns:p="http://schemas.openxmlformats.org/presentationml/2006/main">
+  <p:cSld>
+    <p:spTree>
+      <p:nvGrpSpPr>
+        <p:cNvPr id="1" name="">
+          <a:extLst>
+            <a:ext uri="{FF2B5EF4-FFF2-40B4-BE49-F238E27FC236}">
+              <a16:creationId xmlns:a16="http://schemas.microsoft.com/office/drawing/2014/main" id="{E30726B5-BD18-7827-BA3E-235BA8DDAD75}"/>
+            </a:ext>
+          </a:extLst>
+        </p:cNvPr>
+        <p:cNvGrpSpPr/>
+        <p:nvPr/>
+      </p:nvGrpSpPr>
+      <p:grpSpPr>
+        <a:xfrm>
+          <a:off x="0" y="0"/>
+          <a:ext cx="0" cy="0"/>
+          <a:chOff x="0" y="0"/>
+          <a:chExt cx="0" cy="0"/>
+        </a:xfrm>
+      </p:grpSpPr>
+      <p:sp>
+        <p:nvSpPr>
+          <p:cNvPr id="2" name="標題 1">
+            <a:extLst>
+              <a:ext uri="{FF2B5EF4-FFF2-40B4-BE49-F238E27FC236}">
+                <a16:creationId xmlns:a16="http://schemas.microsoft.com/office/drawing/2014/main" id="{F33A887E-692A-AC8E-3807-F2BF9CD98131}"/>
+              </a:ext>
+            </a:extLst>
+          </p:cNvPr>
+          <p:cNvSpPr>
+            <a:spLocks noGrp="1"/>
+          </p:cNvSpPr>
+          <p:nvPr>
+            <p:ph type="title"/>
+          </p:nvPr>
+        </p:nvSpPr>
+        <p:spPr/>
+        <p:txBody>
+          <a:bodyPr/>
+          <a:lstStyle/>
+          <a:p>
+            <a:r>
+              <a:rPr lang="en-US" altLang="zh-TW" dirty="0"/>
+              <a:t>fork (2/2)</a:t>
+            </a:r>
+            <a:endParaRPr lang="zh-TW" altLang="en-US" dirty="0"/>
+          </a:p>
+        </p:txBody>
+      </p:sp>
+      <p:sp>
+        <p:nvSpPr>
+          <p:cNvPr id="4" name="內容版面配置區 3">
+            <a:extLst>
+              <a:ext uri="{FF2B5EF4-FFF2-40B4-BE49-F238E27FC236}">
+                <a16:creationId xmlns:a16="http://schemas.microsoft.com/office/drawing/2014/main" id="{688EF8B7-4121-3819-FDEF-4AC1663A1C6D}"/>
+              </a:ext>
+            </a:extLst>
+          </p:cNvPr>
+          <p:cNvSpPr>
+            <a:spLocks noGrp="1"/>
+          </p:cNvSpPr>
+          <p:nvPr>
+            <p:ph idx="1"/>
+          </p:nvPr>
+        </p:nvSpPr>
+        <p:spPr/>
+        <p:txBody>
+          <a:bodyPr/>
+          <a:lstStyle/>
+          <a:p>
+            <a:r>
+              <a:rPr lang="en-US" altLang="zh-TW" dirty="0"/>
+              <a:t>fork </a:t>
+            </a:r>
+            <a:r>
+              <a:rPr lang="zh-TW" altLang="en-US" dirty="0"/>
+              <a:t>兩種後續指令</a:t>
+            </a:r>
+            <a:endParaRPr lang="en-US" altLang="zh-TW" dirty="0"/>
+          </a:p>
+          <a:p>
+            <a:pPr marL="971550" lvl="1" indent="-514350">
+              <a:buFont typeface="+mj-lt"/>
+              <a:buAutoNum type="arabicPeriod"/>
+            </a:pPr>
+            <a:r>
+              <a:rPr lang="en-US" altLang="zh-TW" dirty="0"/>
+              <a:t>disable fork </a:t>
+            </a:r>
+          </a:p>
+          <a:p>
+            <a:pPr lvl="2"/>
+            <a:r>
+              <a:rPr lang="zh-TW" altLang="en-US" dirty="0"/>
+              <a:t>關閉 </a:t>
+            </a:r>
+            <a:r>
+              <a:rPr lang="en-US" altLang="zh-TW" dirty="0"/>
+              <a:t>fork </a:t>
+            </a:r>
+            <a:r>
+              <a:rPr lang="zh-TW" altLang="en-US" dirty="0"/>
+              <a:t>內所有 </a:t>
+            </a:r>
+            <a:r>
+              <a:rPr lang="en-US" altLang="zh-TW" dirty="0"/>
+              <a:t>thread</a:t>
+            </a:r>
+          </a:p>
+          <a:p>
+            <a:pPr marL="971550" lvl="1" indent="-514350">
+              <a:buFont typeface="+mj-lt"/>
+              <a:buAutoNum type="arabicPeriod"/>
+            </a:pPr>
+            <a:r>
+              <a:rPr lang="en-US" altLang="zh-TW" dirty="0"/>
+              <a:t>wait fork</a:t>
+            </a:r>
+          </a:p>
+          <a:p>
+            <a:pPr lvl="2"/>
+            <a:r>
+              <a:rPr lang="zh-TW" altLang="en-US" dirty="0"/>
+              <a:t>等待所有 </a:t>
+            </a:r>
+            <a:r>
+              <a:rPr lang="en-US" altLang="zh-TW" dirty="0"/>
+              <a:t>thread </a:t>
+            </a:r>
+            <a:r>
+              <a:rPr lang="zh-TW" altLang="en-US" dirty="0"/>
+              <a:t>完成後，再繼續執行</a:t>
+            </a:r>
+            <a:endParaRPr lang="en-US" altLang="zh-TW" dirty="0"/>
+          </a:p>
+          <a:p>
+            <a:pPr lvl="1"/>
+            <a:endParaRPr lang="zh-TW" altLang="en-US" dirty="0"/>
+          </a:p>
+        </p:txBody>
+      </p:sp>
+    </p:spTree>
+    <p:extLst>
+      <p:ext uri="{BB962C8B-B14F-4D97-AF65-F5344CB8AC3E}">
+        <p14:creationId xmlns:p14="http://schemas.microsoft.com/office/powerpoint/2010/main" val="1118576125"/>
+      </p:ext>
+    </p:extLst>
+  </p:cSld>
+  <p:clrMapOvr>
+    <a:masterClrMapping/>
+  </p:clrMapOvr>
+</p:sld>
+</file>
+
 <file path=ppt/slides/slide4.xml><?xml version="1.0" encoding="utf-8"?>
 <p:sld xmlns:a="http://schemas.openxmlformats.org/drawingml/2006/main" xmlns:r="http://schemas.openxmlformats.org/officeDocument/2006/relationships" xmlns:p="http://schemas.openxmlformats.org/presentationml/2006/main">
   <p:cSld>

</xml_diff>

<commit_message>
modify: SystemVerilog_語法學習.pptx 1. add task info.
</commit_message>
<xml_diff>
--- a/SystemVerilog_語法學習.pptx
+++ b/SystemVerilog_語法學習.pptx
@@ -231,7 +231,7 @@
           <a:p>
             <a:fld id="{28C483A5-4075-4A6E-B921-74BFA7B8EF67}" type="datetimeFigureOut">
               <a:rPr lang="zh-TW" altLang="en-US" smtClean="0"/>
-              <a:t>2025/4/29</a:t>
+              <a:t>2025/5/3</a:t>
             </a:fld>
             <a:endParaRPr lang="zh-TW" altLang="en-US"/>
           </a:p>
@@ -813,7 +813,7 @@
           <a:p>
             <a:fld id="{2365240E-6CA3-4772-8803-719FF1315E51}" type="datetimeFigureOut">
               <a:rPr lang="zh-TW" altLang="en-US" smtClean="0"/>
-              <a:t>2025/4/29</a:t>
+              <a:t>2025/5/3</a:t>
             </a:fld>
             <a:endParaRPr lang="zh-TW" altLang="en-US"/>
           </a:p>
@@ -1011,7 +1011,7 @@
           <a:p>
             <a:fld id="{2365240E-6CA3-4772-8803-719FF1315E51}" type="datetimeFigureOut">
               <a:rPr lang="zh-TW" altLang="en-US" smtClean="0"/>
-              <a:t>2025/4/29</a:t>
+              <a:t>2025/5/3</a:t>
             </a:fld>
             <a:endParaRPr lang="zh-TW" altLang="en-US"/>
           </a:p>
@@ -1219,7 +1219,7 @@
           <a:p>
             <a:fld id="{2365240E-6CA3-4772-8803-719FF1315E51}" type="datetimeFigureOut">
               <a:rPr lang="zh-TW" altLang="en-US" smtClean="0"/>
-              <a:t>2025/4/29</a:t>
+              <a:t>2025/5/3</a:t>
             </a:fld>
             <a:endParaRPr lang="zh-TW" altLang="en-US"/>
           </a:p>
@@ -1417,7 +1417,7 @@
           <a:p>
             <a:fld id="{2365240E-6CA3-4772-8803-719FF1315E51}" type="datetimeFigureOut">
               <a:rPr lang="zh-TW" altLang="en-US" smtClean="0"/>
-              <a:t>2025/4/29</a:t>
+              <a:t>2025/5/3</a:t>
             </a:fld>
             <a:endParaRPr lang="zh-TW" altLang="en-US"/>
           </a:p>
@@ -1692,7 +1692,7 @@
           <a:p>
             <a:fld id="{2365240E-6CA3-4772-8803-719FF1315E51}" type="datetimeFigureOut">
               <a:rPr lang="zh-TW" altLang="en-US" smtClean="0"/>
-              <a:t>2025/4/29</a:t>
+              <a:t>2025/5/3</a:t>
             </a:fld>
             <a:endParaRPr lang="zh-TW" altLang="en-US"/>
           </a:p>
@@ -1957,7 +1957,7 @@
           <a:p>
             <a:fld id="{2365240E-6CA3-4772-8803-719FF1315E51}" type="datetimeFigureOut">
               <a:rPr lang="zh-TW" altLang="en-US" smtClean="0"/>
-              <a:t>2025/4/29</a:t>
+              <a:t>2025/5/3</a:t>
             </a:fld>
             <a:endParaRPr lang="zh-TW" altLang="en-US"/>
           </a:p>
@@ -2369,7 +2369,7 @@
           <a:p>
             <a:fld id="{2365240E-6CA3-4772-8803-719FF1315E51}" type="datetimeFigureOut">
               <a:rPr lang="zh-TW" altLang="en-US" smtClean="0"/>
-              <a:t>2025/4/29</a:t>
+              <a:t>2025/5/3</a:t>
             </a:fld>
             <a:endParaRPr lang="zh-TW" altLang="en-US"/>
           </a:p>
@@ -2510,7 +2510,7 @@
           <a:p>
             <a:fld id="{2365240E-6CA3-4772-8803-719FF1315E51}" type="datetimeFigureOut">
               <a:rPr lang="zh-TW" altLang="en-US" smtClean="0"/>
-              <a:t>2025/4/29</a:t>
+              <a:t>2025/5/3</a:t>
             </a:fld>
             <a:endParaRPr lang="zh-TW" altLang="en-US"/>
           </a:p>
@@ -2623,7 +2623,7 @@
           <a:p>
             <a:fld id="{2365240E-6CA3-4772-8803-719FF1315E51}" type="datetimeFigureOut">
               <a:rPr lang="zh-TW" altLang="en-US" smtClean="0"/>
-              <a:t>2025/4/29</a:t>
+              <a:t>2025/5/3</a:t>
             </a:fld>
             <a:endParaRPr lang="zh-TW" altLang="en-US"/>
           </a:p>
@@ -2934,7 +2934,7 @@
           <a:p>
             <a:fld id="{2365240E-6CA3-4772-8803-719FF1315E51}" type="datetimeFigureOut">
               <a:rPr lang="zh-TW" altLang="en-US" smtClean="0"/>
-              <a:t>2025/4/29</a:t>
+              <a:t>2025/5/3</a:t>
             </a:fld>
             <a:endParaRPr lang="zh-TW" altLang="en-US"/>
           </a:p>
@@ -3222,7 +3222,7 @@
           <a:p>
             <a:fld id="{2365240E-6CA3-4772-8803-719FF1315E51}" type="datetimeFigureOut">
               <a:rPr lang="zh-TW" altLang="en-US" smtClean="0"/>
-              <a:t>2025/4/29</a:t>
+              <a:t>2025/5/3</a:t>
             </a:fld>
             <a:endParaRPr lang="zh-TW" altLang="en-US"/>
           </a:p>
@@ -3463,7 +3463,7 @@
           <a:p>
             <a:fld id="{2365240E-6CA3-4772-8803-719FF1315E51}" type="datetimeFigureOut">
               <a:rPr lang="zh-TW" altLang="en-US" smtClean="0"/>
-              <a:t>2025/4/29</a:t>
+              <a:t>2025/5/3</a:t>
             </a:fld>
             <a:endParaRPr lang="zh-TW" altLang="en-US"/>
           </a:p>
@@ -10910,6 +10910,30 @@
             <a:pPr lvl="1"/>
             <a:r>
               <a:rPr lang="zh-TW" altLang="en-US" dirty="0"/>
+              <a:t>不能使用</a:t>
+            </a:r>
+            <a:r>
+              <a:rPr lang="en-US" altLang="zh-TW" dirty="0"/>
+              <a:t>@(posedge)</a:t>
+            </a:r>
+            <a:r>
+              <a:rPr lang="zh-TW" altLang="en-US" dirty="0"/>
+              <a:t>和</a:t>
+            </a:r>
+            <a:r>
+              <a:rPr lang="en-US" altLang="zh-TW"/>
+              <a:t>@(negedge)</a:t>
+            </a:r>
+            <a:r>
+              <a:rPr lang="zh-TW" altLang="en-US"/>
+              <a:t>。</a:t>
+            </a:r>
+            <a:endParaRPr lang="en-US" altLang="zh-TW" dirty="0"/>
+          </a:p>
+          <a:p>
+            <a:pPr lvl="1"/>
+            <a:r>
+              <a:rPr lang="zh-TW" altLang="en-US" dirty="0"/>
               <a:t>沒有</a:t>
             </a:r>
             <a:r>
@@ -11073,14 +11097,14 @@
             <p:ph idx="1"/>
             <p:extLst>
               <p:ext uri="{D42A27DB-BD31-4B8C-83A1-F6EECF244321}">
-                <p14:modId xmlns:p14="http://schemas.microsoft.com/office/powerpoint/2010/main" val="3337194851"/>
+                <p14:modId xmlns:p14="http://schemas.microsoft.com/office/powerpoint/2010/main" val="1646608650"/>
               </p:ext>
             </p:extLst>
           </p:nvPr>
         </p:nvGraphicFramePr>
         <p:xfrm>
           <a:off x="1190080" y="1816857"/>
-          <a:ext cx="9811839" cy="4395000"/>
+          <a:ext cx="9811839" cy="4654080"/>
         </p:xfrm>
         <a:graphic>
           <a:graphicData uri="http://schemas.openxmlformats.org/drawingml/2006/table">
@@ -11270,19 +11294,31 @@
                     <a:lstStyle/>
                     <a:p>
                       <a:r>
-                        <a:rPr lang="zh-TW" altLang="en-US" sz="1700">
+                        <a:rPr lang="zh-TW" altLang="en-US" sz="1700" dirty="0">
                           <a:effectLst/>
                         </a:rPr>
                         <a:t>無返回值（僅通過 </a:t>
                       </a:r>
                       <a:r>
-                        <a:rPr lang="en-US" altLang="zh-TW" sz="1700">
+                        <a:rPr lang="en-US" altLang="zh-TW" sz="1700" dirty="0">
                           <a:effectLst/>
                         </a:rPr>
-                        <a:t>output/inout </a:t>
+                        <a:t>output/</a:t>
                       </a:r>
                       <a:r>
-                        <a:rPr lang="zh-TW" altLang="en-US" sz="1700">
+                        <a:rPr lang="en-US" altLang="zh-TW" sz="1700" dirty="0" err="1">
+                          <a:effectLst/>
+                        </a:rPr>
+                        <a:t>inout</a:t>
+                      </a:r>
+                      <a:r>
+                        <a:rPr lang="en-US" altLang="zh-TW" sz="1700" dirty="0">
+                          <a:effectLst/>
+                        </a:rPr>
+                        <a:t> </a:t>
+                      </a:r>
+                      <a:r>
+                        <a:rPr lang="zh-TW" altLang="en-US" sz="1700" dirty="0">
                           <a:effectLst/>
                         </a:rPr>
                         <a:t>傳遞結果）</a:t>
@@ -11428,22 +11464,34 @@
                     <a:lstStyle/>
                     <a:p>
                       <a:r>
-                        <a:rPr lang="zh-TW" altLang="en-US" sz="1700">
+                        <a:rPr lang="zh-TW" altLang="en-US" sz="1700" dirty="0">
                           <a:effectLst/>
                         </a:rPr>
                         <a:t>不能包含時序控制語句（如 </a:t>
                       </a:r>
                       <a:r>
-                        <a:rPr lang="en-US" altLang="zh-TW" sz="1700">
+                        <a:rPr lang="en-US" altLang="zh-TW" sz="1700" dirty="0">
                           <a:effectLst/>
                         </a:rPr>
                         <a:t>#</a:t>
                       </a:r>
                       <a:r>
-                        <a:rPr lang="en-US" sz="1700">
+                        <a:rPr lang="en-US" sz="1700" dirty="0">
                           <a:effectLst/>
                         </a:rPr>
-                        <a:t>delay, @(posedge clk)）</a:t>
+                        <a:t>delay, @(posedge </a:t>
+                      </a:r>
+                      <a:r>
+                        <a:rPr lang="en-US" sz="1700" dirty="0" err="1">
+                          <a:effectLst/>
+                        </a:rPr>
+                        <a:t>clk</a:t>
+                      </a:r>
+                      <a:r>
+                        <a:rPr lang="en-US" sz="1700" dirty="0">
+                          <a:effectLst/>
+                        </a:rPr>
+                        <a:t>)）</a:t>
                       </a:r>
                     </a:p>
                   </a:txBody>
@@ -11464,6 +11512,82 @@
                         </a:rPr>
                         <a:t>可以包含時序控制語句</a:t>
                       </a:r>
+                      <a:endParaRPr lang="en-US" altLang="zh-TW" sz="1700" dirty="0">
+                        <a:effectLst/>
+                      </a:endParaRPr>
+                    </a:p>
+                    <a:p>
+                      <a:r>
+                        <a:rPr lang="en-US" altLang="zh-TW" sz="1700" dirty="0">
+                          <a:effectLst/>
+                        </a:rPr>
+                        <a:t>(delay</a:t>
+                      </a:r>
+                      <a:r>
+                        <a:rPr lang="zh-TW" altLang="en-US" sz="1700" dirty="0">
+                          <a:effectLst/>
+                        </a:rPr>
+                        <a:t>、</a:t>
+                      </a:r>
+                      <a:r>
+                        <a:rPr lang="en-US" altLang="zh-TW" sz="1700" dirty="0">
+                          <a:effectLst/>
+                        </a:rPr>
+                        <a:t>wait</a:t>
+                      </a:r>
+                      <a:r>
+                        <a:rPr lang="zh-TW" altLang="en-US" sz="1700" dirty="0">
+                          <a:effectLst/>
+                        </a:rPr>
+                        <a:t>、</a:t>
+                      </a:r>
+                      <a:r>
+                        <a:rPr lang="en-US" altLang="zh-TW" sz="1700" dirty="0">
+                          <a:effectLst/>
+                        </a:rPr>
+                        <a:t>@)</a:t>
+                      </a:r>
+                    </a:p>
+                    <a:p>
+                      <a:r>
+                        <a:rPr lang="en-US" altLang="zh-TW" sz="1700" dirty="0">
+                          <a:effectLst/>
+                        </a:rPr>
+                        <a:t>(</a:t>
+                      </a:r>
+                      <a:r>
+                        <a:rPr lang="zh-TW" altLang="en-US" sz="1700" dirty="0">
+                          <a:effectLst/>
+                        </a:rPr>
+                        <a:t>不能使用 </a:t>
+                      </a:r>
+                      <a:r>
+                        <a:rPr lang="en-US" altLang="zh-TW" sz="1700" dirty="0" err="1">
+                          <a:effectLst/>
+                        </a:rPr>
+                        <a:t>posedge</a:t>
+                      </a:r>
+                      <a:r>
+                        <a:rPr lang="zh-TW" altLang="en-US" sz="1700" dirty="0">
+                          <a:effectLst/>
+                        </a:rPr>
+                        <a:t>、</a:t>
+                      </a:r>
+                      <a:r>
+                        <a:rPr lang="en-US" altLang="zh-TW" sz="1700" dirty="0" err="1">
+                          <a:effectLst/>
+                        </a:rPr>
+                        <a:t>negedge</a:t>
+                      </a:r>
+                      <a:r>
+                        <a:rPr lang="en-US" altLang="zh-TW" sz="1700" dirty="0">
+                          <a:effectLst/>
+                        </a:rPr>
+                        <a:t>)</a:t>
+                      </a:r>
+                      <a:endParaRPr lang="zh-TW" altLang="en-US" sz="1700" dirty="0">
+                        <a:effectLst/>
+                      </a:endParaRPr>
                     </a:p>
                   </a:txBody>
                   <a:tcPr marL="85320" marR="85320" marT="42660" marB="42660" anchor="ctr">
@@ -11503,24 +11627,24 @@
                     <a:lstStyle/>
                     <a:p>
                       <a:r>
-                        <a:rPr lang="zh-TW" altLang="en-US" sz="1700">
+                        <a:rPr lang="zh-TW" altLang="en-US" sz="1700" dirty="0">
                           <a:effectLst/>
                         </a:rPr>
-                        <a:t>通常使用</a:t>
+                        <a:t>使用</a:t>
                       </a:r>
                       <a:r>
-                        <a:rPr lang="zh-TW" altLang="en-US" sz="1700" b="1">
+                        <a:rPr lang="zh-TW" altLang="en-US" sz="1700" b="1" dirty="0">
                           <a:effectLst/>
                         </a:rPr>
                         <a:t>阻塞賦值 </a:t>
                       </a:r>
                       <a:r>
-                        <a:rPr lang="en-US" altLang="zh-TW" sz="1700" b="1">
+                        <a:rPr lang="en-US" altLang="zh-TW" sz="1700" b="1" dirty="0">
                           <a:effectLst/>
                         </a:rPr>
                         <a:t>(=)</a:t>
                       </a:r>
-                      <a:endParaRPr lang="zh-TW" altLang="en-US" sz="1700">
+                      <a:endParaRPr lang="zh-TW" altLang="en-US" sz="1700" dirty="0">
                         <a:effectLst/>
                       </a:endParaRPr>
                     </a:p>
@@ -11623,19 +11747,25 @@
                     <a:lstStyle/>
                     <a:p>
                       <a:r>
-                        <a:rPr lang="zh-TW" altLang="en-US" sz="1700">
+                        <a:rPr lang="zh-TW" altLang="en-US" sz="1700" dirty="0">
                           <a:effectLst/>
                         </a:rPr>
                         <a:t>支持 </a:t>
                       </a:r>
                       <a:r>
-                        <a:rPr lang="en-US" sz="1700">
+                        <a:rPr lang="en-US" sz="1700" dirty="0" err="1">
                           <a:effectLst/>
                         </a:rPr>
-                        <a:t>input、output、inout </a:t>
+                        <a:t>input、output、inout</a:t>
                       </a:r>
                       <a:r>
-                        <a:rPr lang="zh-TW" altLang="en-US" sz="1700">
+                        <a:rPr lang="en-US" sz="1700" dirty="0">
+                          <a:effectLst/>
+                        </a:rPr>
+                        <a:t> </a:t>
+                      </a:r>
+                      <a:r>
+                        <a:rPr lang="zh-TW" altLang="en-US" sz="1700" dirty="0">
                           <a:effectLst/>
                         </a:rPr>
                         <a:t>參數</a:t>
@@ -11654,19 +11784,25 @@
                     <a:lstStyle/>
                     <a:p>
                       <a:r>
-                        <a:rPr lang="zh-TW" altLang="en-US" sz="1700">
+                        <a:rPr lang="zh-TW" altLang="en-US" sz="1700" dirty="0">
                           <a:effectLst/>
                         </a:rPr>
                         <a:t>支持 </a:t>
                       </a:r>
                       <a:r>
-                        <a:rPr lang="en-US" sz="1700">
+                        <a:rPr lang="en-US" sz="1700" dirty="0" err="1">
                           <a:effectLst/>
                         </a:rPr>
-                        <a:t>input、output、inout </a:t>
+                        <a:t>input、output、inout</a:t>
                       </a:r>
                       <a:r>
-                        <a:rPr lang="zh-TW" altLang="en-US" sz="1700">
+                        <a:rPr lang="en-US" sz="1700" dirty="0">
+                          <a:effectLst/>
+                        </a:rPr>
+                        <a:t> </a:t>
+                      </a:r>
+                      <a:r>
+                        <a:rPr lang="zh-TW" altLang="en-US" sz="1700" dirty="0">
                           <a:effectLst/>
                         </a:rPr>
                         <a:t>參數</a:t>
@@ -11710,7 +11846,7 @@
                     <a:lstStyle/>
                     <a:p>
                       <a:r>
-                        <a:rPr lang="zh-TW" altLang="en-US" sz="1700">
+                        <a:rPr lang="zh-TW" altLang="en-US" sz="1700" dirty="0">
                           <a:effectLst/>
                         </a:rPr>
                         <a:t>用於組合邏輯計算（例如數學運算、邏輯處理）</a:t>

</xml_diff>

<commit_message>
Add: Communication example code 1. event 2. semaphore 3. mailbox 4. Communication slide
</commit_message>
<xml_diff>
--- a/SystemVerilog_語法學習.pptx
+++ b/SystemVerilog_語法學習.pptx
@@ -5,7 +5,7 @@
     <p:sldMasterId id="2147483648" r:id="rId1"/>
   </p:sldMasterIdLst>
   <p:notesMasterIdLst>
-    <p:notesMasterId r:id="rId37"/>
+    <p:notesMasterId r:id="rId44"/>
   </p:notesMasterIdLst>
   <p:sldIdLst>
     <p:sldId id="256" r:id="rId2"/>
@@ -43,6 +43,13 @@
     <p:sldId id="299" r:id="rId34"/>
     <p:sldId id="300" r:id="rId35"/>
     <p:sldId id="301" r:id="rId36"/>
+    <p:sldId id="302" r:id="rId37"/>
+    <p:sldId id="303" r:id="rId38"/>
+    <p:sldId id="304" r:id="rId39"/>
+    <p:sldId id="305" r:id="rId40"/>
+    <p:sldId id="307" r:id="rId41"/>
+    <p:sldId id="306" r:id="rId42"/>
+    <p:sldId id="308" r:id="rId43"/>
   </p:sldIdLst>
   <p:sldSz cx="12192000" cy="6858000"/>
   <p:notesSz cx="6858000" cy="9144000"/>
@@ -7377,6 +7384,16 @@
             <a:r>
               <a:rPr lang="en-US" altLang="zh-TW" dirty="0"/>
               <a:t>Processes</a:t>
+            </a:r>
+          </a:p>
+          <a:p>
+            <a:pPr marL="514350" indent="-514350">
+              <a:buFont typeface="+mj-lt"/>
+              <a:buAutoNum type="arabicPeriod"/>
+            </a:pPr>
+            <a:r>
+              <a:rPr lang="en-US" altLang="zh-TW" dirty="0"/>
+              <a:t>Communication</a:t>
             </a:r>
           </a:p>
           <a:p>
@@ -10921,11 +10938,11 @@
               <a:t>和</a:t>
             </a:r>
             <a:r>
-              <a:rPr lang="en-US" altLang="zh-TW"/>
+              <a:rPr lang="en-US" altLang="zh-TW" dirty="0"/>
               <a:t>@(negedge)</a:t>
             </a:r>
             <a:r>
-              <a:rPr lang="zh-TW" altLang="en-US"/>
+              <a:rPr lang="zh-TW" altLang="en-US" dirty="0"/>
               <a:t>。</a:t>
             </a:r>
             <a:endParaRPr lang="en-US" altLang="zh-TW" dirty="0"/>
@@ -12502,6 +12519,637 @@
 </p:sld>
 </file>
 
+<file path=ppt/slides/slide36.xml><?xml version="1.0" encoding="utf-8"?>
+<p:sld xmlns:a="http://schemas.openxmlformats.org/drawingml/2006/main" xmlns:r="http://schemas.openxmlformats.org/officeDocument/2006/relationships" xmlns:p="http://schemas.openxmlformats.org/presentationml/2006/main">
+  <p:cSld>
+    <p:spTree>
+      <p:nvGrpSpPr>
+        <p:cNvPr id="1" name="">
+          <a:extLst>
+            <a:ext uri="{FF2B5EF4-FFF2-40B4-BE49-F238E27FC236}">
+              <a16:creationId xmlns:a16="http://schemas.microsoft.com/office/drawing/2014/main" id="{646109C2-153D-E6CE-AB11-0BAE25733F0A}"/>
+            </a:ext>
+          </a:extLst>
+        </p:cNvPr>
+        <p:cNvGrpSpPr/>
+        <p:nvPr/>
+      </p:nvGrpSpPr>
+      <p:grpSpPr>
+        <a:xfrm>
+          <a:off x="0" y="0"/>
+          <a:ext cx="0" cy="0"/>
+          <a:chOff x="0" y="0"/>
+          <a:chExt cx="0" cy="0"/>
+        </a:xfrm>
+      </p:grpSpPr>
+      <p:sp>
+        <p:nvSpPr>
+          <p:cNvPr id="2" name="標題 1">
+            <a:extLst>
+              <a:ext uri="{FF2B5EF4-FFF2-40B4-BE49-F238E27FC236}">
+                <a16:creationId xmlns:a16="http://schemas.microsoft.com/office/drawing/2014/main" id="{BA36ADA6-96C3-DA56-817F-6E7A80CA7CC3}"/>
+              </a:ext>
+            </a:extLst>
+          </p:cNvPr>
+          <p:cNvSpPr>
+            <a:spLocks noGrp="1"/>
+          </p:cNvSpPr>
+          <p:nvPr>
+            <p:ph type="ctrTitle"/>
+          </p:nvPr>
+        </p:nvSpPr>
+        <p:spPr/>
+        <p:txBody>
+          <a:bodyPr/>
+          <a:lstStyle/>
+          <a:p>
+            <a:r>
+              <a:rPr lang="en-US" altLang="zh-TW" dirty="0"/>
+              <a:t>Chapter 4</a:t>
+            </a:r>
+            <a:endParaRPr lang="zh-TW" altLang="en-US" dirty="0"/>
+          </a:p>
+        </p:txBody>
+      </p:sp>
+      <p:sp>
+        <p:nvSpPr>
+          <p:cNvPr id="3" name="副標題 2">
+            <a:extLst>
+              <a:ext uri="{FF2B5EF4-FFF2-40B4-BE49-F238E27FC236}">
+                <a16:creationId xmlns:a16="http://schemas.microsoft.com/office/drawing/2014/main" id="{952C5AAD-46D0-C5DD-7EF2-198A0AC9307C}"/>
+              </a:ext>
+            </a:extLst>
+          </p:cNvPr>
+          <p:cNvSpPr>
+            <a:spLocks noGrp="1"/>
+          </p:cNvSpPr>
+          <p:nvPr>
+            <p:ph type="subTitle" idx="1"/>
+          </p:nvPr>
+        </p:nvSpPr>
+        <p:spPr/>
+        <p:txBody>
+          <a:bodyPr>
+            <a:normAutofit/>
+          </a:bodyPr>
+          <a:lstStyle/>
+          <a:p>
+            <a:r>
+              <a:rPr lang="en-US" altLang="zh-TW" sz="4000" dirty="0" err="1"/>
+              <a:t>Communiction</a:t>
+            </a:r>
+            <a:endParaRPr lang="en-US" altLang="zh-TW" sz="4000" dirty="0"/>
+          </a:p>
+        </p:txBody>
+      </p:sp>
+    </p:spTree>
+    <p:extLst>
+      <p:ext uri="{BB962C8B-B14F-4D97-AF65-F5344CB8AC3E}">
+        <p14:creationId xmlns:p14="http://schemas.microsoft.com/office/powerpoint/2010/main" val="2447614783"/>
+      </p:ext>
+    </p:extLst>
+  </p:cSld>
+  <p:clrMapOvr>
+    <a:masterClrMapping/>
+  </p:clrMapOvr>
+</p:sld>
+</file>
+
+<file path=ppt/slides/slide37.xml><?xml version="1.0" encoding="utf-8"?>
+<p:sld xmlns:a="http://schemas.openxmlformats.org/drawingml/2006/main" xmlns:r="http://schemas.openxmlformats.org/officeDocument/2006/relationships" xmlns:p="http://schemas.openxmlformats.org/presentationml/2006/main">
+  <p:cSld>
+    <p:spTree>
+      <p:nvGrpSpPr>
+        <p:cNvPr id="1" name="">
+          <a:extLst>
+            <a:ext uri="{FF2B5EF4-FFF2-40B4-BE49-F238E27FC236}">
+              <a16:creationId xmlns:a16="http://schemas.microsoft.com/office/drawing/2014/main" id="{10D38721-6357-0C22-61C1-BD5016BACF59}"/>
+            </a:ext>
+          </a:extLst>
+        </p:cNvPr>
+        <p:cNvGrpSpPr/>
+        <p:nvPr/>
+      </p:nvGrpSpPr>
+      <p:grpSpPr>
+        <a:xfrm>
+          <a:off x="0" y="0"/>
+          <a:ext cx="0" cy="0"/>
+          <a:chOff x="0" y="0"/>
+          <a:chExt cx="0" cy="0"/>
+        </a:xfrm>
+      </p:grpSpPr>
+      <p:sp>
+        <p:nvSpPr>
+          <p:cNvPr id="2" name="標題 1">
+            <a:extLst>
+              <a:ext uri="{FF2B5EF4-FFF2-40B4-BE49-F238E27FC236}">
+                <a16:creationId xmlns:a16="http://schemas.microsoft.com/office/drawing/2014/main" id="{2DD95C44-BFE2-1C63-4126-0DB1661238C3}"/>
+              </a:ext>
+            </a:extLst>
+          </p:cNvPr>
+          <p:cNvSpPr>
+            <a:spLocks noGrp="1"/>
+          </p:cNvSpPr>
+          <p:nvPr>
+            <p:ph type="title"/>
+          </p:nvPr>
+        </p:nvSpPr>
+        <p:spPr/>
+        <p:txBody>
+          <a:bodyPr/>
+          <a:lstStyle/>
+          <a:p>
+            <a:r>
+              <a:rPr lang="en-US" altLang="zh-TW" dirty="0" err="1"/>
+              <a:t>Communiction</a:t>
+            </a:r>
+            <a:r>
+              <a:rPr lang="en-US" altLang="zh-TW" dirty="0"/>
+              <a:t> (1/6)</a:t>
+            </a:r>
+            <a:endParaRPr lang="zh-TW" altLang="en-US" dirty="0"/>
+          </a:p>
+        </p:txBody>
+      </p:sp>
+      <p:sp>
+        <p:nvSpPr>
+          <p:cNvPr id="4" name="內容版面配置區 3">
+            <a:extLst>
+              <a:ext uri="{FF2B5EF4-FFF2-40B4-BE49-F238E27FC236}">
+                <a16:creationId xmlns:a16="http://schemas.microsoft.com/office/drawing/2014/main" id="{C3B4C1B7-C54A-996B-CDB9-07174BE87281}"/>
+              </a:ext>
+            </a:extLst>
+          </p:cNvPr>
+          <p:cNvSpPr>
+            <a:spLocks noGrp="1"/>
+          </p:cNvSpPr>
+          <p:nvPr>
+            <p:ph idx="1"/>
+          </p:nvPr>
+        </p:nvSpPr>
+        <p:spPr/>
+        <p:txBody>
+          <a:bodyPr/>
+          <a:lstStyle/>
+          <a:p>
+            <a:r>
+              <a:rPr lang="en-US" altLang="zh-TW" dirty="0"/>
+              <a:t>SV </a:t>
+            </a:r>
+            <a:r>
+              <a:rPr lang="zh-TW" altLang="en-US" dirty="0"/>
+              <a:t>分成三種 </a:t>
+            </a:r>
+            <a:r>
+              <a:rPr lang="en-US" altLang="zh-TW" dirty="0" err="1"/>
+              <a:t>Communiction</a:t>
+            </a:r>
+            <a:endParaRPr lang="zh-TW" altLang="en-US" dirty="0"/>
+          </a:p>
+        </p:txBody>
+      </p:sp>
+      <p:pic>
+        <p:nvPicPr>
+          <p:cNvPr id="5" name="圖片 4">
+            <a:extLst>
+              <a:ext uri="{FF2B5EF4-FFF2-40B4-BE49-F238E27FC236}">
+                <a16:creationId xmlns:a16="http://schemas.microsoft.com/office/drawing/2014/main" id="{8946284D-FA25-4D44-6A89-87280E03A576}"/>
+              </a:ext>
+            </a:extLst>
+          </p:cNvPr>
+          <p:cNvPicPr>
+            <a:picLocks noChangeAspect="1"/>
+          </p:cNvPicPr>
+          <p:nvPr/>
+        </p:nvPicPr>
+        <p:blipFill>
+          <a:blip r:embed="rId2"/>
+          <a:stretch>
+            <a:fillRect/>
+          </a:stretch>
+        </p:blipFill>
+        <p:spPr>
+          <a:xfrm>
+            <a:off x="1347322" y="2879271"/>
+            <a:ext cx="9497356" cy="3018753"/>
+          </a:xfrm>
+          <a:prstGeom prst="rect">
+            <a:avLst/>
+          </a:prstGeom>
+        </p:spPr>
+      </p:pic>
+    </p:spTree>
+    <p:extLst>
+      <p:ext uri="{BB962C8B-B14F-4D97-AF65-F5344CB8AC3E}">
+        <p14:creationId xmlns:p14="http://schemas.microsoft.com/office/powerpoint/2010/main" val="3417540699"/>
+      </p:ext>
+    </p:extLst>
+  </p:cSld>
+  <p:clrMapOvr>
+    <a:masterClrMapping/>
+  </p:clrMapOvr>
+</p:sld>
+</file>
+
+<file path=ppt/slides/slide38.xml><?xml version="1.0" encoding="utf-8"?>
+<p:sld xmlns:a="http://schemas.openxmlformats.org/drawingml/2006/main" xmlns:r="http://schemas.openxmlformats.org/officeDocument/2006/relationships" xmlns:p="http://schemas.openxmlformats.org/presentationml/2006/main">
+  <p:cSld>
+    <p:spTree>
+      <p:nvGrpSpPr>
+        <p:cNvPr id="1" name="">
+          <a:extLst>
+            <a:ext uri="{FF2B5EF4-FFF2-40B4-BE49-F238E27FC236}">
+              <a16:creationId xmlns:a16="http://schemas.microsoft.com/office/drawing/2014/main" id="{E2D8AB77-9F53-6FA4-EDF9-989DB0B0C4C2}"/>
+            </a:ext>
+          </a:extLst>
+        </p:cNvPr>
+        <p:cNvGrpSpPr/>
+        <p:nvPr/>
+      </p:nvGrpSpPr>
+      <p:grpSpPr>
+        <a:xfrm>
+          <a:off x="0" y="0"/>
+          <a:ext cx="0" cy="0"/>
+          <a:chOff x="0" y="0"/>
+          <a:chExt cx="0" cy="0"/>
+        </a:xfrm>
+      </p:grpSpPr>
+      <p:sp>
+        <p:nvSpPr>
+          <p:cNvPr id="2" name="標題 1">
+            <a:extLst>
+              <a:ext uri="{FF2B5EF4-FFF2-40B4-BE49-F238E27FC236}">
+                <a16:creationId xmlns:a16="http://schemas.microsoft.com/office/drawing/2014/main" id="{D4B43C5C-7B7A-ECD5-C960-545F55C66AA0}"/>
+              </a:ext>
+            </a:extLst>
+          </p:cNvPr>
+          <p:cNvSpPr>
+            <a:spLocks noGrp="1"/>
+          </p:cNvSpPr>
+          <p:nvPr>
+            <p:ph type="title"/>
+          </p:nvPr>
+        </p:nvSpPr>
+        <p:spPr/>
+        <p:txBody>
+          <a:bodyPr/>
+          <a:lstStyle/>
+          <a:p>
+            <a:r>
+              <a:rPr lang="en-US" altLang="zh-TW" dirty="0"/>
+              <a:t>Event (2/6)</a:t>
+            </a:r>
+            <a:endParaRPr lang="zh-TW" altLang="en-US" dirty="0"/>
+          </a:p>
+        </p:txBody>
+      </p:sp>
+      <p:sp>
+        <p:nvSpPr>
+          <p:cNvPr id="4" name="內容版面配置區 3">
+            <a:extLst>
+              <a:ext uri="{FF2B5EF4-FFF2-40B4-BE49-F238E27FC236}">
+                <a16:creationId xmlns:a16="http://schemas.microsoft.com/office/drawing/2014/main" id="{2B567AE6-D425-7C49-39F2-2239381EEFDF}"/>
+              </a:ext>
+            </a:extLst>
+          </p:cNvPr>
+          <p:cNvSpPr>
+            <a:spLocks noGrp="1"/>
+          </p:cNvSpPr>
+          <p:nvPr>
+            <p:ph idx="1"/>
+          </p:nvPr>
+        </p:nvSpPr>
+        <p:spPr/>
+        <p:txBody>
+          <a:bodyPr>
+            <a:normAutofit lnSpcReduction="10000"/>
+          </a:bodyPr>
+          <a:lstStyle/>
+          <a:p>
+            <a:r>
+              <a:rPr lang="en-US" altLang="zh-TW" dirty="0"/>
+              <a:t>Create event</a:t>
+            </a:r>
+          </a:p>
+          <a:p>
+            <a:pPr lvl="1"/>
+            <a:r>
+              <a:rPr lang="en-US" altLang="zh-TW" dirty="0"/>
+              <a:t>event 	</a:t>
+            </a:r>
+            <a:r>
+              <a:rPr lang="en-US" altLang="zh-TW" dirty="0" err="1"/>
+              <a:t>eventA</a:t>
+            </a:r>
+            <a:r>
+              <a:rPr lang="en-US" altLang="zh-TW" dirty="0"/>
+              <a:t>;  	// Creates an event called "</a:t>
+            </a:r>
+            <a:r>
+              <a:rPr lang="en-US" altLang="zh-TW" dirty="0" err="1"/>
+              <a:t>eventA</a:t>
+            </a:r>
+            <a:r>
+              <a:rPr lang="en-US" altLang="zh-TW" dirty="0"/>
+              <a:t>“</a:t>
+            </a:r>
+          </a:p>
+          <a:p>
+            <a:r>
+              <a:rPr lang="en-US" altLang="zh-TW" dirty="0"/>
+              <a:t>Trigger event</a:t>
+            </a:r>
+          </a:p>
+          <a:p>
+            <a:pPr lvl="1"/>
+            <a:r>
+              <a:rPr lang="en-US" altLang="zh-TW" dirty="0"/>
+              <a:t>-&gt; </a:t>
+            </a:r>
+            <a:r>
+              <a:rPr lang="en-US" altLang="zh-TW" dirty="0" err="1"/>
+              <a:t>eventA</a:t>
+            </a:r>
+            <a:r>
+              <a:rPr lang="en-US" altLang="zh-TW" dirty="0"/>
+              <a:t>; 	</a:t>
+            </a:r>
+          </a:p>
+          <a:p>
+            <a:r>
+              <a:rPr lang="en-US" altLang="zh-TW" dirty="0"/>
+              <a:t>Wait for event to happen</a:t>
+            </a:r>
+          </a:p>
+          <a:p>
+            <a:pPr lvl="1"/>
+            <a:r>
+              <a:rPr lang="en-US" altLang="zh-TW" dirty="0"/>
+              <a:t>@eventA; 		    </a:t>
+            </a:r>
+            <a:r>
+              <a:rPr lang="en-US" altLang="zh-TW" sz="1800" dirty="0"/>
+              <a:t>// Use "@" operator to wait for an event</a:t>
+            </a:r>
+            <a:endParaRPr lang="en-US" altLang="zh-TW" sz="1400" dirty="0"/>
+          </a:p>
+          <a:p>
+            <a:pPr lvl="1"/>
+            <a:r>
+              <a:rPr lang="en-US" altLang="zh-TW" dirty="0"/>
+              <a:t>wait (</a:t>
+            </a:r>
+            <a:r>
+              <a:rPr lang="en-US" altLang="zh-TW" dirty="0" err="1"/>
+              <a:t>eventA.triggered</a:t>
+            </a:r>
+            <a:r>
+              <a:rPr lang="en-US" altLang="zh-TW" dirty="0"/>
+              <a:t>);   </a:t>
+            </a:r>
+            <a:r>
+              <a:rPr lang="en-US" altLang="zh-TW" sz="1800" dirty="0"/>
+              <a:t>// Or use the wait statement with "</a:t>
+            </a:r>
+            <a:r>
+              <a:rPr lang="en-US" altLang="zh-TW" sz="1800" dirty="0" err="1"/>
+              <a:t>eventA.triggered</a:t>
+            </a:r>
+            <a:r>
+              <a:rPr lang="en-US" altLang="zh-TW" sz="1800" dirty="0"/>
+              <a:t>“</a:t>
+            </a:r>
+          </a:p>
+          <a:p>
+            <a:pPr lvl="2"/>
+            <a:r>
+              <a:rPr lang="zh-TW" altLang="en-US" dirty="0"/>
+              <a:t>使用 </a:t>
+            </a:r>
+            <a:r>
+              <a:rPr lang="en-US" altLang="zh-TW" dirty="0"/>
+              <a:t>.triggered</a:t>
+            </a:r>
+            <a:r>
+              <a:rPr lang="zh-TW" altLang="en-US" dirty="0"/>
+              <a:t> 可以避免 </a:t>
+            </a:r>
+            <a:r>
+              <a:rPr lang="en-US" altLang="zh-TW" dirty="0"/>
+              <a:t>race condition</a:t>
+            </a:r>
+          </a:p>
+          <a:p>
+            <a:r>
+              <a:rPr lang="en-US" altLang="zh-TW" dirty="0" err="1"/>
+              <a:t>wait_order</a:t>
+            </a:r>
+            <a:r>
+              <a:rPr lang="en-US" altLang="zh-TW" dirty="0"/>
+              <a:t>()</a:t>
+            </a:r>
+          </a:p>
+          <a:p>
+            <a:pPr lvl="1"/>
+            <a:r>
+              <a:rPr lang="zh-TW" altLang="en-US" dirty="0"/>
+              <a:t>用來判斷多個 </a:t>
+            </a:r>
+            <a:r>
+              <a:rPr lang="en-US" altLang="zh-TW" dirty="0"/>
+              <a:t>event </a:t>
+            </a:r>
+            <a:r>
+              <a:rPr lang="zh-TW" altLang="en-US" dirty="0"/>
+              <a:t>有沒有照順序</a:t>
+            </a:r>
+            <a:r>
+              <a:rPr lang="en-US" altLang="zh-TW" dirty="0"/>
+              <a:t>trigger</a:t>
+            </a:r>
+          </a:p>
+          <a:p>
+            <a:pPr lvl="1"/>
+            <a:r>
+              <a:rPr lang="en-US" altLang="zh-TW" dirty="0"/>
+              <a:t>Ex: </a:t>
+            </a:r>
+            <a:r>
+              <a:rPr lang="en-US" altLang="zh-TW" dirty="0" err="1"/>
+              <a:t>wait_order</a:t>
+            </a:r>
+            <a:r>
+              <a:rPr lang="en-US" altLang="zh-TW" dirty="0"/>
+              <a:t>(a, b)   // </a:t>
+            </a:r>
+            <a:r>
+              <a:rPr lang="zh-TW" altLang="en-US" dirty="0"/>
+              <a:t>觸發順序 </a:t>
+            </a:r>
+            <a:r>
+              <a:rPr lang="en-US" altLang="zh-TW" dirty="0"/>
+              <a:t>-&gt; a   -&gt; b</a:t>
+            </a:r>
+          </a:p>
+        </p:txBody>
+      </p:sp>
+    </p:spTree>
+    <p:extLst>
+      <p:ext uri="{BB962C8B-B14F-4D97-AF65-F5344CB8AC3E}">
+        <p14:creationId xmlns:p14="http://schemas.microsoft.com/office/powerpoint/2010/main" val="3837498663"/>
+      </p:ext>
+    </p:extLst>
+  </p:cSld>
+  <p:clrMapOvr>
+    <a:masterClrMapping/>
+  </p:clrMapOvr>
+</p:sld>
+</file>
+
+<file path=ppt/slides/slide39.xml><?xml version="1.0" encoding="utf-8"?>
+<p:sld xmlns:a="http://schemas.openxmlformats.org/drawingml/2006/main" xmlns:r="http://schemas.openxmlformats.org/officeDocument/2006/relationships" xmlns:p="http://schemas.openxmlformats.org/presentationml/2006/main">
+  <p:cSld>
+    <p:spTree>
+      <p:nvGrpSpPr>
+        <p:cNvPr id="1" name="">
+          <a:extLst>
+            <a:ext uri="{FF2B5EF4-FFF2-40B4-BE49-F238E27FC236}">
+              <a16:creationId xmlns:a16="http://schemas.microsoft.com/office/drawing/2014/main" id="{BB614389-0B22-F8C3-E2DB-FA098FD24485}"/>
+            </a:ext>
+          </a:extLst>
+        </p:cNvPr>
+        <p:cNvGrpSpPr/>
+        <p:nvPr/>
+      </p:nvGrpSpPr>
+      <p:grpSpPr>
+        <a:xfrm>
+          <a:off x="0" y="0"/>
+          <a:ext cx="0" cy="0"/>
+          <a:chOff x="0" y="0"/>
+          <a:chExt cx="0" cy="0"/>
+        </a:xfrm>
+      </p:grpSpPr>
+      <p:sp>
+        <p:nvSpPr>
+          <p:cNvPr id="2" name="標題 1">
+            <a:extLst>
+              <a:ext uri="{FF2B5EF4-FFF2-40B4-BE49-F238E27FC236}">
+                <a16:creationId xmlns:a16="http://schemas.microsoft.com/office/drawing/2014/main" id="{87E10C22-ACF7-6E46-1AEF-5FDBAF65F5BB}"/>
+              </a:ext>
+            </a:extLst>
+          </p:cNvPr>
+          <p:cNvSpPr>
+            <a:spLocks noGrp="1"/>
+          </p:cNvSpPr>
+          <p:nvPr>
+            <p:ph type="title"/>
+          </p:nvPr>
+        </p:nvSpPr>
+        <p:spPr/>
+        <p:txBody>
+          <a:bodyPr/>
+          <a:lstStyle/>
+          <a:p>
+            <a:r>
+              <a:rPr lang="en-US" altLang="zh-TW" dirty="0"/>
+              <a:t>Semaphore (3/6)</a:t>
+            </a:r>
+            <a:endParaRPr lang="zh-TW" altLang="en-US" dirty="0"/>
+          </a:p>
+        </p:txBody>
+      </p:sp>
+      <p:sp>
+        <p:nvSpPr>
+          <p:cNvPr id="4" name="內容版面配置區 3">
+            <a:extLst>
+              <a:ext uri="{FF2B5EF4-FFF2-40B4-BE49-F238E27FC236}">
+                <a16:creationId xmlns:a16="http://schemas.microsoft.com/office/drawing/2014/main" id="{E8CA18A7-69AE-3BF1-3303-6D47E7D46D04}"/>
+              </a:ext>
+            </a:extLst>
+          </p:cNvPr>
+          <p:cNvSpPr>
+            <a:spLocks noGrp="1"/>
+          </p:cNvSpPr>
+          <p:nvPr>
+            <p:ph idx="1"/>
+          </p:nvPr>
+        </p:nvSpPr>
+        <p:spPr/>
+        <p:txBody>
+          <a:bodyPr/>
+          <a:lstStyle/>
+          <a:p>
+            <a:r>
+              <a:rPr lang="en-US" altLang="zh-TW" dirty="0"/>
+              <a:t>Create semaphore</a:t>
+            </a:r>
+          </a:p>
+          <a:p>
+            <a:pPr lvl="1"/>
+            <a:r>
+              <a:rPr lang="en-US" altLang="zh-TW" dirty="0"/>
+              <a:t>semaphore key;</a:t>
+            </a:r>
+            <a:br>
+              <a:rPr lang="en-US" altLang="zh-TW" dirty="0"/>
+            </a:br>
+            <a:r>
+              <a:rPr lang="en-US" altLang="zh-TW" dirty="0"/>
+              <a:t>key = new (1);        // Argument to new () defines the number of keys.</a:t>
+            </a:r>
+          </a:p>
+          <a:p>
+            <a:r>
+              <a:rPr lang="en-US" altLang="zh-TW" dirty="0"/>
+              <a:t>Use semaphore</a:t>
+            </a:r>
+          </a:p>
+          <a:p>
+            <a:pPr lvl="1"/>
+            <a:r>
+              <a:rPr lang="en-US" altLang="zh-TW" dirty="0"/>
+              <a:t>get () </a:t>
+            </a:r>
+          </a:p>
+          <a:p>
+            <a:pPr lvl="2"/>
+            <a:r>
+              <a:rPr lang="en-US" altLang="zh-TW" dirty="0"/>
+              <a:t>get the key by using get (), the keyword which will wait until a key is available</a:t>
+            </a:r>
+          </a:p>
+          <a:p>
+            <a:pPr lvl="1"/>
+            <a:r>
+              <a:rPr lang="en-US" altLang="zh-TW" dirty="0"/>
+              <a:t>put()</a:t>
+            </a:r>
+          </a:p>
+          <a:p>
+            <a:pPr lvl="2"/>
+            <a:r>
+              <a:rPr lang="en-US" altLang="zh-TW" dirty="0"/>
+              <a:t>put the key back using the put () keyword</a:t>
+            </a:r>
+          </a:p>
+          <a:p>
+            <a:endParaRPr lang="zh-TW" altLang="en-US" dirty="0"/>
+          </a:p>
+        </p:txBody>
+      </p:sp>
+    </p:spTree>
+    <p:extLst>
+      <p:ext uri="{BB962C8B-B14F-4D97-AF65-F5344CB8AC3E}">
+        <p14:creationId xmlns:p14="http://schemas.microsoft.com/office/powerpoint/2010/main" val="2359123942"/>
+      </p:ext>
+    </p:extLst>
+  </p:cSld>
+  <p:clrMapOvr>
+    <a:masterClrMapping/>
+  </p:clrMapOvr>
+</p:sld>
+</file>
+
 <file path=ppt/slides/slide4.xml><?xml version="1.0" encoding="utf-8"?>
 <p:sld xmlns:a="http://schemas.openxmlformats.org/drawingml/2006/main" xmlns:r="http://schemas.openxmlformats.org/officeDocument/2006/relationships" xmlns:p="http://schemas.openxmlformats.org/presentationml/2006/main">
   <p:cSld>
@@ -12675,6 +13323,426 @@
     <p:extLst>
       <p:ext uri="{BB962C8B-B14F-4D97-AF65-F5344CB8AC3E}">
         <p14:creationId xmlns:p14="http://schemas.microsoft.com/office/powerpoint/2010/main" val="1276826767"/>
+      </p:ext>
+    </p:extLst>
+  </p:cSld>
+  <p:clrMapOvr>
+    <a:masterClrMapping/>
+  </p:clrMapOvr>
+</p:sld>
+</file>
+
+<file path=ppt/slides/slide40.xml><?xml version="1.0" encoding="utf-8"?>
+<p:sld xmlns:a="http://schemas.openxmlformats.org/drawingml/2006/main" xmlns:r="http://schemas.openxmlformats.org/officeDocument/2006/relationships" xmlns:p="http://schemas.openxmlformats.org/presentationml/2006/main">
+  <p:cSld>
+    <p:spTree>
+      <p:nvGrpSpPr>
+        <p:cNvPr id="1" name="">
+          <a:extLst>
+            <a:ext uri="{FF2B5EF4-FFF2-40B4-BE49-F238E27FC236}">
+              <a16:creationId xmlns:a16="http://schemas.microsoft.com/office/drawing/2014/main" id="{58B5D6F1-404D-9175-2724-E3E6E28D6154}"/>
+            </a:ext>
+          </a:extLst>
+        </p:cNvPr>
+        <p:cNvGrpSpPr/>
+        <p:nvPr/>
+      </p:nvGrpSpPr>
+      <p:grpSpPr>
+        <a:xfrm>
+          <a:off x="0" y="0"/>
+          <a:ext cx="0" cy="0"/>
+          <a:chOff x="0" y="0"/>
+          <a:chExt cx="0" cy="0"/>
+        </a:xfrm>
+      </p:grpSpPr>
+      <p:sp>
+        <p:nvSpPr>
+          <p:cNvPr id="2" name="標題 1">
+            <a:extLst>
+              <a:ext uri="{FF2B5EF4-FFF2-40B4-BE49-F238E27FC236}">
+                <a16:creationId xmlns:a16="http://schemas.microsoft.com/office/drawing/2014/main" id="{C46061A6-61CC-2B04-DA3C-51A59CA3EAFF}"/>
+              </a:ext>
+            </a:extLst>
+          </p:cNvPr>
+          <p:cNvSpPr>
+            <a:spLocks noGrp="1"/>
+          </p:cNvSpPr>
+          <p:nvPr>
+            <p:ph type="title"/>
+          </p:nvPr>
+        </p:nvSpPr>
+        <p:spPr/>
+        <p:txBody>
+          <a:bodyPr/>
+          <a:lstStyle/>
+          <a:p>
+            <a:r>
+              <a:rPr lang="en-US" altLang="zh-TW" dirty="0"/>
+              <a:t>Semaphore (4/6)</a:t>
+            </a:r>
+            <a:endParaRPr lang="zh-TW" altLang="en-US" dirty="0"/>
+          </a:p>
+        </p:txBody>
+      </p:sp>
+      <p:sp>
+        <p:nvSpPr>
+          <p:cNvPr id="4" name="內容版面配置區 3">
+            <a:extLst>
+              <a:ext uri="{FF2B5EF4-FFF2-40B4-BE49-F238E27FC236}">
+                <a16:creationId xmlns:a16="http://schemas.microsoft.com/office/drawing/2014/main" id="{2EA95157-1F6E-5ACF-6734-53993764F863}"/>
+              </a:ext>
+            </a:extLst>
+          </p:cNvPr>
+          <p:cNvSpPr>
+            <a:spLocks noGrp="1"/>
+          </p:cNvSpPr>
+          <p:nvPr>
+            <p:ph idx="1"/>
+          </p:nvPr>
+        </p:nvSpPr>
+        <p:spPr/>
+        <p:txBody>
+          <a:bodyPr/>
+          <a:lstStyle/>
+          <a:p>
+            <a:r>
+              <a:rPr lang="en-US" altLang="zh-TW" dirty="0"/>
+              <a:t>Semaphore Methods</a:t>
+            </a:r>
+            <a:endParaRPr lang="zh-TW" altLang="en-US" dirty="0"/>
+          </a:p>
+        </p:txBody>
+      </p:sp>
+      <p:pic>
+        <p:nvPicPr>
+          <p:cNvPr id="5" name="圖片 4">
+            <a:extLst>
+              <a:ext uri="{FF2B5EF4-FFF2-40B4-BE49-F238E27FC236}">
+                <a16:creationId xmlns:a16="http://schemas.microsoft.com/office/drawing/2014/main" id="{6A03D696-2939-E451-1291-7AB382BAD1EA}"/>
+              </a:ext>
+            </a:extLst>
+          </p:cNvPr>
+          <p:cNvPicPr>
+            <a:picLocks noChangeAspect="1"/>
+          </p:cNvPicPr>
+          <p:nvPr/>
+        </p:nvPicPr>
+        <p:blipFill>
+          <a:blip r:embed="rId2"/>
+          <a:stretch>
+            <a:fillRect/>
+          </a:stretch>
+        </p:blipFill>
+        <p:spPr>
+          <a:xfrm>
+            <a:off x="1629395" y="2580483"/>
+            <a:ext cx="8933209" cy="3687546"/>
+          </a:xfrm>
+          <a:prstGeom prst="rect">
+            <a:avLst/>
+          </a:prstGeom>
+        </p:spPr>
+      </p:pic>
+    </p:spTree>
+    <p:extLst>
+      <p:ext uri="{BB962C8B-B14F-4D97-AF65-F5344CB8AC3E}">
+        <p14:creationId xmlns:p14="http://schemas.microsoft.com/office/powerpoint/2010/main" val="2142398511"/>
+      </p:ext>
+    </p:extLst>
+  </p:cSld>
+  <p:clrMapOvr>
+    <a:masterClrMapping/>
+  </p:clrMapOvr>
+</p:sld>
+</file>
+
+<file path=ppt/slides/slide41.xml><?xml version="1.0" encoding="utf-8"?>
+<p:sld xmlns:a="http://schemas.openxmlformats.org/drawingml/2006/main" xmlns:r="http://schemas.openxmlformats.org/officeDocument/2006/relationships" xmlns:p="http://schemas.openxmlformats.org/presentationml/2006/main">
+  <p:cSld>
+    <p:spTree>
+      <p:nvGrpSpPr>
+        <p:cNvPr id="1" name="">
+          <a:extLst>
+            <a:ext uri="{FF2B5EF4-FFF2-40B4-BE49-F238E27FC236}">
+              <a16:creationId xmlns:a16="http://schemas.microsoft.com/office/drawing/2014/main" id="{3B2CF581-B314-B169-4CDC-ACA41640DE41}"/>
+            </a:ext>
+          </a:extLst>
+        </p:cNvPr>
+        <p:cNvGrpSpPr/>
+        <p:nvPr/>
+      </p:nvGrpSpPr>
+      <p:grpSpPr>
+        <a:xfrm>
+          <a:off x="0" y="0"/>
+          <a:ext cx="0" cy="0"/>
+          <a:chOff x="0" y="0"/>
+          <a:chExt cx="0" cy="0"/>
+        </a:xfrm>
+      </p:grpSpPr>
+      <p:sp>
+        <p:nvSpPr>
+          <p:cNvPr id="2" name="標題 1">
+            <a:extLst>
+              <a:ext uri="{FF2B5EF4-FFF2-40B4-BE49-F238E27FC236}">
+                <a16:creationId xmlns:a16="http://schemas.microsoft.com/office/drawing/2014/main" id="{CC0E755A-7D32-13C6-01C4-9041303D4A5D}"/>
+              </a:ext>
+            </a:extLst>
+          </p:cNvPr>
+          <p:cNvSpPr>
+            <a:spLocks noGrp="1"/>
+          </p:cNvSpPr>
+          <p:nvPr>
+            <p:ph type="title"/>
+          </p:nvPr>
+        </p:nvSpPr>
+        <p:spPr/>
+        <p:txBody>
+          <a:bodyPr/>
+          <a:lstStyle/>
+          <a:p>
+            <a:r>
+              <a:rPr lang="en-US" altLang="zh-TW" dirty="0"/>
+              <a:t>Mailbox (5/6)</a:t>
+            </a:r>
+            <a:endParaRPr lang="zh-TW" altLang="en-US" dirty="0"/>
+          </a:p>
+        </p:txBody>
+      </p:sp>
+      <p:sp>
+        <p:nvSpPr>
+          <p:cNvPr id="4" name="內容版面配置區 3">
+            <a:extLst>
+              <a:ext uri="{FF2B5EF4-FFF2-40B4-BE49-F238E27FC236}">
+                <a16:creationId xmlns:a16="http://schemas.microsoft.com/office/drawing/2014/main" id="{F7546A11-C0B2-8275-DE09-3087FC789026}"/>
+              </a:ext>
+            </a:extLst>
+          </p:cNvPr>
+          <p:cNvSpPr>
+            <a:spLocks noGrp="1"/>
+          </p:cNvSpPr>
+          <p:nvPr>
+            <p:ph idx="1"/>
+          </p:nvPr>
+        </p:nvSpPr>
+        <p:spPr/>
+        <p:txBody>
+          <a:bodyPr/>
+          <a:lstStyle/>
+          <a:p>
+            <a:r>
+              <a:rPr lang="en-US" altLang="zh-TW" dirty="0"/>
+              <a:t>Create mailbox</a:t>
+            </a:r>
+          </a:p>
+          <a:p>
+            <a:pPr lvl="1"/>
+            <a:r>
+              <a:rPr lang="en-US" altLang="zh-TW" dirty="0"/>
+              <a:t>mailbox </a:t>
+            </a:r>
+            <a:r>
+              <a:rPr lang="en-US" altLang="zh-TW" dirty="0" err="1"/>
+              <a:t>mbx</a:t>
+            </a:r>
+            <a:r>
+              <a:rPr lang="en-US" altLang="zh-TW" dirty="0"/>
+              <a:t>;</a:t>
+            </a:r>
+          </a:p>
+          <a:p>
+            <a:endParaRPr lang="en-US" altLang="zh-TW" dirty="0"/>
+          </a:p>
+          <a:p>
+            <a:r>
+              <a:rPr lang="en-US" altLang="zh-TW" dirty="0"/>
+              <a:t>Use mailbox</a:t>
+            </a:r>
+          </a:p>
+          <a:p>
+            <a:pPr lvl="1"/>
+            <a:r>
+              <a:rPr lang="en-US" altLang="zh-TW" dirty="0" err="1"/>
+              <a:t>mbx.put</a:t>
+            </a:r>
+            <a:r>
+              <a:rPr lang="en-US" altLang="zh-TW" dirty="0"/>
+              <a:t> (</a:t>
+            </a:r>
+            <a:r>
+              <a:rPr lang="en-US" altLang="zh-TW" dirty="0" err="1"/>
+              <a:t>trns</a:t>
+            </a:r>
+            <a:r>
+              <a:rPr lang="en-US" altLang="zh-TW" dirty="0"/>
+              <a:t>);  //</a:t>
+            </a:r>
+            <a:r>
+              <a:rPr lang="zh-TW" altLang="en-US" dirty="0"/>
+              <a:t> 放入物件</a:t>
+            </a:r>
+            <a:endParaRPr lang="en-US" altLang="zh-TW" dirty="0"/>
+          </a:p>
+          <a:p>
+            <a:pPr lvl="1"/>
+            <a:r>
+              <a:rPr lang="en-US" altLang="zh-TW" dirty="0" err="1"/>
+              <a:t>mbx.get</a:t>
+            </a:r>
+            <a:r>
+              <a:rPr lang="en-US" altLang="zh-TW" dirty="0"/>
+              <a:t> (</a:t>
+            </a:r>
+            <a:r>
+              <a:rPr lang="en-US" altLang="zh-TW" dirty="0" err="1"/>
+              <a:t>trns</a:t>
+            </a:r>
+            <a:r>
+              <a:rPr lang="en-US" altLang="zh-TW" dirty="0"/>
+              <a:t>);</a:t>
+            </a:r>
+            <a:r>
+              <a:rPr lang="zh-TW" altLang="en-US" dirty="0"/>
+              <a:t>  </a:t>
+            </a:r>
+            <a:r>
+              <a:rPr lang="en-US" altLang="zh-TW" dirty="0"/>
+              <a:t>// </a:t>
+            </a:r>
+            <a:r>
+              <a:rPr lang="zh-TW" altLang="en-US" dirty="0"/>
+              <a:t>取出物件</a:t>
+            </a:r>
+          </a:p>
+        </p:txBody>
+      </p:sp>
+    </p:spTree>
+    <p:extLst>
+      <p:ext uri="{BB962C8B-B14F-4D97-AF65-F5344CB8AC3E}">
+        <p14:creationId xmlns:p14="http://schemas.microsoft.com/office/powerpoint/2010/main" val="559800636"/>
+      </p:ext>
+    </p:extLst>
+  </p:cSld>
+  <p:clrMapOvr>
+    <a:masterClrMapping/>
+  </p:clrMapOvr>
+</p:sld>
+</file>
+
+<file path=ppt/slides/slide42.xml><?xml version="1.0" encoding="utf-8"?>
+<p:sld xmlns:a="http://schemas.openxmlformats.org/drawingml/2006/main" xmlns:r="http://schemas.openxmlformats.org/officeDocument/2006/relationships" xmlns:p="http://schemas.openxmlformats.org/presentationml/2006/main">
+  <p:cSld>
+    <p:spTree>
+      <p:nvGrpSpPr>
+        <p:cNvPr id="1" name="">
+          <a:extLst>
+            <a:ext uri="{FF2B5EF4-FFF2-40B4-BE49-F238E27FC236}">
+              <a16:creationId xmlns:a16="http://schemas.microsoft.com/office/drawing/2014/main" id="{86C53A65-3D77-63CA-1855-B710A44B9A23}"/>
+            </a:ext>
+          </a:extLst>
+        </p:cNvPr>
+        <p:cNvGrpSpPr/>
+        <p:nvPr/>
+      </p:nvGrpSpPr>
+      <p:grpSpPr>
+        <a:xfrm>
+          <a:off x="0" y="0"/>
+          <a:ext cx="0" cy="0"/>
+          <a:chOff x="0" y="0"/>
+          <a:chExt cx="0" cy="0"/>
+        </a:xfrm>
+      </p:grpSpPr>
+      <p:sp>
+        <p:nvSpPr>
+          <p:cNvPr id="2" name="標題 1">
+            <a:extLst>
+              <a:ext uri="{FF2B5EF4-FFF2-40B4-BE49-F238E27FC236}">
+                <a16:creationId xmlns:a16="http://schemas.microsoft.com/office/drawing/2014/main" id="{EC5514A7-810C-3861-9500-A6AB19CEFB66}"/>
+              </a:ext>
+            </a:extLst>
+          </p:cNvPr>
+          <p:cNvSpPr>
+            <a:spLocks noGrp="1"/>
+          </p:cNvSpPr>
+          <p:nvPr>
+            <p:ph type="title"/>
+          </p:nvPr>
+        </p:nvSpPr>
+        <p:spPr/>
+        <p:txBody>
+          <a:bodyPr/>
+          <a:lstStyle/>
+          <a:p>
+            <a:r>
+              <a:rPr lang="en-US" altLang="zh-TW" dirty="0"/>
+              <a:t>Mailbox (6/6)</a:t>
+            </a:r>
+            <a:endParaRPr lang="zh-TW" altLang="en-US" dirty="0"/>
+          </a:p>
+        </p:txBody>
+      </p:sp>
+      <p:sp>
+        <p:nvSpPr>
+          <p:cNvPr id="4" name="內容版面配置區 3">
+            <a:extLst>
+              <a:ext uri="{FF2B5EF4-FFF2-40B4-BE49-F238E27FC236}">
+                <a16:creationId xmlns:a16="http://schemas.microsoft.com/office/drawing/2014/main" id="{27290C4A-5CD7-ECC8-8EE7-7D8B8BDA728A}"/>
+              </a:ext>
+            </a:extLst>
+          </p:cNvPr>
+          <p:cNvSpPr>
+            <a:spLocks noGrp="1"/>
+          </p:cNvSpPr>
+          <p:nvPr>
+            <p:ph idx="1"/>
+          </p:nvPr>
+        </p:nvSpPr>
+        <p:spPr/>
+        <p:txBody>
+          <a:bodyPr/>
+          <a:lstStyle/>
+          <a:p>
+            <a:r>
+              <a:rPr lang="en-US" altLang="zh-TW" dirty="0"/>
+              <a:t>Mailbox Methods</a:t>
+            </a:r>
+            <a:endParaRPr lang="zh-TW" altLang="en-US" dirty="0"/>
+          </a:p>
+        </p:txBody>
+      </p:sp>
+      <p:pic>
+        <p:nvPicPr>
+          <p:cNvPr id="5" name="圖片 4">
+            <a:extLst>
+              <a:ext uri="{FF2B5EF4-FFF2-40B4-BE49-F238E27FC236}">
+                <a16:creationId xmlns:a16="http://schemas.microsoft.com/office/drawing/2014/main" id="{F42CE9DB-93FB-9124-A879-C630126AD2B0}"/>
+              </a:ext>
+            </a:extLst>
+          </p:cNvPr>
+          <p:cNvPicPr>
+            <a:picLocks noChangeAspect="1"/>
+          </p:cNvPicPr>
+          <p:nvPr/>
+        </p:nvPicPr>
+        <p:blipFill>
+          <a:blip r:embed="rId2"/>
+          <a:stretch>
+            <a:fillRect/>
+          </a:stretch>
+        </p:blipFill>
+        <p:spPr>
+          <a:xfrm>
+            <a:off x="4947556" y="681037"/>
+            <a:ext cx="6240212" cy="5780313"/>
+          </a:xfrm>
+          <a:prstGeom prst="rect">
+            <a:avLst/>
+          </a:prstGeom>
+        </p:spPr>
+      </p:pic>
+    </p:spTree>
+    <p:extLst>
+      <p:ext uri="{BB962C8B-B14F-4D97-AF65-F5344CB8AC3E}">
+        <p14:creationId xmlns:p14="http://schemas.microsoft.com/office/powerpoint/2010/main" val="968788860"/>
       </p:ext>
     </p:extLst>
   </p:cSld>

</xml_diff>

<commit_message>
Modify: SystemVerilog_語法學習.pptx 1. Add Function Coverage slide
</commit_message>
<xml_diff>
--- a/SystemVerilog_語法學習.pptx
+++ b/SystemVerilog_語法學習.pptx
@@ -5,7 +5,7 @@
     <p:sldMasterId id="2147483648" r:id="rId1"/>
   </p:sldMasterIdLst>
   <p:notesMasterIdLst>
-    <p:notesMasterId r:id="rId44"/>
+    <p:notesMasterId r:id="rId45"/>
   </p:notesMasterIdLst>
   <p:sldIdLst>
     <p:sldId id="256" r:id="rId2"/>
@@ -50,6 +50,7 @@
     <p:sldId id="307" r:id="rId41"/>
     <p:sldId id="306" r:id="rId42"/>
     <p:sldId id="308" r:id="rId43"/>
+    <p:sldId id="309" r:id="rId44"/>
   </p:sldIdLst>
   <p:sldSz cx="12192000" cy="6858000"/>
   <p:notesSz cx="6858000" cy="9144000"/>
@@ -7394,6 +7395,16 @@
             <a:r>
               <a:rPr lang="en-US" altLang="zh-TW" dirty="0"/>
               <a:t>Communication</a:t>
+            </a:r>
+          </a:p>
+          <a:p>
+            <a:pPr marL="514350" indent="-514350">
+              <a:buFont typeface="+mj-lt"/>
+              <a:buAutoNum type="arabicPeriod"/>
+            </a:pPr>
+            <a:r>
+              <a:rPr lang="en-US" altLang="zh-TW" dirty="0"/>
+              <a:t>Function Coverage</a:t>
             </a:r>
           </a:p>
           <a:p>
@@ -13752,6 +13763,101 @@
 </p:sld>
 </file>
 
+<file path=ppt/slides/slide43.xml><?xml version="1.0" encoding="utf-8"?>
+<p:sld xmlns:a="http://schemas.openxmlformats.org/drawingml/2006/main" xmlns:r="http://schemas.openxmlformats.org/officeDocument/2006/relationships" xmlns:p="http://schemas.openxmlformats.org/presentationml/2006/main">
+  <p:cSld>
+    <p:spTree>
+      <p:nvGrpSpPr>
+        <p:cNvPr id="1" name="">
+          <a:extLst>
+            <a:ext uri="{FF2B5EF4-FFF2-40B4-BE49-F238E27FC236}">
+              <a16:creationId xmlns:a16="http://schemas.microsoft.com/office/drawing/2014/main" id="{0467E7CA-04F3-FB4F-99A5-769562A5D4AC}"/>
+            </a:ext>
+          </a:extLst>
+        </p:cNvPr>
+        <p:cNvGrpSpPr/>
+        <p:nvPr/>
+      </p:nvGrpSpPr>
+      <p:grpSpPr>
+        <a:xfrm>
+          <a:off x="0" y="0"/>
+          <a:ext cx="0" cy="0"/>
+          <a:chOff x="0" y="0"/>
+          <a:chExt cx="0" cy="0"/>
+        </a:xfrm>
+      </p:grpSpPr>
+      <p:sp>
+        <p:nvSpPr>
+          <p:cNvPr id="2" name="標題 1">
+            <a:extLst>
+              <a:ext uri="{FF2B5EF4-FFF2-40B4-BE49-F238E27FC236}">
+                <a16:creationId xmlns:a16="http://schemas.microsoft.com/office/drawing/2014/main" id="{BE168F07-F108-CDAA-67BF-C14F7B2E16C3}"/>
+              </a:ext>
+            </a:extLst>
+          </p:cNvPr>
+          <p:cNvSpPr>
+            <a:spLocks noGrp="1"/>
+          </p:cNvSpPr>
+          <p:nvPr>
+            <p:ph type="ctrTitle"/>
+          </p:nvPr>
+        </p:nvSpPr>
+        <p:spPr/>
+        <p:txBody>
+          <a:bodyPr/>
+          <a:lstStyle/>
+          <a:p>
+            <a:r>
+              <a:rPr lang="en-US" altLang="zh-TW" dirty="0"/>
+              <a:t>Chapter 5</a:t>
+            </a:r>
+            <a:endParaRPr lang="zh-TW" altLang="en-US" dirty="0"/>
+          </a:p>
+        </p:txBody>
+      </p:sp>
+      <p:sp>
+        <p:nvSpPr>
+          <p:cNvPr id="3" name="副標題 2">
+            <a:extLst>
+              <a:ext uri="{FF2B5EF4-FFF2-40B4-BE49-F238E27FC236}">
+                <a16:creationId xmlns:a16="http://schemas.microsoft.com/office/drawing/2014/main" id="{82322D99-88F6-4350-7A5E-3EB5F555AD21}"/>
+              </a:ext>
+            </a:extLst>
+          </p:cNvPr>
+          <p:cNvSpPr>
+            <a:spLocks noGrp="1"/>
+          </p:cNvSpPr>
+          <p:nvPr>
+            <p:ph type="subTitle" idx="1"/>
+          </p:nvPr>
+        </p:nvSpPr>
+        <p:spPr/>
+        <p:txBody>
+          <a:bodyPr>
+            <a:normAutofit/>
+          </a:bodyPr>
+          <a:lstStyle/>
+          <a:p>
+            <a:r>
+              <a:rPr lang="en-US" altLang="zh-TW" sz="4000" dirty="0"/>
+              <a:t>Function Coverage</a:t>
+            </a:r>
+          </a:p>
+        </p:txBody>
+      </p:sp>
+    </p:spTree>
+    <p:extLst>
+      <p:ext uri="{BB962C8B-B14F-4D97-AF65-F5344CB8AC3E}">
+        <p14:creationId xmlns:p14="http://schemas.microsoft.com/office/powerpoint/2010/main" val="2623448336"/>
+      </p:ext>
+    </p:extLst>
+  </p:cSld>
+  <p:clrMapOvr>
+    <a:masterClrMapping/>
+  </p:clrMapOvr>
+</p:sld>
+</file>
+
 <file path=ppt/slides/slide5.xml><?xml version="1.0" encoding="utf-8"?>
 <p:sld xmlns:a="http://schemas.openxmlformats.org/drawingml/2006/main" xmlns:r="http://schemas.openxmlformats.org/officeDocument/2006/relationships" xmlns:p="http://schemas.openxmlformats.org/presentationml/2006/main">
   <p:cSld>

</xml_diff>

<commit_message>
Add: interface example code 1. Add interface 2. Add modport 3. Add clocking block 4. modify SystemVerilog_語法學習.pptx
</commit_message>
<xml_diff>
--- a/SystemVerilog_語法學習.pptx
+++ b/SystemVerilog_語法學習.pptx
@@ -5,7 +5,7 @@
     <p:sldMasterId id="2147483648" r:id="rId1"/>
   </p:sldMasterIdLst>
   <p:notesMasterIdLst>
-    <p:notesMasterId r:id="rId45"/>
+    <p:notesMasterId r:id="rId48"/>
   </p:notesMasterIdLst>
   <p:sldIdLst>
     <p:sldId id="256" r:id="rId2"/>
@@ -51,6 +51,9 @@
     <p:sldId id="306" r:id="rId42"/>
     <p:sldId id="308" r:id="rId43"/>
     <p:sldId id="309" r:id="rId44"/>
+    <p:sldId id="310" r:id="rId45"/>
+    <p:sldId id="311" r:id="rId46"/>
+    <p:sldId id="312" r:id="rId47"/>
   </p:sldIdLst>
   <p:sldSz cx="12192000" cy="6858000"/>
   <p:notesSz cx="6858000" cy="9144000"/>
@@ -239,7 +242,7 @@
           <a:p>
             <a:fld id="{28C483A5-4075-4A6E-B921-74BFA7B8EF67}" type="datetimeFigureOut">
               <a:rPr lang="zh-TW" altLang="en-US" smtClean="0"/>
-              <a:t>2025/5/3</a:t>
+              <a:t>2025/5/8</a:t>
             </a:fld>
             <a:endParaRPr lang="zh-TW" altLang="en-US"/>
           </a:p>
@@ -821,7 +824,7 @@
           <a:p>
             <a:fld id="{2365240E-6CA3-4772-8803-719FF1315E51}" type="datetimeFigureOut">
               <a:rPr lang="zh-TW" altLang="en-US" smtClean="0"/>
-              <a:t>2025/5/3</a:t>
+              <a:t>2025/5/8</a:t>
             </a:fld>
             <a:endParaRPr lang="zh-TW" altLang="en-US"/>
           </a:p>
@@ -1019,7 +1022,7 @@
           <a:p>
             <a:fld id="{2365240E-6CA3-4772-8803-719FF1315E51}" type="datetimeFigureOut">
               <a:rPr lang="zh-TW" altLang="en-US" smtClean="0"/>
-              <a:t>2025/5/3</a:t>
+              <a:t>2025/5/8</a:t>
             </a:fld>
             <a:endParaRPr lang="zh-TW" altLang="en-US"/>
           </a:p>
@@ -1227,7 +1230,7 @@
           <a:p>
             <a:fld id="{2365240E-6CA3-4772-8803-719FF1315E51}" type="datetimeFigureOut">
               <a:rPr lang="zh-TW" altLang="en-US" smtClean="0"/>
-              <a:t>2025/5/3</a:t>
+              <a:t>2025/5/8</a:t>
             </a:fld>
             <a:endParaRPr lang="zh-TW" altLang="en-US"/>
           </a:p>
@@ -1425,7 +1428,7 @@
           <a:p>
             <a:fld id="{2365240E-6CA3-4772-8803-719FF1315E51}" type="datetimeFigureOut">
               <a:rPr lang="zh-TW" altLang="en-US" smtClean="0"/>
-              <a:t>2025/5/3</a:t>
+              <a:t>2025/5/8</a:t>
             </a:fld>
             <a:endParaRPr lang="zh-TW" altLang="en-US"/>
           </a:p>
@@ -1700,7 +1703,7 @@
           <a:p>
             <a:fld id="{2365240E-6CA3-4772-8803-719FF1315E51}" type="datetimeFigureOut">
               <a:rPr lang="zh-TW" altLang="en-US" smtClean="0"/>
-              <a:t>2025/5/3</a:t>
+              <a:t>2025/5/8</a:t>
             </a:fld>
             <a:endParaRPr lang="zh-TW" altLang="en-US"/>
           </a:p>
@@ -1965,7 +1968,7 @@
           <a:p>
             <a:fld id="{2365240E-6CA3-4772-8803-719FF1315E51}" type="datetimeFigureOut">
               <a:rPr lang="zh-TW" altLang="en-US" smtClean="0"/>
-              <a:t>2025/5/3</a:t>
+              <a:t>2025/5/8</a:t>
             </a:fld>
             <a:endParaRPr lang="zh-TW" altLang="en-US"/>
           </a:p>
@@ -2377,7 +2380,7 @@
           <a:p>
             <a:fld id="{2365240E-6CA3-4772-8803-719FF1315E51}" type="datetimeFigureOut">
               <a:rPr lang="zh-TW" altLang="en-US" smtClean="0"/>
-              <a:t>2025/5/3</a:t>
+              <a:t>2025/5/8</a:t>
             </a:fld>
             <a:endParaRPr lang="zh-TW" altLang="en-US"/>
           </a:p>
@@ -2518,7 +2521,7 @@
           <a:p>
             <a:fld id="{2365240E-6CA3-4772-8803-719FF1315E51}" type="datetimeFigureOut">
               <a:rPr lang="zh-TW" altLang="en-US" smtClean="0"/>
-              <a:t>2025/5/3</a:t>
+              <a:t>2025/5/8</a:t>
             </a:fld>
             <a:endParaRPr lang="zh-TW" altLang="en-US"/>
           </a:p>
@@ -2631,7 +2634,7 @@
           <a:p>
             <a:fld id="{2365240E-6CA3-4772-8803-719FF1315E51}" type="datetimeFigureOut">
               <a:rPr lang="zh-TW" altLang="en-US" smtClean="0"/>
-              <a:t>2025/5/3</a:t>
+              <a:t>2025/5/8</a:t>
             </a:fld>
             <a:endParaRPr lang="zh-TW" altLang="en-US"/>
           </a:p>
@@ -2942,7 +2945,7 @@
           <a:p>
             <a:fld id="{2365240E-6CA3-4772-8803-719FF1315E51}" type="datetimeFigureOut">
               <a:rPr lang="zh-TW" altLang="en-US" smtClean="0"/>
-              <a:t>2025/5/3</a:t>
+              <a:t>2025/5/8</a:t>
             </a:fld>
             <a:endParaRPr lang="zh-TW" altLang="en-US"/>
           </a:p>
@@ -3230,7 +3233,7 @@
           <a:p>
             <a:fld id="{2365240E-6CA3-4772-8803-719FF1315E51}" type="datetimeFigureOut">
               <a:rPr lang="zh-TW" altLang="en-US" smtClean="0"/>
-              <a:t>2025/5/3</a:t>
+              <a:t>2025/5/8</a:t>
             </a:fld>
             <a:endParaRPr lang="zh-TW" altLang="en-US"/>
           </a:p>
@@ -3471,7 +3474,7 @@
           <a:p>
             <a:fld id="{2365240E-6CA3-4772-8803-719FF1315E51}" type="datetimeFigureOut">
               <a:rPr lang="zh-TW" altLang="en-US" smtClean="0"/>
-              <a:t>2025/5/3</a:t>
+              <a:t>2025/5/8</a:t>
             </a:fld>
             <a:endParaRPr lang="zh-TW" altLang="en-US"/>
           </a:p>
@@ -7404,7 +7407,7 @@
             </a:pPr>
             <a:r>
               <a:rPr lang="en-US" altLang="zh-TW" dirty="0"/>
-              <a:t>Function Coverage</a:t>
+              <a:t>Interface</a:t>
             </a:r>
           </a:p>
           <a:p>
@@ -13840,7 +13843,7 @@
           <a:p>
             <a:r>
               <a:rPr lang="en-US" altLang="zh-TW" sz="4000" dirty="0"/>
-              <a:t>Function Coverage</a:t>
+              <a:t>Interface</a:t>
             </a:r>
           </a:p>
         </p:txBody>
@@ -13849,6 +13852,1056 @@
     <p:extLst>
       <p:ext uri="{BB962C8B-B14F-4D97-AF65-F5344CB8AC3E}">
         <p14:creationId xmlns:p14="http://schemas.microsoft.com/office/powerpoint/2010/main" val="2623448336"/>
+      </p:ext>
+    </p:extLst>
+  </p:cSld>
+  <p:clrMapOvr>
+    <a:masterClrMapping/>
+  </p:clrMapOvr>
+</p:sld>
+</file>
+
+<file path=ppt/slides/slide44.xml><?xml version="1.0" encoding="utf-8"?>
+<p:sld xmlns:a="http://schemas.openxmlformats.org/drawingml/2006/main" xmlns:r="http://schemas.openxmlformats.org/officeDocument/2006/relationships" xmlns:p="http://schemas.openxmlformats.org/presentationml/2006/main">
+  <p:cSld>
+    <p:spTree>
+      <p:nvGrpSpPr>
+        <p:cNvPr id="1" name="">
+          <a:extLst>
+            <a:ext uri="{FF2B5EF4-FFF2-40B4-BE49-F238E27FC236}">
+              <a16:creationId xmlns:a16="http://schemas.microsoft.com/office/drawing/2014/main" id="{69E160BA-323B-0FB2-4554-54427975E14E}"/>
+            </a:ext>
+          </a:extLst>
+        </p:cNvPr>
+        <p:cNvGrpSpPr/>
+        <p:nvPr/>
+      </p:nvGrpSpPr>
+      <p:grpSpPr>
+        <a:xfrm>
+          <a:off x="0" y="0"/>
+          <a:ext cx="0" cy="0"/>
+          <a:chOff x="0" y="0"/>
+          <a:chExt cx="0" cy="0"/>
+        </a:xfrm>
+      </p:grpSpPr>
+      <p:sp>
+        <p:nvSpPr>
+          <p:cNvPr id="2" name="標題 1">
+            <a:extLst>
+              <a:ext uri="{FF2B5EF4-FFF2-40B4-BE49-F238E27FC236}">
+                <a16:creationId xmlns:a16="http://schemas.microsoft.com/office/drawing/2014/main" id="{696B28A8-DD92-A88A-8006-453AB103C562}"/>
+              </a:ext>
+            </a:extLst>
+          </p:cNvPr>
+          <p:cNvSpPr>
+            <a:spLocks noGrp="1"/>
+          </p:cNvSpPr>
+          <p:nvPr>
+            <p:ph type="title"/>
+          </p:nvPr>
+        </p:nvSpPr>
+        <p:spPr/>
+        <p:txBody>
+          <a:bodyPr/>
+          <a:lstStyle/>
+          <a:p>
+            <a:r>
+              <a:rPr lang="en-US" altLang="zh-TW" dirty="0"/>
+              <a:t>Interface </a:t>
+            </a:r>
+            <a:r>
+              <a:rPr lang="en-US" altLang="zh-TW"/>
+              <a:t>(1/3)</a:t>
+            </a:r>
+            <a:endParaRPr lang="zh-TW" altLang="en-US" dirty="0"/>
+          </a:p>
+        </p:txBody>
+      </p:sp>
+      <p:sp>
+        <p:nvSpPr>
+          <p:cNvPr id="4" name="內容版面配置區 3">
+            <a:extLst>
+              <a:ext uri="{FF2B5EF4-FFF2-40B4-BE49-F238E27FC236}">
+                <a16:creationId xmlns:a16="http://schemas.microsoft.com/office/drawing/2014/main" id="{C7F99619-2E06-883B-1440-054D84EED57B}"/>
+              </a:ext>
+            </a:extLst>
+          </p:cNvPr>
+          <p:cNvSpPr>
+            <a:spLocks noGrp="1"/>
+          </p:cNvSpPr>
+          <p:nvPr>
+            <p:ph idx="1"/>
+          </p:nvPr>
+        </p:nvSpPr>
+        <p:spPr/>
+        <p:txBody>
+          <a:bodyPr/>
+          <a:lstStyle/>
+          <a:p>
+            <a:r>
+              <a:rPr lang="en-US" altLang="zh-TW" dirty="0"/>
+              <a:t>Interface</a:t>
+            </a:r>
+            <a:r>
+              <a:rPr lang="zh-TW" altLang="en-US" dirty="0"/>
+              <a:t>是一種將訊號封裝到區塊中的方法</a:t>
+            </a:r>
+            <a:endParaRPr lang="en-US" altLang="zh-TW" dirty="0"/>
+          </a:p>
+          <a:p>
+            <a:r>
+              <a:rPr lang="zh-TW" altLang="en-US" dirty="0"/>
+              <a:t>所有相關訊號被組合在一起形成一個</a:t>
+            </a:r>
+            <a:r>
+              <a:rPr lang="en-US" altLang="zh-TW" dirty="0"/>
+              <a:t>Interface</a:t>
+            </a:r>
+            <a:r>
+              <a:rPr lang="zh-TW" altLang="en-US" dirty="0"/>
+              <a:t>區塊</a:t>
+            </a:r>
+            <a:endParaRPr lang="en-US" altLang="zh-TW" dirty="0"/>
+          </a:p>
+          <a:p>
+            <a:r>
+              <a:rPr lang="en-US" altLang="zh-TW" dirty="0"/>
+              <a:t>Interface </a:t>
+            </a:r>
+            <a:r>
+              <a:rPr lang="zh-TW" altLang="en-US" dirty="0"/>
+              <a:t>可以重複用於其他項目。</a:t>
+            </a:r>
+            <a:endParaRPr lang="en-US" altLang="zh-TW" dirty="0"/>
+          </a:p>
+          <a:p>
+            <a:r>
+              <a:rPr lang="zh-TW" altLang="en-US" dirty="0"/>
+              <a:t>且與 </a:t>
+            </a:r>
+            <a:r>
+              <a:rPr lang="en-US" altLang="zh-TW" dirty="0"/>
+              <a:t>DUT </a:t>
+            </a:r>
+            <a:r>
+              <a:rPr lang="zh-TW" altLang="en-US" dirty="0"/>
+              <a:t>和其他驗證組件的連接也變得更加容易</a:t>
+            </a:r>
+          </a:p>
+        </p:txBody>
+      </p:sp>
+      <p:sp>
+        <p:nvSpPr>
+          <p:cNvPr id="3" name="文字方塊 2">
+            <a:extLst>
+              <a:ext uri="{FF2B5EF4-FFF2-40B4-BE49-F238E27FC236}">
+                <a16:creationId xmlns:a16="http://schemas.microsoft.com/office/drawing/2014/main" id="{E88438B3-DC65-E6D2-0194-D576A0C7172C}"/>
+              </a:ext>
+            </a:extLst>
+          </p:cNvPr>
+          <p:cNvSpPr txBox="1"/>
+          <p:nvPr/>
+        </p:nvSpPr>
+        <p:spPr>
+          <a:xfrm>
+            <a:off x="3296728" y="4270223"/>
+            <a:ext cx="5598543" cy="2086277"/>
+          </a:xfrm>
+          <a:prstGeom prst="rect">
+            <a:avLst/>
+          </a:prstGeom>
+          <a:noFill/>
+          <a:ln>
+            <a:solidFill>
+              <a:schemeClr val="tx1"/>
+            </a:solidFill>
+          </a:ln>
+        </p:spPr>
+        <p:txBody>
+          <a:bodyPr wrap="square" rtlCol="0">
+            <a:spAutoFit/>
+          </a:bodyPr>
+          <a:lstStyle/>
+          <a:p>
+            <a:pPr>
+              <a:lnSpc>
+                <a:spcPts val="1425"/>
+              </a:lnSpc>
+              <a:buNone/>
+            </a:pPr>
+            <a:endParaRPr lang="en-US" altLang="zh-TW" dirty="0"/>
+          </a:p>
+          <a:p>
+            <a:pPr>
+              <a:lnSpc>
+                <a:spcPts val="1425"/>
+              </a:lnSpc>
+              <a:buNone/>
+            </a:pPr>
+            <a:r>
+              <a:rPr lang="en-US" altLang="zh-TW" dirty="0"/>
+              <a:t>// </a:t>
+            </a:r>
+            <a:r>
+              <a:rPr lang="zh-TW" altLang="en-US" dirty="0"/>
+              <a:t>以下是一個 </a:t>
+            </a:r>
+            <a:r>
+              <a:rPr lang="en-US" altLang="zh-TW" dirty="0"/>
+              <a:t>APB bus protocol </a:t>
+            </a:r>
+            <a:r>
+              <a:rPr lang="zh-TW" altLang="en-US" dirty="0"/>
+              <a:t>的 </a:t>
+            </a:r>
+            <a:r>
+              <a:rPr lang="en-US" altLang="zh-TW" dirty="0"/>
+              <a:t>interface</a:t>
+            </a:r>
+          </a:p>
+          <a:p>
+            <a:pPr>
+              <a:lnSpc>
+                <a:spcPts val="1425"/>
+              </a:lnSpc>
+              <a:buNone/>
+            </a:pPr>
+            <a:endParaRPr lang="en-US" altLang="zh-TW" dirty="0"/>
+          </a:p>
+          <a:p>
+            <a:pPr>
+              <a:lnSpc>
+                <a:spcPts val="1425"/>
+              </a:lnSpc>
+              <a:buNone/>
+            </a:pPr>
+            <a:r>
+              <a:rPr lang="en-US" altLang="zh-TW" dirty="0"/>
+              <a:t>interface </a:t>
+            </a:r>
+            <a:r>
+              <a:rPr lang="en-US" altLang="zh-TW" dirty="0" err="1"/>
+              <a:t>apb_if</a:t>
+            </a:r>
+            <a:r>
+              <a:rPr lang="en-US" altLang="zh-TW" dirty="0"/>
+              <a:t> (input pclk);</a:t>
+            </a:r>
+          </a:p>
+          <a:p>
+            <a:pPr>
+              <a:lnSpc>
+                <a:spcPts val="1425"/>
+              </a:lnSpc>
+              <a:buNone/>
+            </a:pPr>
+            <a:r>
+              <a:rPr lang="en-US" altLang="zh-TW" dirty="0"/>
+              <a:t>	logic [31:0]    </a:t>
+            </a:r>
+            <a:r>
+              <a:rPr lang="en-US" altLang="zh-TW" dirty="0" err="1"/>
+              <a:t>paddr</a:t>
+            </a:r>
+            <a:r>
+              <a:rPr lang="en-US" altLang="zh-TW" dirty="0"/>
+              <a:t>;   // address </a:t>
+            </a:r>
+            <a:r>
+              <a:rPr lang="zh-TW" altLang="en-US" dirty="0"/>
+              <a:t>變數</a:t>
+            </a:r>
+          </a:p>
+          <a:p>
+            <a:pPr>
+              <a:lnSpc>
+                <a:spcPts val="1425"/>
+              </a:lnSpc>
+              <a:buNone/>
+            </a:pPr>
+            <a:r>
+              <a:rPr lang="zh-TW" altLang="en-US" dirty="0"/>
+              <a:t>	</a:t>
+            </a:r>
+            <a:r>
+              <a:rPr lang="en-US" altLang="zh-TW" dirty="0"/>
+              <a:t>logic [31:0]    </a:t>
+            </a:r>
+            <a:r>
+              <a:rPr lang="en-US" altLang="zh-TW" dirty="0" err="1"/>
+              <a:t>pwdata</a:t>
+            </a:r>
+            <a:r>
+              <a:rPr lang="en-US" altLang="zh-TW" dirty="0"/>
+              <a:t>;  // write data </a:t>
+            </a:r>
+            <a:r>
+              <a:rPr lang="zh-TW" altLang="en-US" dirty="0"/>
+              <a:t>傳輸變數</a:t>
+            </a:r>
+          </a:p>
+          <a:p>
+            <a:pPr>
+              <a:lnSpc>
+                <a:spcPts val="1425"/>
+              </a:lnSpc>
+              <a:buNone/>
+            </a:pPr>
+            <a:r>
+              <a:rPr lang="zh-TW" altLang="en-US" dirty="0"/>
+              <a:t>	</a:t>
+            </a:r>
+            <a:r>
+              <a:rPr lang="en-US" altLang="zh-TW" dirty="0"/>
+              <a:t>logic [31:0]    </a:t>
+            </a:r>
+            <a:r>
+              <a:rPr lang="en-US" altLang="zh-TW" dirty="0" err="1"/>
+              <a:t>prdata</a:t>
+            </a:r>
+            <a:r>
+              <a:rPr lang="en-US" altLang="zh-TW" dirty="0"/>
+              <a:t>;  // read data </a:t>
+            </a:r>
+            <a:r>
+              <a:rPr lang="zh-TW" altLang="en-US" dirty="0"/>
+              <a:t>傳輸變數</a:t>
+            </a:r>
+          </a:p>
+          <a:p>
+            <a:pPr>
+              <a:lnSpc>
+                <a:spcPts val="1425"/>
+              </a:lnSpc>
+              <a:buNone/>
+            </a:pPr>
+            <a:r>
+              <a:rPr lang="zh-TW" altLang="en-US" dirty="0"/>
+              <a:t>	</a:t>
+            </a:r>
+            <a:r>
+              <a:rPr lang="en-US" altLang="zh-TW" dirty="0"/>
+              <a:t>logic           </a:t>
+            </a:r>
+            <a:r>
+              <a:rPr lang="en-US" altLang="zh-TW" dirty="0" err="1"/>
+              <a:t>penable</a:t>
+            </a:r>
+            <a:r>
+              <a:rPr lang="en-US" altLang="zh-TW" dirty="0"/>
+              <a:t>;</a:t>
+            </a:r>
+          </a:p>
+          <a:p>
+            <a:pPr>
+              <a:lnSpc>
+                <a:spcPts val="1425"/>
+              </a:lnSpc>
+              <a:buNone/>
+            </a:pPr>
+            <a:r>
+              <a:rPr lang="en-US" altLang="zh-TW" dirty="0"/>
+              <a:t>	logic           </a:t>
+            </a:r>
+            <a:r>
+              <a:rPr lang="en-US" altLang="zh-TW" dirty="0" err="1"/>
+              <a:t>pwrite</a:t>
+            </a:r>
+            <a:r>
+              <a:rPr lang="en-US" altLang="zh-TW" dirty="0"/>
+              <a:t>;</a:t>
+            </a:r>
+          </a:p>
+          <a:p>
+            <a:pPr>
+              <a:lnSpc>
+                <a:spcPts val="1425"/>
+              </a:lnSpc>
+              <a:buNone/>
+            </a:pPr>
+            <a:r>
+              <a:rPr lang="en-US" altLang="zh-TW" dirty="0"/>
+              <a:t>	logic           </a:t>
+            </a:r>
+            <a:r>
+              <a:rPr lang="en-US" altLang="zh-TW" dirty="0" err="1"/>
+              <a:t>psel</a:t>
+            </a:r>
+            <a:r>
+              <a:rPr lang="en-US" altLang="zh-TW" dirty="0"/>
+              <a:t>;</a:t>
+            </a:r>
+          </a:p>
+          <a:p>
+            <a:pPr>
+              <a:lnSpc>
+                <a:spcPts val="1425"/>
+              </a:lnSpc>
+              <a:buNone/>
+            </a:pPr>
+            <a:r>
+              <a:rPr lang="en-US" altLang="zh-TW" dirty="0" err="1"/>
+              <a:t>endinterface</a:t>
+            </a:r>
+            <a:endParaRPr lang="zh-TW" altLang="en-US" dirty="0"/>
+          </a:p>
+        </p:txBody>
+      </p:sp>
+    </p:spTree>
+    <p:extLst>
+      <p:ext uri="{BB962C8B-B14F-4D97-AF65-F5344CB8AC3E}">
+        <p14:creationId xmlns:p14="http://schemas.microsoft.com/office/powerpoint/2010/main" val="2692252157"/>
+      </p:ext>
+    </p:extLst>
+  </p:cSld>
+  <p:clrMapOvr>
+    <a:masterClrMapping/>
+  </p:clrMapOvr>
+</p:sld>
+</file>
+
+<file path=ppt/slides/slide45.xml><?xml version="1.0" encoding="utf-8"?>
+<p:sld xmlns:a="http://schemas.openxmlformats.org/drawingml/2006/main" xmlns:r="http://schemas.openxmlformats.org/officeDocument/2006/relationships" xmlns:p="http://schemas.openxmlformats.org/presentationml/2006/main">
+  <p:cSld>
+    <p:spTree>
+      <p:nvGrpSpPr>
+        <p:cNvPr id="1" name="">
+          <a:extLst>
+            <a:ext uri="{FF2B5EF4-FFF2-40B4-BE49-F238E27FC236}">
+              <a16:creationId xmlns:a16="http://schemas.microsoft.com/office/drawing/2014/main" id="{E6ABAEC1-82EB-B757-387C-2420CEB5003B}"/>
+            </a:ext>
+          </a:extLst>
+        </p:cNvPr>
+        <p:cNvGrpSpPr/>
+        <p:nvPr/>
+      </p:nvGrpSpPr>
+      <p:grpSpPr>
+        <a:xfrm>
+          <a:off x="0" y="0"/>
+          <a:ext cx="0" cy="0"/>
+          <a:chOff x="0" y="0"/>
+          <a:chExt cx="0" cy="0"/>
+        </a:xfrm>
+      </p:grpSpPr>
+      <p:sp>
+        <p:nvSpPr>
+          <p:cNvPr id="2" name="標題 1">
+            <a:extLst>
+              <a:ext uri="{FF2B5EF4-FFF2-40B4-BE49-F238E27FC236}">
+                <a16:creationId xmlns:a16="http://schemas.microsoft.com/office/drawing/2014/main" id="{02FE2074-38AB-3784-4C84-0BAE6A918294}"/>
+              </a:ext>
+            </a:extLst>
+          </p:cNvPr>
+          <p:cNvSpPr>
+            <a:spLocks noGrp="1"/>
+          </p:cNvSpPr>
+          <p:nvPr>
+            <p:ph type="title"/>
+          </p:nvPr>
+        </p:nvSpPr>
+        <p:spPr/>
+        <p:txBody>
+          <a:bodyPr/>
+          <a:lstStyle/>
+          <a:p>
+            <a:r>
+              <a:rPr lang="en-US" altLang="zh-TW" dirty="0"/>
+              <a:t>modport  (2/3)</a:t>
+            </a:r>
+            <a:endParaRPr lang="zh-TW" altLang="en-US" dirty="0"/>
+          </a:p>
+        </p:txBody>
+      </p:sp>
+      <p:sp>
+        <p:nvSpPr>
+          <p:cNvPr id="4" name="內容版面配置區 3">
+            <a:extLst>
+              <a:ext uri="{FF2B5EF4-FFF2-40B4-BE49-F238E27FC236}">
+                <a16:creationId xmlns:a16="http://schemas.microsoft.com/office/drawing/2014/main" id="{78ABD3B5-11FA-FA00-B5AE-7BB4C4303258}"/>
+              </a:ext>
+            </a:extLst>
+          </p:cNvPr>
+          <p:cNvSpPr>
+            <a:spLocks noGrp="1"/>
+          </p:cNvSpPr>
+          <p:nvPr>
+            <p:ph idx="1"/>
+          </p:nvPr>
+        </p:nvSpPr>
+        <p:spPr/>
+        <p:txBody>
+          <a:bodyPr/>
+          <a:lstStyle/>
+          <a:p>
+            <a:r>
+              <a:rPr lang="en-US" altLang="zh-TW" dirty="0"/>
+              <a:t>Modport </a:t>
+            </a:r>
+            <a:r>
+              <a:rPr lang="zh-TW" altLang="en-US" dirty="0"/>
+              <a:t>可以用來定義 </a:t>
+            </a:r>
+            <a:r>
+              <a:rPr lang="en-US" altLang="zh-TW" dirty="0"/>
+              <a:t>interface </a:t>
+            </a:r>
+            <a:r>
+              <a:rPr lang="zh-TW" altLang="en-US" dirty="0"/>
+              <a:t>內的訊號，</a:t>
+            </a:r>
+            <a:br>
+              <a:rPr lang="en-US" altLang="zh-TW" dirty="0"/>
+            </a:br>
+            <a:r>
+              <a:rPr lang="zh-TW" altLang="en-US" dirty="0"/>
+              <a:t>用在不同 </a:t>
+            </a:r>
+            <a:r>
+              <a:rPr lang="en-US" altLang="zh-TW" dirty="0"/>
+              <a:t>module </a:t>
+            </a:r>
+            <a:r>
+              <a:rPr lang="zh-TW" altLang="en-US" dirty="0"/>
+              <a:t>上時的輸入輸出關係</a:t>
+            </a:r>
+            <a:endParaRPr lang="en-US" altLang="zh-TW" dirty="0"/>
+          </a:p>
+        </p:txBody>
+      </p:sp>
+      <p:sp>
+        <p:nvSpPr>
+          <p:cNvPr id="6" name="文字方塊 5">
+            <a:extLst>
+              <a:ext uri="{FF2B5EF4-FFF2-40B4-BE49-F238E27FC236}">
+                <a16:creationId xmlns:a16="http://schemas.microsoft.com/office/drawing/2014/main" id="{ECC04D46-CB10-AA25-6047-A5571C9B2332}"/>
+              </a:ext>
+            </a:extLst>
+          </p:cNvPr>
+          <p:cNvSpPr txBox="1"/>
+          <p:nvPr/>
+        </p:nvSpPr>
+        <p:spPr>
+          <a:xfrm>
+            <a:off x="2692879" y="3314641"/>
+            <a:ext cx="6806241" cy="2862322"/>
+          </a:xfrm>
+          <a:prstGeom prst="rect">
+            <a:avLst/>
+          </a:prstGeom>
+          <a:noFill/>
+          <a:ln>
+            <a:solidFill>
+              <a:schemeClr val="tx1"/>
+            </a:solidFill>
+          </a:ln>
+        </p:spPr>
+        <p:txBody>
+          <a:bodyPr wrap="square" rtlCol="0">
+            <a:spAutoFit/>
+          </a:bodyPr>
+          <a:lstStyle/>
+          <a:p>
+            <a:r>
+              <a:rPr lang="en-US" altLang="zh-TW" dirty="0"/>
+              <a:t>interface </a:t>
+            </a:r>
+            <a:r>
+              <a:rPr lang="en-US" altLang="zh-TW" dirty="0" err="1"/>
+              <a:t>myBus</a:t>
+            </a:r>
+            <a:r>
+              <a:rPr lang="en-US" altLang="zh-TW" dirty="0"/>
+              <a:t> (input </a:t>
+            </a:r>
+            <a:r>
+              <a:rPr lang="en-US" altLang="zh-TW" dirty="0" err="1"/>
+              <a:t>clk</a:t>
+            </a:r>
+            <a:r>
+              <a:rPr lang="en-US" altLang="zh-TW" dirty="0"/>
+              <a:t>);</a:t>
+            </a:r>
+          </a:p>
+          <a:p>
+            <a:r>
+              <a:rPr lang="en-US" altLang="zh-TW" dirty="0"/>
+              <a:t>  </a:t>
+            </a:r>
+            <a:r>
+              <a:rPr lang="zh-TW" altLang="en-US" dirty="0"/>
+              <a:t>  </a:t>
+            </a:r>
+            <a:r>
+              <a:rPr lang="en-US" altLang="zh-TW" dirty="0"/>
+              <a:t>logic [7:0]  data;</a:t>
+            </a:r>
+          </a:p>
+          <a:p>
+            <a:r>
+              <a:rPr lang="en-US" altLang="zh-TW" dirty="0"/>
+              <a:t>  </a:t>
+            </a:r>
+            <a:r>
+              <a:rPr lang="zh-TW" altLang="en-US" dirty="0"/>
+              <a:t>  </a:t>
+            </a:r>
+            <a:r>
+              <a:rPr lang="en-US" altLang="zh-TW" dirty="0"/>
+              <a:t>logic      enable;</a:t>
+            </a:r>
+          </a:p>
+          <a:p>
+            <a:endParaRPr lang="en-US" altLang="zh-TW" dirty="0"/>
+          </a:p>
+          <a:p>
+            <a:r>
+              <a:rPr lang="en-US" altLang="zh-TW" dirty="0"/>
+              <a:t>  </a:t>
+            </a:r>
+            <a:r>
+              <a:rPr lang="zh-TW" altLang="en-US" dirty="0"/>
+              <a:t>  </a:t>
+            </a:r>
+            <a:r>
+              <a:rPr lang="en-US" altLang="zh-TW" dirty="0"/>
+              <a:t>// </a:t>
+            </a:r>
+            <a:r>
+              <a:rPr lang="zh-TW" altLang="en-US" dirty="0"/>
+              <a:t>從 </a:t>
+            </a:r>
+            <a:r>
+              <a:rPr lang="en-US" altLang="zh-TW" dirty="0" err="1"/>
+              <a:t>TestBench</a:t>
+            </a:r>
+            <a:r>
+              <a:rPr lang="en-US" altLang="zh-TW" dirty="0"/>
+              <a:t> </a:t>
+            </a:r>
+            <a:r>
+              <a:rPr lang="zh-TW" altLang="en-US" dirty="0"/>
+              <a:t>來看</a:t>
+            </a:r>
+            <a:r>
+              <a:rPr lang="en-US" altLang="zh-TW" dirty="0"/>
+              <a:t>, 'data' </a:t>
+            </a:r>
+            <a:r>
+              <a:rPr lang="zh-TW" altLang="en-US" dirty="0"/>
+              <a:t>是 </a:t>
+            </a:r>
+            <a:r>
+              <a:rPr lang="en-US" altLang="zh-TW" dirty="0"/>
+              <a:t>input and 'write' </a:t>
+            </a:r>
+            <a:r>
+              <a:rPr lang="zh-TW" altLang="en-US" dirty="0"/>
+              <a:t>是 </a:t>
+            </a:r>
+            <a:r>
+              <a:rPr lang="en-US" altLang="zh-TW" dirty="0"/>
+              <a:t>output</a:t>
+            </a:r>
+          </a:p>
+          <a:p>
+            <a:r>
+              <a:rPr lang="en-US" altLang="zh-TW" dirty="0"/>
+              <a:t>  </a:t>
+            </a:r>
+            <a:r>
+              <a:rPr lang="zh-TW" altLang="en-US" dirty="0"/>
+              <a:t>  </a:t>
+            </a:r>
+            <a:r>
+              <a:rPr lang="en-US" altLang="zh-TW" dirty="0"/>
+              <a:t>modport TB  (input data, </a:t>
+            </a:r>
+            <a:r>
+              <a:rPr lang="en-US" altLang="zh-TW" dirty="0" err="1"/>
+              <a:t>clk</a:t>
+            </a:r>
+            <a:r>
+              <a:rPr lang="en-US" altLang="zh-TW" dirty="0"/>
+              <a:t>, output enable);</a:t>
+            </a:r>
+          </a:p>
+          <a:p>
+            <a:endParaRPr lang="en-US" altLang="zh-TW" dirty="0"/>
+          </a:p>
+          <a:p>
+            <a:r>
+              <a:rPr lang="en-US" altLang="zh-TW" dirty="0"/>
+              <a:t>  </a:t>
+            </a:r>
+            <a:r>
+              <a:rPr lang="zh-TW" altLang="en-US" dirty="0"/>
+              <a:t>  </a:t>
+            </a:r>
+            <a:r>
+              <a:rPr lang="en-US" altLang="zh-TW" dirty="0"/>
+              <a:t>// </a:t>
+            </a:r>
+            <a:r>
+              <a:rPr lang="zh-TW" altLang="en-US" dirty="0"/>
+              <a:t>從 </a:t>
+            </a:r>
+            <a:r>
+              <a:rPr lang="en-US" altLang="zh-TW" dirty="0"/>
+              <a:t>DUT </a:t>
+            </a:r>
+            <a:r>
+              <a:rPr lang="zh-TW" altLang="en-US" dirty="0"/>
+              <a:t>來看</a:t>
+            </a:r>
+            <a:r>
+              <a:rPr lang="en-US" altLang="zh-TW" dirty="0"/>
+              <a:t>, 'data' </a:t>
+            </a:r>
+            <a:r>
+              <a:rPr lang="zh-TW" altLang="en-US" dirty="0"/>
+              <a:t>是 </a:t>
+            </a:r>
+            <a:r>
+              <a:rPr lang="en-US" altLang="zh-TW" dirty="0"/>
+              <a:t>output and 'enable' </a:t>
+            </a:r>
+            <a:r>
+              <a:rPr lang="zh-TW" altLang="en-US" dirty="0"/>
+              <a:t>是 </a:t>
+            </a:r>
+            <a:r>
+              <a:rPr lang="en-US" altLang="zh-TW" dirty="0"/>
+              <a:t>input</a:t>
+            </a:r>
+          </a:p>
+          <a:p>
+            <a:r>
+              <a:rPr lang="en-US" altLang="zh-TW" dirty="0"/>
+              <a:t>  </a:t>
+            </a:r>
+            <a:r>
+              <a:rPr lang="zh-TW" altLang="en-US" dirty="0"/>
+              <a:t>  </a:t>
+            </a:r>
+            <a:r>
+              <a:rPr lang="en-US" altLang="zh-TW" dirty="0"/>
+              <a:t>modport DUT (output data, input enable, </a:t>
+            </a:r>
+            <a:r>
+              <a:rPr lang="en-US" altLang="zh-TW" dirty="0" err="1"/>
+              <a:t>clk</a:t>
+            </a:r>
+            <a:r>
+              <a:rPr lang="en-US" altLang="zh-TW" dirty="0"/>
+              <a:t>);</a:t>
+            </a:r>
+          </a:p>
+          <a:p>
+            <a:r>
+              <a:rPr lang="en-US" altLang="zh-TW" dirty="0" err="1"/>
+              <a:t>endinterface</a:t>
+            </a:r>
+            <a:endParaRPr lang="zh-TW" altLang="en-US" dirty="0"/>
+          </a:p>
+        </p:txBody>
+      </p:sp>
+    </p:spTree>
+    <p:extLst>
+      <p:ext uri="{BB962C8B-B14F-4D97-AF65-F5344CB8AC3E}">
+        <p14:creationId xmlns:p14="http://schemas.microsoft.com/office/powerpoint/2010/main" val="2984313725"/>
+      </p:ext>
+    </p:extLst>
+  </p:cSld>
+  <p:clrMapOvr>
+    <a:masterClrMapping/>
+  </p:clrMapOvr>
+</p:sld>
+</file>
+
+<file path=ppt/slides/slide46.xml><?xml version="1.0" encoding="utf-8"?>
+<p:sld xmlns:a="http://schemas.openxmlformats.org/drawingml/2006/main" xmlns:r="http://schemas.openxmlformats.org/officeDocument/2006/relationships" xmlns:p="http://schemas.openxmlformats.org/presentationml/2006/main">
+  <p:cSld>
+    <p:spTree>
+      <p:nvGrpSpPr>
+        <p:cNvPr id="1" name="">
+          <a:extLst>
+            <a:ext uri="{FF2B5EF4-FFF2-40B4-BE49-F238E27FC236}">
+              <a16:creationId xmlns:a16="http://schemas.microsoft.com/office/drawing/2014/main" id="{6EAFA1BE-90CF-3EC5-4900-8784765DC094}"/>
+            </a:ext>
+          </a:extLst>
+        </p:cNvPr>
+        <p:cNvGrpSpPr/>
+        <p:nvPr/>
+      </p:nvGrpSpPr>
+      <p:grpSpPr>
+        <a:xfrm>
+          <a:off x="0" y="0"/>
+          <a:ext cx="0" cy="0"/>
+          <a:chOff x="0" y="0"/>
+          <a:chExt cx="0" cy="0"/>
+        </a:xfrm>
+      </p:grpSpPr>
+      <p:sp>
+        <p:nvSpPr>
+          <p:cNvPr id="2" name="標題 1">
+            <a:extLst>
+              <a:ext uri="{FF2B5EF4-FFF2-40B4-BE49-F238E27FC236}">
+                <a16:creationId xmlns:a16="http://schemas.microsoft.com/office/drawing/2014/main" id="{07659E31-6ADA-EA43-840C-3C63EC5B2D80}"/>
+              </a:ext>
+            </a:extLst>
+          </p:cNvPr>
+          <p:cNvSpPr>
+            <a:spLocks noGrp="1"/>
+          </p:cNvSpPr>
+          <p:nvPr>
+            <p:ph type="title"/>
+          </p:nvPr>
+        </p:nvSpPr>
+        <p:spPr/>
+        <p:txBody>
+          <a:bodyPr/>
+          <a:lstStyle/>
+          <a:p>
+            <a:r>
+              <a:rPr lang="en-US" altLang="zh-TW" dirty="0"/>
+              <a:t>Clocking block (3/3)</a:t>
+            </a:r>
+            <a:endParaRPr lang="zh-TW" altLang="en-US" dirty="0"/>
+          </a:p>
+        </p:txBody>
+      </p:sp>
+      <p:sp>
+        <p:nvSpPr>
+          <p:cNvPr id="4" name="內容版面配置區 3">
+            <a:extLst>
+              <a:ext uri="{FF2B5EF4-FFF2-40B4-BE49-F238E27FC236}">
+                <a16:creationId xmlns:a16="http://schemas.microsoft.com/office/drawing/2014/main" id="{C3D3F1C6-D226-2874-6CFF-FEC132C8F256}"/>
+              </a:ext>
+            </a:extLst>
+          </p:cNvPr>
+          <p:cNvSpPr>
+            <a:spLocks noGrp="1"/>
+          </p:cNvSpPr>
+          <p:nvPr>
+            <p:ph idx="1"/>
+          </p:nvPr>
+        </p:nvSpPr>
+        <p:spPr/>
+        <p:txBody>
+          <a:bodyPr/>
+          <a:lstStyle/>
+          <a:p>
+            <a:r>
+              <a:rPr lang="en-US" altLang="zh-TW" dirty="0"/>
+              <a:t>Clocking block </a:t>
+            </a:r>
+            <a:r>
+              <a:rPr lang="zh-TW" altLang="en-US" dirty="0"/>
+              <a:t>可以用來降低 </a:t>
+            </a:r>
+            <a:r>
+              <a:rPr lang="en-US" altLang="zh-TW" dirty="0"/>
+              <a:t>module </a:t>
+            </a:r>
+            <a:r>
+              <a:rPr lang="zh-TW" altLang="en-US" dirty="0"/>
+              <a:t>跟 </a:t>
+            </a:r>
+            <a:r>
+              <a:rPr lang="en-US" altLang="zh-TW" dirty="0"/>
+              <a:t>module </a:t>
+            </a:r>
+            <a:r>
+              <a:rPr lang="zh-TW" altLang="en-US" dirty="0"/>
+              <a:t>連接時，</a:t>
+            </a:r>
+            <a:br>
+              <a:rPr lang="en-US" altLang="zh-TW" dirty="0"/>
+            </a:br>
+            <a:r>
+              <a:rPr lang="zh-TW" altLang="en-US" dirty="0"/>
+              <a:t>所產生的訊號取樣 </a:t>
+            </a:r>
+            <a:r>
+              <a:rPr lang="en-US" altLang="zh-TW" dirty="0"/>
+              <a:t>race condition</a:t>
+            </a:r>
+          </a:p>
+        </p:txBody>
+      </p:sp>
+      <p:sp>
+        <p:nvSpPr>
+          <p:cNvPr id="6" name="文字方塊 5">
+            <a:extLst>
+              <a:ext uri="{FF2B5EF4-FFF2-40B4-BE49-F238E27FC236}">
+                <a16:creationId xmlns:a16="http://schemas.microsoft.com/office/drawing/2014/main" id="{FAF04DEB-88BC-7943-BD8C-B29C30715414}"/>
+              </a:ext>
+            </a:extLst>
+          </p:cNvPr>
+          <p:cNvSpPr txBox="1"/>
+          <p:nvPr/>
+        </p:nvSpPr>
+        <p:spPr>
+          <a:xfrm>
+            <a:off x="2692879" y="3314641"/>
+            <a:ext cx="6806241" cy="2862322"/>
+          </a:xfrm>
+          <a:prstGeom prst="rect">
+            <a:avLst/>
+          </a:prstGeom>
+          <a:noFill/>
+          <a:ln>
+            <a:solidFill>
+              <a:schemeClr val="tx1"/>
+            </a:solidFill>
+          </a:ln>
+        </p:spPr>
+        <p:txBody>
+          <a:bodyPr wrap="square" rtlCol="0">
+            <a:spAutoFit/>
+          </a:bodyPr>
+          <a:lstStyle/>
+          <a:p>
+            <a:r>
+              <a:rPr lang="en-US" altLang="zh-TW" dirty="0"/>
+              <a:t>interface </a:t>
+            </a:r>
+            <a:r>
+              <a:rPr lang="en-US" altLang="zh-TW" dirty="0" err="1"/>
+              <a:t>my_int</a:t>
+            </a:r>
+            <a:r>
+              <a:rPr lang="en-US" altLang="zh-TW" dirty="0"/>
+              <a:t> (input bit </a:t>
+            </a:r>
+            <a:r>
+              <a:rPr lang="en-US" altLang="zh-TW" dirty="0" err="1"/>
+              <a:t>clk</a:t>
+            </a:r>
+            <a:r>
+              <a:rPr lang="en-US" altLang="zh-TW" dirty="0"/>
+              <a:t>);</a:t>
+            </a:r>
+          </a:p>
+          <a:p>
+            <a:r>
+              <a:rPr lang="en-US" altLang="zh-TW" dirty="0"/>
+              <a:t>        // Rest of interface code</a:t>
+            </a:r>
+          </a:p>
+          <a:p>
+            <a:endParaRPr lang="en-US" altLang="zh-TW" dirty="0"/>
+          </a:p>
+          <a:p>
+            <a:r>
+              <a:rPr lang="en-US" altLang="zh-TW" dirty="0"/>
+              <a:t>        clocking </a:t>
+            </a:r>
+            <a:r>
+              <a:rPr lang="en-US" altLang="zh-TW" dirty="0" err="1"/>
+              <a:t>cb_clk</a:t>
+            </a:r>
+            <a:r>
+              <a:rPr lang="en-US" altLang="zh-TW" dirty="0"/>
+              <a:t> @(posedge </a:t>
+            </a:r>
+            <a:r>
+              <a:rPr lang="en-US" altLang="zh-TW" dirty="0" err="1"/>
+              <a:t>clk</a:t>
+            </a:r>
+            <a:r>
+              <a:rPr lang="en-US" altLang="zh-TW" dirty="0"/>
+              <a:t>);</a:t>
+            </a:r>
+          </a:p>
+          <a:p>
+            <a:r>
+              <a:rPr lang="en-US" altLang="zh-TW" dirty="0"/>
+              <a:t>                    // </a:t>
+            </a:r>
+            <a:r>
+              <a:rPr lang="zh-TW" altLang="en-US" dirty="0"/>
+              <a:t>定義 </a:t>
+            </a:r>
+            <a:r>
+              <a:rPr lang="en-US" altLang="zh-TW" dirty="0"/>
+              <a:t>input </a:t>
+            </a:r>
+            <a:r>
+              <a:rPr lang="zh-TW" altLang="en-US" dirty="0"/>
+              <a:t>提前 </a:t>
+            </a:r>
+            <a:r>
+              <a:rPr lang="en-US" altLang="zh-TW" dirty="0"/>
+              <a:t>3ns </a:t>
+            </a:r>
+            <a:r>
+              <a:rPr lang="zh-TW" altLang="en-US" dirty="0"/>
+              <a:t>取樣</a:t>
+            </a:r>
+            <a:r>
+              <a:rPr lang="en-US" altLang="zh-TW" dirty="0"/>
+              <a:t>, output </a:t>
+            </a:r>
+            <a:r>
+              <a:rPr lang="zh-TW" altLang="en-US" dirty="0"/>
+              <a:t>延後 </a:t>
+            </a:r>
+            <a:r>
+              <a:rPr lang="en-US" altLang="zh-TW" dirty="0"/>
+              <a:t>2 ns </a:t>
+            </a:r>
+            <a:r>
+              <a:rPr lang="zh-TW" altLang="en-US" dirty="0"/>
+              <a:t>取樣</a:t>
+            </a:r>
+          </a:p>
+          <a:p>
+            <a:r>
+              <a:rPr lang="zh-TW" altLang="en-US" dirty="0"/>
+              <a:t>	</a:t>
+            </a:r>
+            <a:r>
+              <a:rPr lang="en-US" altLang="zh-TW" dirty="0"/>
+              <a:t>default input #3ns output #2ns;  </a:t>
+            </a:r>
+          </a:p>
+          <a:p>
+            <a:r>
+              <a:rPr lang="en-US" altLang="zh-TW" dirty="0"/>
+              <a:t>	input enable;</a:t>
+            </a:r>
+          </a:p>
+          <a:p>
+            <a:r>
+              <a:rPr lang="en-US" altLang="zh-TW" dirty="0"/>
+              <a:t>	output data;</a:t>
+            </a:r>
+          </a:p>
+          <a:p>
+            <a:r>
+              <a:rPr lang="en-US" altLang="zh-TW" dirty="0"/>
+              <a:t>         </a:t>
+            </a:r>
+            <a:r>
+              <a:rPr lang="en-US" altLang="zh-TW" dirty="0" err="1"/>
+              <a:t>endclocking</a:t>
+            </a:r>
+            <a:endParaRPr lang="en-US" altLang="zh-TW" dirty="0"/>
+          </a:p>
+          <a:p>
+            <a:r>
+              <a:rPr lang="en-US" altLang="zh-TW" dirty="0" err="1"/>
+              <a:t>endinterface</a:t>
+            </a:r>
+            <a:endParaRPr lang="zh-TW" altLang="en-US" dirty="0"/>
+          </a:p>
+        </p:txBody>
+      </p:sp>
+    </p:spTree>
+    <p:extLst>
+      <p:ext uri="{BB962C8B-B14F-4D97-AF65-F5344CB8AC3E}">
+        <p14:creationId xmlns:p14="http://schemas.microsoft.com/office/powerpoint/2010/main" val="4267753501"/>
       </p:ext>
     </p:extLst>
   </p:cSld>

</xml_diff>

<commit_message>
Add: Constraints 1. rand, randc 2. constrain block 3. inside, constrain weighted
</commit_message>
<xml_diff>
--- a/SystemVerilog_語法學習.pptx
+++ b/SystemVerilog_語法學習.pptx
@@ -5,7 +5,7 @@
     <p:sldMasterId id="2147483648" r:id="rId1"/>
   </p:sldMasterIdLst>
   <p:notesMasterIdLst>
-    <p:notesMasterId r:id="rId48"/>
+    <p:notesMasterId r:id="rId49"/>
   </p:notesMasterIdLst>
   <p:sldIdLst>
     <p:sldId id="256" r:id="rId2"/>
@@ -54,6 +54,7 @@
     <p:sldId id="310" r:id="rId45"/>
     <p:sldId id="311" r:id="rId46"/>
     <p:sldId id="312" r:id="rId47"/>
+    <p:sldId id="313" r:id="rId48"/>
   </p:sldIdLst>
   <p:sldSz cx="12192000" cy="6858000"/>
   <p:notesSz cx="6858000" cy="9144000"/>
@@ -242,7 +243,7 @@
           <a:p>
             <a:fld id="{28C483A5-4075-4A6E-B921-74BFA7B8EF67}" type="datetimeFigureOut">
               <a:rPr lang="zh-TW" altLang="en-US" smtClean="0"/>
-              <a:t>2025/5/8</a:t>
+              <a:t>2025/5/11</a:t>
             </a:fld>
             <a:endParaRPr lang="zh-TW" altLang="en-US"/>
           </a:p>
@@ -824,7 +825,7 @@
           <a:p>
             <a:fld id="{2365240E-6CA3-4772-8803-719FF1315E51}" type="datetimeFigureOut">
               <a:rPr lang="zh-TW" altLang="en-US" smtClean="0"/>
-              <a:t>2025/5/8</a:t>
+              <a:t>2025/5/11</a:t>
             </a:fld>
             <a:endParaRPr lang="zh-TW" altLang="en-US"/>
           </a:p>
@@ -1022,7 +1023,7 @@
           <a:p>
             <a:fld id="{2365240E-6CA3-4772-8803-719FF1315E51}" type="datetimeFigureOut">
               <a:rPr lang="zh-TW" altLang="en-US" smtClean="0"/>
-              <a:t>2025/5/8</a:t>
+              <a:t>2025/5/11</a:t>
             </a:fld>
             <a:endParaRPr lang="zh-TW" altLang="en-US"/>
           </a:p>
@@ -1230,7 +1231,7 @@
           <a:p>
             <a:fld id="{2365240E-6CA3-4772-8803-719FF1315E51}" type="datetimeFigureOut">
               <a:rPr lang="zh-TW" altLang="en-US" smtClean="0"/>
-              <a:t>2025/5/8</a:t>
+              <a:t>2025/5/11</a:t>
             </a:fld>
             <a:endParaRPr lang="zh-TW" altLang="en-US"/>
           </a:p>
@@ -1428,7 +1429,7 @@
           <a:p>
             <a:fld id="{2365240E-6CA3-4772-8803-719FF1315E51}" type="datetimeFigureOut">
               <a:rPr lang="zh-TW" altLang="en-US" smtClean="0"/>
-              <a:t>2025/5/8</a:t>
+              <a:t>2025/5/11</a:t>
             </a:fld>
             <a:endParaRPr lang="zh-TW" altLang="en-US"/>
           </a:p>
@@ -1703,7 +1704,7 @@
           <a:p>
             <a:fld id="{2365240E-6CA3-4772-8803-719FF1315E51}" type="datetimeFigureOut">
               <a:rPr lang="zh-TW" altLang="en-US" smtClean="0"/>
-              <a:t>2025/5/8</a:t>
+              <a:t>2025/5/11</a:t>
             </a:fld>
             <a:endParaRPr lang="zh-TW" altLang="en-US"/>
           </a:p>
@@ -1968,7 +1969,7 @@
           <a:p>
             <a:fld id="{2365240E-6CA3-4772-8803-719FF1315E51}" type="datetimeFigureOut">
               <a:rPr lang="zh-TW" altLang="en-US" smtClean="0"/>
-              <a:t>2025/5/8</a:t>
+              <a:t>2025/5/11</a:t>
             </a:fld>
             <a:endParaRPr lang="zh-TW" altLang="en-US"/>
           </a:p>
@@ -2380,7 +2381,7 @@
           <a:p>
             <a:fld id="{2365240E-6CA3-4772-8803-719FF1315E51}" type="datetimeFigureOut">
               <a:rPr lang="zh-TW" altLang="en-US" smtClean="0"/>
-              <a:t>2025/5/8</a:t>
+              <a:t>2025/5/11</a:t>
             </a:fld>
             <a:endParaRPr lang="zh-TW" altLang="en-US"/>
           </a:p>
@@ -2521,7 +2522,7 @@
           <a:p>
             <a:fld id="{2365240E-6CA3-4772-8803-719FF1315E51}" type="datetimeFigureOut">
               <a:rPr lang="zh-TW" altLang="en-US" smtClean="0"/>
-              <a:t>2025/5/8</a:t>
+              <a:t>2025/5/11</a:t>
             </a:fld>
             <a:endParaRPr lang="zh-TW" altLang="en-US"/>
           </a:p>
@@ -2634,7 +2635,7 @@
           <a:p>
             <a:fld id="{2365240E-6CA3-4772-8803-719FF1315E51}" type="datetimeFigureOut">
               <a:rPr lang="zh-TW" altLang="en-US" smtClean="0"/>
-              <a:t>2025/5/8</a:t>
+              <a:t>2025/5/11</a:t>
             </a:fld>
             <a:endParaRPr lang="zh-TW" altLang="en-US"/>
           </a:p>
@@ -2945,7 +2946,7 @@
           <a:p>
             <a:fld id="{2365240E-6CA3-4772-8803-719FF1315E51}" type="datetimeFigureOut">
               <a:rPr lang="zh-TW" altLang="en-US" smtClean="0"/>
-              <a:t>2025/5/8</a:t>
+              <a:t>2025/5/11</a:t>
             </a:fld>
             <a:endParaRPr lang="zh-TW" altLang="en-US"/>
           </a:p>
@@ -3233,7 +3234,7 @@
           <a:p>
             <a:fld id="{2365240E-6CA3-4772-8803-719FF1315E51}" type="datetimeFigureOut">
               <a:rPr lang="zh-TW" altLang="en-US" smtClean="0"/>
-              <a:t>2025/5/8</a:t>
+              <a:t>2025/5/11</a:t>
             </a:fld>
             <a:endParaRPr lang="zh-TW" altLang="en-US"/>
           </a:p>
@@ -3474,7 +3475,7 @@
           <a:p>
             <a:fld id="{2365240E-6CA3-4772-8803-719FF1315E51}" type="datetimeFigureOut">
               <a:rPr lang="zh-TW" altLang="en-US" smtClean="0"/>
-              <a:t>2025/5/8</a:t>
+              <a:t>2025/5/11</a:t>
             </a:fld>
             <a:endParaRPr lang="zh-TW" altLang="en-US"/>
           </a:p>
@@ -7408,6 +7409,16 @@
             <a:r>
               <a:rPr lang="en-US" altLang="zh-TW" dirty="0"/>
               <a:t>Interface</a:t>
+            </a:r>
+          </a:p>
+          <a:p>
+            <a:pPr marL="514350" indent="-514350">
+              <a:buFont typeface="+mj-lt"/>
+              <a:buAutoNum type="arabicPeriod"/>
+            </a:pPr>
+            <a:r>
+              <a:rPr lang="en-US" altLang="zh-TW" dirty="0"/>
+              <a:t>Constrains</a:t>
             </a:r>
           </a:p>
           <a:p>
@@ -14911,6 +14922,102 @@
 </p:sld>
 </file>
 
+<file path=ppt/slides/slide47.xml><?xml version="1.0" encoding="utf-8"?>
+<p:sld xmlns:a="http://schemas.openxmlformats.org/drawingml/2006/main" xmlns:r="http://schemas.openxmlformats.org/officeDocument/2006/relationships" xmlns:p="http://schemas.openxmlformats.org/presentationml/2006/main">
+  <p:cSld>
+    <p:spTree>
+      <p:nvGrpSpPr>
+        <p:cNvPr id="1" name="">
+          <a:extLst>
+            <a:ext uri="{FF2B5EF4-FFF2-40B4-BE49-F238E27FC236}">
+              <a16:creationId xmlns:a16="http://schemas.microsoft.com/office/drawing/2014/main" id="{98201739-F6C5-2F52-9E90-50E69F2767F4}"/>
+            </a:ext>
+          </a:extLst>
+        </p:cNvPr>
+        <p:cNvGrpSpPr/>
+        <p:nvPr/>
+      </p:nvGrpSpPr>
+      <p:grpSpPr>
+        <a:xfrm>
+          <a:off x="0" y="0"/>
+          <a:ext cx="0" cy="0"/>
+          <a:chOff x="0" y="0"/>
+          <a:chExt cx="0" cy="0"/>
+        </a:xfrm>
+      </p:grpSpPr>
+      <p:sp>
+        <p:nvSpPr>
+          <p:cNvPr id="2" name="標題 1">
+            <a:extLst>
+              <a:ext uri="{FF2B5EF4-FFF2-40B4-BE49-F238E27FC236}">
+                <a16:creationId xmlns:a16="http://schemas.microsoft.com/office/drawing/2014/main" id="{FF276E75-F1EB-013B-A47B-A02E227FBD56}"/>
+              </a:ext>
+            </a:extLst>
+          </p:cNvPr>
+          <p:cNvSpPr>
+            <a:spLocks noGrp="1"/>
+          </p:cNvSpPr>
+          <p:nvPr>
+            <p:ph type="ctrTitle"/>
+          </p:nvPr>
+        </p:nvSpPr>
+        <p:spPr/>
+        <p:txBody>
+          <a:bodyPr/>
+          <a:lstStyle/>
+          <a:p>
+            <a:r>
+              <a:rPr lang="en-US" altLang="zh-TW" dirty="0"/>
+              <a:t>Chapter 6</a:t>
+            </a:r>
+            <a:endParaRPr lang="zh-TW" altLang="en-US" dirty="0"/>
+          </a:p>
+        </p:txBody>
+      </p:sp>
+      <p:sp>
+        <p:nvSpPr>
+          <p:cNvPr id="3" name="副標題 2">
+            <a:extLst>
+              <a:ext uri="{FF2B5EF4-FFF2-40B4-BE49-F238E27FC236}">
+                <a16:creationId xmlns:a16="http://schemas.microsoft.com/office/drawing/2014/main" id="{D01A0E66-128C-4067-B965-91FE03EC9D62}"/>
+              </a:ext>
+            </a:extLst>
+          </p:cNvPr>
+          <p:cNvSpPr>
+            <a:spLocks noGrp="1"/>
+          </p:cNvSpPr>
+          <p:nvPr>
+            <p:ph type="subTitle" idx="1"/>
+          </p:nvPr>
+        </p:nvSpPr>
+        <p:spPr/>
+        <p:txBody>
+          <a:bodyPr>
+            <a:normAutofit/>
+          </a:bodyPr>
+          <a:lstStyle/>
+          <a:p>
+            <a:r>
+              <a:rPr lang="en-US" altLang="zh-TW" sz="4000"/>
+              <a:t>Constrains</a:t>
+            </a:r>
+            <a:endParaRPr lang="en-US" altLang="zh-TW" sz="4000" dirty="0"/>
+          </a:p>
+        </p:txBody>
+      </p:sp>
+    </p:spTree>
+    <p:extLst>
+      <p:ext uri="{BB962C8B-B14F-4D97-AF65-F5344CB8AC3E}">
+        <p14:creationId xmlns:p14="http://schemas.microsoft.com/office/powerpoint/2010/main" val="255517338"/>
+      </p:ext>
+    </p:extLst>
+  </p:cSld>
+  <p:clrMapOvr>
+    <a:masterClrMapping/>
+  </p:clrMapOvr>
+</p:sld>
+</file>
+
 <file path=ppt/slides/slide5.xml><?xml version="1.0" encoding="utf-8"?>
 <p:sld xmlns:a="http://schemas.openxmlformats.org/drawingml/2006/main" xmlns:r="http://schemas.openxmlformats.org/officeDocument/2006/relationships" xmlns:p="http://schemas.openxmlformats.org/presentationml/2006/main">
   <p:cSld>

</xml_diff>

<commit_message>
Add: constraint 1. solve before 2. static_constraint
</commit_message>
<xml_diff>
--- a/SystemVerilog_語法學習.pptx
+++ b/SystemVerilog_語法學習.pptx
@@ -7418,7 +7418,7 @@
             </a:pPr>
             <a:r>
               <a:rPr lang="en-US" altLang="zh-TW" dirty="0"/>
-              <a:t>Constrains</a:t>
+              <a:t>Constraints</a:t>
             </a:r>
           </a:p>
           <a:p>
@@ -14999,7 +14999,7 @@
           <a:p>
             <a:r>
               <a:rPr lang="en-US" altLang="zh-TW" sz="4000"/>
-              <a:t>Constrains</a:t>
+              <a:t>Constraints</a:t>
             </a:r>
             <a:endParaRPr lang="en-US" altLang="zh-TW" sz="4000" dirty="0"/>
           </a:p>

</xml_diff>